<commit_message>
add new file powerpointv4
</commit_message>
<xml_diff>
--- a/proposal/Proposal_v4 - Copy.pptx
+++ b/proposal/Proposal_v4 - Copy.pptx
@@ -5,31 +5,33 @@
     <p:sldMasterId id="2147483749" r:id="rId4"/>
   </p:sldMasterIdLst>
   <p:notesMasterIdLst>
-    <p:notesMasterId r:id="rId24"/>
+    <p:notesMasterId r:id="rId26"/>
   </p:notesMasterIdLst>
   <p:handoutMasterIdLst>
-    <p:handoutMasterId r:id="rId25"/>
+    <p:handoutMasterId r:id="rId27"/>
   </p:handoutMasterIdLst>
   <p:sldIdLst>
     <p:sldId id="256" r:id="rId5"/>
     <p:sldId id="257" r:id="rId6"/>
     <p:sldId id="258" r:id="rId7"/>
     <p:sldId id="266" r:id="rId8"/>
-    <p:sldId id="259" r:id="rId9"/>
-    <p:sldId id="269" r:id="rId10"/>
-    <p:sldId id="270" r:id="rId11"/>
-    <p:sldId id="279" r:id="rId12"/>
-    <p:sldId id="273" r:id="rId13"/>
-    <p:sldId id="260" r:id="rId14"/>
-    <p:sldId id="278" r:id="rId15"/>
-    <p:sldId id="261" r:id="rId16"/>
-    <p:sldId id="271" r:id="rId17"/>
-    <p:sldId id="277" r:id="rId18"/>
-    <p:sldId id="274" r:id="rId19"/>
-    <p:sldId id="276" r:id="rId20"/>
-    <p:sldId id="262" r:id="rId21"/>
-    <p:sldId id="263" r:id="rId22"/>
-    <p:sldId id="265" r:id="rId23"/>
+    <p:sldId id="280" r:id="rId9"/>
+    <p:sldId id="259" r:id="rId10"/>
+    <p:sldId id="269" r:id="rId11"/>
+    <p:sldId id="270" r:id="rId12"/>
+    <p:sldId id="279" r:id="rId13"/>
+    <p:sldId id="281" r:id="rId14"/>
+    <p:sldId id="273" r:id="rId15"/>
+    <p:sldId id="260" r:id="rId16"/>
+    <p:sldId id="278" r:id="rId17"/>
+    <p:sldId id="261" r:id="rId18"/>
+    <p:sldId id="271" r:id="rId19"/>
+    <p:sldId id="277" r:id="rId20"/>
+    <p:sldId id="274" r:id="rId21"/>
+    <p:sldId id="276" r:id="rId22"/>
+    <p:sldId id="262" r:id="rId23"/>
+    <p:sldId id="263" r:id="rId24"/>
+    <p:sldId id="265" r:id="rId25"/>
   </p:sldIdLst>
   <p:sldSz cx="12192000" cy="6858000"/>
   <p:notesSz cx="6858000" cy="9144000"/>
@@ -674,6 +676,185 @@
     </a:lvl9pPr>
   </p:notesStyle>
 </p:notesMaster>
+</file>
+
+<file path=ppt/notesSlides/notesSlide1.xml><?xml version="1.0" encoding="utf-8"?>
+<p:notes xmlns:a="http://schemas.openxmlformats.org/drawingml/2006/main" xmlns:r="http://schemas.openxmlformats.org/officeDocument/2006/relationships" xmlns:p="http://schemas.openxmlformats.org/presentationml/2006/main">
+  <p:cSld>
+    <p:spTree>
+      <p:nvGrpSpPr>
+        <p:cNvPr id="1" name=""/>
+        <p:cNvGrpSpPr/>
+        <p:nvPr/>
+      </p:nvGrpSpPr>
+      <p:grpSpPr>
+        <a:xfrm>
+          <a:off x="0" y="0"/>
+          <a:ext cx="0" cy="0"/>
+          <a:chOff x="0" y="0"/>
+          <a:chExt cx="0" cy="0"/>
+        </a:xfrm>
+      </p:grpSpPr>
+      <p:sp>
+        <p:nvSpPr>
+          <p:cNvPr id="2" name="Slide Image Placeholder 1"/>
+          <p:cNvSpPr>
+            <a:spLocks noGrp="1" noRot="1" noChangeAspect="1"/>
+          </p:cNvSpPr>
+          <p:nvPr>
+            <p:ph type="sldImg"/>
+          </p:nvPr>
+        </p:nvSpPr>
+        <p:spPr/>
+      </p:sp>
+      <p:sp>
+        <p:nvSpPr>
+          <p:cNvPr id="3" name="Notes Placeholder 2"/>
+          <p:cNvSpPr>
+            <a:spLocks noGrp="1"/>
+          </p:cNvSpPr>
+          <p:nvPr>
+            <p:ph type="body" idx="1"/>
+          </p:nvPr>
+        </p:nvSpPr>
+        <p:spPr/>
+        <p:txBody>
+          <a:bodyPr/>
+          <a:lstStyle/>
+          <a:p>
+            <a:r>
+              <a:rPr lang="th-TH" dirty="0"/>
+              <a:t>ขั้นตอน </a:t>
+            </a:r>
+            <a:br>
+              <a:rPr lang="th-TH" dirty="0"/>
+            </a:br>
+            <a:r>
+              <a:rPr lang="th-TH" dirty="0"/>
+              <a:t>หลังจากค้นหาคำที่ต้องการระบบจะ</a:t>
+            </a:r>
+            <a:r>
+              <a:rPr lang="en-US" dirty="0"/>
+              <a:t> </a:t>
+            </a:r>
+            <a:r>
+              <a:rPr lang="en-US" sz="1200" dirty="0">
+                <a:latin typeface="TH Sarabun New" panose="020B0500040200020003" pitchFamily="34" charset="-34"/>
+                <a:cs typeface="TH Sarabun New" panose="020B0500040200020003" pitchFamily="34" charset="-34"/>
+              </a:rPr>
+              <a:t>Tokenize </a:t>
+            </a:r>
+            <a:r>
+              <a:rPr lang="th-TH" sz="1200" dirty="0">
+                <a:latin typeface="TH Sarabun New" panose="020B0500040200020003" pitchFamily="34" charset="-34"/>
+                <a:cs typeface="TH Sarabun New" panose="020B0500040200020003" pitchFamily="34" charset="-34"/>
+              </a:rPr>
+              <a:t>คำที่ค้นหาเพื่อ </a:t>
+            </a:r>
+            <a:r>
+              <a:rPr lang="en-US" dirty="0"/>
+              <a:t>mapping</a:t>
+            </a:r>
+            <a:r>
+              <a:rPr lang="th-TH" dirty="0"/>
+              <a:t> กับคำที่อยู่ใน </a:t>
+            </a:r>
+            <a:r>
+              <a:rPr lang="en-US" dirty="0" err="1"/>
+              <a:t>dict</a:t>
+            </a:r>
+            <a:r>
+              <a:rPr lang="en-US" dirty="0"/>
+              <a:t> </a:t>
+            </a:r>
+            <a:r>
+              <a:rPr lang="th-TH" dirty="0"/>
+              <a:t>เพื่อแสดงค่าที่ค้นหาออกมา</a:t>
+            </a:r>
+            <a:r>
+              <a:rPr lang="en-US" dirty="0"/>
+              <a:t> </a:t>
+            </a:r>
+            <a:r>
+              <a:rPr lang="th-TH" dirty="0"/>
+              <a:t> </a:t>
+            </a:r>
+            <a:endParaRPr lang="en-US" dirty="0"/>
+          </a:p>
+        </p:txBody>
+      </p:sp>
+    </p:spTree>
+    <p:extLst>
+      <p:ext uri="{BB962C8B-B14F-4D97-AF65-F5344CB8AC3E}">
+        <p14:creationId xmlns:p14="http://schemas.microsoft.com/office/powerpoint/2010/main" val="8579598"/>
+      </p:ext>
+    </p:extLst>
+  </p:cSld>
+  <p:clrMapOvr>
+    <a:masterClrMapping/>
+  </p:clrMapOvr>
+</p:notes>
+</file>
+
+<file path=ppt/notesSlides/notesSlide2.xml><?xml version="1.0" encoding="utf-8"?>
+<p:notes xmlns:a="http://schemas.openxmlformats.org/drawingml/2006/main" xmlns:r="http://schemas.openxmlformats.org/officeDocument/2006/relationships" xmlns:p="http://schemas.openxmlformats.org/presentationml/2006/main">
+  <p:cSld>
+    <p:spTree>
+      <p:nvGrpSpPr>
+        <p:cNvPr id="1" name=""/>
+        <p:cNvGrpSpPr/>
+        <p:nvPr/>
+      </p:nvGrpSpPr>
+      <p:grpSpPr>
+        <a:xfrm>
+          <a:off x="0" y="0"/>
+          <a:ext cx="0" cy="0"/>
+          <a:chOff x="0" y="0"/>
+          <a:chExt cx="0" cy="0"/>
+        </a:xfrm>
+      </p:grpSpPr>
+      <p:sp>
+        <p:nvSpPr>
+          <p:cNvPr id="2" name="Slide Image Placeholder 1"/>
+          <p:cNvSpPr>
+            <a:spLocks noGrp="1" noRot="1" noChangeAspect="1"/>
+          </p:cNvSpPr>
+          <p:nvPr>
+            <p:ph type="sldImg"/>
+          </p:nvPr>
+        </p:nvSpPr>
+        <p:spPr/>
+      </p:sp>
+      <p:sp>
+        <p:nvSpPr>
+          <p:cNvPr id="3" name="Notes Placeholder 2"/>
+          <p:cNvSpPr>
+            <a:spLocks noGrp="1"/>
+          </p:cNvSpPr>
+          <p:nvPr>
+            <p:ph type="body" idx="1"/>
+          </p:nvPr>
+        </p:nvSpPr>
+        <p:spPr/>
+        <p:txBody>
+          <a:bodyPr/>
+          <a:lstStyle/>
+          <a:p>
+            <a:endParaRPr lang="en-US" dirty="0"/>
+          </a:p>
+        </p:txBody>
+      </p:sp>
+    </p:spTree>
+    <p:extLst>
+      <p:ext uri="{BB962C8B-B14F-4D97-AF65-F5344CB8AC3E}">
+        <p14:creationId xmlns:p14="http://schemas.microsoft.com/office/powerpoint/2010/main" val="2885579"/>
+      </p:ext>
+    </p:extLst>
+  </p:cSld>
+  <p:clrMapOvr>
+    <a:masterClrMapping/>
+  </p:clrMapOvr>
+</p:notes>
 </file>
 
 <file path=ppt/slideLayouts/slideLayout1.xml><?xml version="1.0" encoding="utf-8"?>
@@ -1396,7 +1577,7 @@
           <a:bodyPr/>
           <a:lstStyle/>
           <a:p>
-            <a:fld id="{7B2ADC42-C0AF-4E30-BB98-956834C8DC7D}" type="datetime1">
+            <a:fld id="{91566A8B-EA02-434C-8159-162748008DAA}" type="datetime1">
               <a:rPr lang="en-US" smtClean="0"/>
               <a:t>2/1/2025</a:t>
             </a:fld>
@@ -1647,7 +1828,7 @@
           <a:bodyPr/>
           <a:lstStyle/>
           <a:p>
-            <a:fld id="{4BE232C0-9DCA-446A-8C3C-6EDD0B42ECBB}" type="datetime1">
+            <a:fld id="{4B1EAB36-2560-4860-8295-9A33892ECE02}" type="datetime1">
               <a:rPr lang="en-US" smtClean="0"/>
               <a:t>2/1/2025</a:t>
             </a:fld>
@@ -1961,7 +2142,7 @@
           <a:bodyPr/>
           <a:lstStyle/>
           <a:p>
-            <a:fld id="{80A56DF7-BD68-4111-AC11-128BD5FB7668}" type="datetime1">
+            <a:fld id="{E659959C-55FF-4542-9139-2A08060F7763}" type="datetime1">
               <a:rPr lang="en-US" smtClean="0"/>
               <a:t>2/1/2025</a:t>
             </a:fld>
@@ -2302,7 +2483,7 @@
           <a:bodyPr/>
           <a:lstStyle/>
           <a:p>
-            <a:fld id="{0BA27170-DC53-4358-B710-2CF0BC794600}" type="datetime1">
+            <a:fld id="{8BB18C9A-EB21-44FD-990E-0E3FAF5C9038}" type="datetime1">
               <a:rPr lang="en-US" smtClean="0"/>
               <a:t>2/1/2025</a:t>
             </a:fld>
@@ -2616,7 +2797,7 @@
           <a:bodyPr/>
           <a:lstStyle/>
           <a:p>
-            <a:fld id="{10270AE4-C511-4FDF-92BC-4DE60539A2C4}" type="datetime1">
+            <a:fld id="{6434C8F0-C904-4524-9DDA-0634A8DB2B74}" type="datetime1">
               <a:rPr lang="en-US" smtClean="0"/>
               <a:t>2/1/2025</a:t>
             </a:fld>
@@ -3009,7 +3190,7 @@
           <a:bodyPr/>
           <a:lstStyle/>
           <a:p>
-            <a:fld id="{96B005D7-0718-4178-9E16-E6EBB86C17CB}" type="datetime1">
+            <a:fld id="{692B0BDF-AD9E-4BCF-BFDE-DB3AEBF8F281}" type="datetime1">
               <a:rPr lang="en-US" smtClean="0"/>
               <a:t>2/1/2025</a:t>
             </a:fld>
@@ -3179,7 +3360,7 @@
           <a:bodyPr/>
           <a:lstStyle/>
           <a:p>
-            <a:fld id="{47C832E7-110B-491D-A68A-3C31203C0FC4}" type="datetime1">
+            <a:fld id="{51DCCF1A-EC8A-4E14-B55A-C648F0289670}" type="datetime1">
               <a:rPr lang="en-US" smtClean="0"/>
               <a:t>2/1/2025</a:t>
             </a:fld>
@@ -3359,7 +3540,7 @@
           <a:bodyPr/>
           <a:lstStyle/>
           <a:p>
-            <a:fld id="{E86FB788-C3B3-421F-B752-E00D30D8A6FF}" type="datetime1">
+            <a:fld id="{639492FF-4796-4872-872C-13EB24629197}" type="datetime1">
               <a:rPr lang="en-US" smtClean="0"/>
               <a:t>2/1/2025</a:t>
             </a:fld>
@@ -3535,7 +3716,7 @@
           <a:bodyPr/>
           <a:lstStyle/>
           <a:p>
-            <a:fld id="{B2D28486-81EE-47E9-B77D-8C9375712F71}" type="datetime1">
+            <a:fld id="{DF6F0E93-57D6-4032-B370-8778E0E74252}" type="datetime1">
               <a:rPr lang="en-US" smtClean="0"/>
               <a:t>2/1/2025</a:t>
             </a:fld>
@@ -3782,7 +3963,7 @@
           <a:bodyPr/>
           <a:lstStyle/>
           <a:p>
-            <a:fld id="{E1796718-6D09-4913-855A-74CA457F75DB}" type="datetime1">
+            <a:fld id="{B3BB3D61-E3DF-47EC-ACE8-968D300FC8D8}" type="datetime1">
               <a:rPr lang="en-US" smtClean="0"/>
               <a:t>2/1/2025</a:t>
             </a:fld>
@@ -4014,7 +4195,7 @@
           <a:bodyPr/>
           <a:lstStyle/>
           <a:p>
-            <a:fld id="{BEACB21F-0A7B-42EB-9ADA-A7250D808514}" type="datetime1">
+            <a:fld id="{C4D12F7D-99B3-454E-B6AA-B137249BFE32}" type="datetime1">
               <a:rPr lang="en-US" smtClean="0"/>
               <a:t>2/1/2025</a:t>
             </a:fld>
@@ -4388,7 +4569,7 @@
           <a:bodyPr/>
           <a:lstStyle/>
           <a:p>
-            <a:fld id="{681CBADD-9CD2-42AE-A13A-B4B39C161AE8}" type="datetime1">
+            <a:fld id="{E48676DB-1B55-424E-ACC9-691423D9AB51}" type="datetime1">
               <a:rPr lang="en-US" smtClean="0"/>
               <a:t>2/1/2025</a:t>
             </a:fld>
@@ -4511,7 +4692,7 @@
           <a:bodyPr/>
           <a:lstStyle/>
           <a:p>
-            <a:fld id="{EFA17E96-81C5-427F-AFCB-A377A90E05F8}" type="datetime1">
+            <a:fld id="{BA055B90-09A1-4DE8-BBBF-09CA79A2A9E7}" type="datetime1">
               <a:rPr lang="en-US" smtClean="0"/>
               <a:t>2/1/2025</a:t>
             </a:fld>
@@ -4606,7 +4787,7 @@
           <a:bodyPr/>
           <a:lstStyle/>
           <a:p>
-            <a:fld id="{794D9F0D-E67D-4989-8B5F-E8042009132F}" type="datetime1">
+            <a:fld id="{2D954258-D13C-427E-8810-22882CA2EB27}" type="datetime1">
               <a:rPr lang="en-US" smtClean="0"/>
               <a:t>2/1/2025</a:t>
             </a:fld>
@@ -4861,7 +5042,7 @@
           <a:bodyPr/>
           <a:lstStyle/>
           <a:p>
-            <a:fld id="{6C007AEB-7A0A-41A2-8FF2-950B3E7EF2E7}" type="datetime1">
+            <a:fld id="{2C545A45-C725-4FC9-A665-E6F4512F28B4}" type="datetime1">
               <a:rPr lang="en-US" smtClean="0"/>
               <a:t>2/1/2025</a:t>
             </a:fld>
@@ -5124,7 +5305,7 @@
           <a:bodyPr/>
           <a:lstStyle/>
           <a:p>
-            <a:fld id="{037E4EBA-06C5-4A54-8301-1117611AE6A7}" type="datetime1">
+            <a:fld id="{8862E76E-3053-482A-8B9B-DDCD7550CDCF}" type="datetime1">
               <a:rPr lang="en-US" smtClean="0"/>
               <a:t>2/1/2025</a:t>
             </a:fld>
@@ -5867,7 +6048,7 @@
             </a:lvl1pPr>
           </a:lstStyle>
           <a:p>
-            <a:fld id="{B5488A71-66AE-4853-BBA1-CD6D182CA180}" type="datetime1">
+            <a:fld id="{8E26A820-AA4E-4F82-BBD9-CC1F7DC85A5E}" type="datetime1">
               <a:rPr lang="en-US" smtClean="0"/>
               <a:t>2/1/2025</a:t>
             </a:fld>
@@ -6682,10 +6863,22 @@
           <a:lstStyle/>
           <a:p>
             <a:fld id="{9BEC6E05-063F-46C1-9253-25489D268387}" type="slidenum">
-              <a:rPr lang="en-US" smtClean="0"/>
+              <a:rPr lang="en-US" sz="1500" b="1" smtClean="0">
+                <a:solidFill>
+                  <a:schemeClr val="tx1"/>
+                </a:solidFill>
+                <a:latin typeface="TH Sarabun New" panose="020B0500040200020003" pitchFamily="34" charset="-34"/>
+                <a:cs typeface="TH Sarabun New" panose="020B0500040200020003" pitchFamily="34" charset="-34"/>
+              </a:rPr>
               <a:t>1</a:t>
             </a:fld>
-            <a:endParaRPr lang="en-US" dirty="0"/>
+            <a:endParaRPr lang="en-US" sz="1500" b="1" dirty="0">
+              <a:solidFill>
+                <a:schemeClr val="tx1"/>
+              </a:solidFill>
+              <a:latin typeface="TH Sarabun New" panose="020B0500040200020003" pitchFamily="34" charset="-34"/>
+              <a:cs typeface="TH Sarabun New" panose="020B0500040200020003" pitchFamily="34" charset="-34"/>
+            </a:endParaRPr>
           </a:p>
         </p:txBody>
       </p:sp>
@@ -6711,6 +6904,1068 @@
 </file>
 
 <file path=ppt/slides/slide10.xml><?xml version="1.0" encoding="utf-8"?>
+<p:sld xmlns:a="http://schemas.openxmlformats.org/drawingml/2006/main" xmlns:r="http://schemas.openxmlformats.org/officeDocument/2006/relationships" xmlns:p="http://schemas.openxmlformats.org/presentationml/2006/main">
+  <p:cSld>
+    <p:spTree>
+      <p:nvGrpSpPr>
+        <p:cNvPr id="1" name="">
+          <a:extLst>
+            <a:ext uri="{FF2B5EF4-FFF2-40B4-BE49-F238E27FC236}">
+              <a16:creationId xmlns:a16="http://schemas.microsoft.com/office/drawing/2014/main" id="{2FCE3BFD-7843-AF52-192D-BBFCD0235949}"/>
+            </a:ext>
+          </a:extLst>
+        </p:cNvPr>
+        <p:cNvGrpSpPr/>
+        <p:nvPr/>
+      </p:nvGrpSpPr>
+      <p:grpSpPr>
+        <a:xfrm>
+          <a:off x="0" y="0"/>
+          <a:ext cx="0" cy="0"/>
+          <a:chOff x="0" y="0"/>
+          <a:chExt cx="0" cy="0"/>
+        </a:xfrm>
+      </p:grpSpPr>
+      <p:sp>
+        <p:nvSpPr>
+          <p:cNvPr id="7" name="TextBox 6">
+            <a:extLst>
+              <a:ext uri="{FF2B5EF4-FFF2-40B4-BE49-F238E27FC236}">
+                <a16:creationId xmlns:a16="http://schemas.microsoft.com/office/drawing/2014/main" id="{837829CB-41BE-9480-09D0-419A6DEAF3EA}"/>
+              </a:ext>
+            </a:extLst>
+          </p:cNvPr>
+          <p:cNvSpPr txBox="1"/>
+          <p:nvPr/>
+        </p:nvSpPr>
+        <p:spPr>
+          <a:xfrm>
+            <a:off x="672592" y="831703"/>
+            <a:ext cx="10959106" cy="4493538"/>
+          </a:xfrm>
+          <a:prstGeom prst="rect">
+            <a:avLst/>
+          </a:prstGeom>
+          <a:noFill/>
+        </p:spPr>
+        <p:txBody>
+          <a:bodyPr wrap="square">
+            <a:spAutoFit/>
+          </a:bodyPr>
+          <a:lstStyle/>
+          <a:p>
+            <a:endParaRPr lang="en-US" sz="2600" dirty="0">
+              <a:latin typeface="TH Sarabun New" panose="020B0500040200020003" pitchFamily="34" charset="-34"/>
+              <a:cs typeface="TH Sarabun New" panose="020B0500040200020003" pitchFamily="34" charset="-34"/>
+            </a:endParaRPr>
+          </a:p>
+          <a:p>
+            <a:r>
+              <a:rPr lang="en-US" sz="2600" b="1" dirty="0">
+                <a:latin typeface="TH Sarabun New" panose="020B0500040200020003" pitchFamily="34" charset="-34"/>
+                <a:cs typeface="TH Sarabun New" panose="020B0500040200020003" pitchFamily="34" charset="-34"/>
+              </a:rPr>
+              <a:t>LLM (Large Language Model) </a:t>
+            </a:r>
+            <a:r>
+              <a:rPr lang="th-TH" sz="2600" dirty="0">
+                <a:latin typeface="TH Sarabun New" panose="020B0500040200020003" pitchFamily="34" charset="-34"/>
+                <a:cs typeface="TH Sarabun New" panose="020B0500040200020003" pitchFamily="34" charset="-34"/>
+              </a:rPr>
+              <a:t>คือ แบบจำลองภาษาขนาดใหญ่ ซึ่งเป็นปัญญาประดิษฐ์ (</a:t>
+            </a:r>
+            <a:r>
+              <a:rPr lang="en-US" sz="2600" dirty="0">
+                <a:latin typeface="TH Sarabun New" panose="020B0500040200020003" pitchFamily="34" charset="-34"/>
+                <a:cs typeface="TH Sarabun New" panose="020B0500040200020003" pitchFamily="34" charset="-34"/>
+              </a:rPr>
+              <a:t>AI) </a:t>
+            </a:r>
+            <a:r>
+              <a:rPr lang="th-TH" sz="2600" dirty="0">
+                <a:latin typeface="TH Sarabun New" panose="020B0500040200020003" pitchFamily="34" charset="-34"/>
+                <a:cs typeface="TH Sarabun New" panose="020B0500040200020003" pitchFamily="34" charset="-34"/>
+              </a:rPr>
+              <a:t>ที่ถูกฝึกด้วยชุดข้อมูลขนาดใหญ่เพื่อให้สามารถเข้าใจและสร้างภาษามนุษย์ได้อย่างมีประสิทธิภาพ</a:t>
+            </a:r>
+          </a:p>
+          <a:p>
+            <a:endParaRPr lang="th-TH" sz="2600" dirty="0">
+              <a:latin typeface="TH Sarabun New" panose="020B0500040200020003" pitchFamily="34" charset="-34"/>
+              <a:cs typeface="TH Sarabun New" panose="020B0500040200020003" pitchFamily="34" charset="-34"/>
+            </a:endParaRPr>
+          </a:p>
+          <a:p>
+            <a:r>
+              <a:rPr lang="th-TH" sz="2600" b="1" dirty="0">
+                <a:latin typeface="TH Sarabun New" panose="020B0500040200020003" pitchFamily="34" charset="-34"/>
+                <a:cs typeface="TH Sarabun New" panose="020B0500040200020003" pitchFamily="34" charset="-34"/>
+              </a:rPr>
+              <a:t>คุณสมบัติหลักของ </a:t>
+            </a:r>
+            <a:r>
+              <a:rPr lang="en-US" sz="2600" b="1" dirty="0">
+                <a:latin typeface="TH Sarabun New" panose="020B0500040200020003" pitchFamily="34" charset="-34"/>
+                <a:cs typeface="TH Sarabun New" panose="020B0500040200020003" pitchFamily="34" charset="-34"/>
+              </a:rPr>
+              <a:t>LLM</a:t>
+            </a:r>
+          </a:p>
+          <a:p>
+            <a:pPr>
+              <a:buFont typeface="+mj-lt"/>
+              <a:buAutoNum type="arabicPeriod"/>
+            </a:pPr>
+            <a:r>
+              <a:rPr lang="th-TH" sz="2600" dirty="0">
+                <a:latin typeface="TH Sarabun New" panose="020B0500040200020003" pitchFamily="34" charset="-34"/>
+                <a:cs typeface="TH Sarabun New" panose="020B0500040200020003" pitchFamily="34" charset="-34"/>
+              </a:rPr>
+              <a:t>ความสามารถด้านการเข้าใจและสร้างข้อความ</a:t>
+            </a:r>
+          </a:p>
+          <a:p>
+            <a:pPr marL="742950" lvl="1" indent="-285750">
+              <a:buFont typeface="+mj-lt"/>
+              <a:buAutoNum type="arabicPeriod"/>
+            </a:pPr>
+            <a:r>
+              <a:rPr lang="th-TH" sz="2600" dirty="0">
+                <a:latin typeface="TH Sarabun New" panose="020B0500040200020003" pitchFamily="34" charset="-34"/>
+                <a:cs typeface="TH Sarabun New" panose="020B0500040200020003" pitchFamily="34" charset="-34"/>
+              </a:rPr>
+              <a:t>สามารถอ่าน ทำความเข้าใจ และตอบกลับข้อความได้คล้ายกับมนุษย์</a:t>
+            </a:r>
+          </a:p>
+          <a:p>
+            <a:pPr marL="742950" lvl="1" indent="-285750">
+              <a:buFont typeface="+mj-lt"/>
+              <a:buAutoNum type="arabicPeriod"/>
+            </a:pPr>
+            <a:r>
+              <a:rPr lang="th-TH" sz="2600" dirty="0">
+                <a:latin typeface="TH Sarabun New" panose="020B0500040200020003" pitchFamily="34" charset="-34"/>
+                <a:cs typeface="TH Sarabun New" panose="020B0500040200020003" pitchFamily="34" charset="-34"/>
+              </a:rPr>
+              <a:t>รองรับหลายภาษา เช่น ไทย อังกฤษ จีน ฯลฯ</a:t>
+            </a:r>
+          </a:p>
+          <a:p>
+            <a:pPr>
+              <a:buFont typeface="+mj-lt"/>
+              <a:buAutoNum type="arabicPeriod"/>
+            </a:pPr>
+            <a:r>
+              <a:rPr lang="th-TH" sz="2600" dirty="0">
+                <a:latin typeface="TH Sarabun New" panose="020B0500040200020003" pitchFamily="34" charset="-34"/>
+                <a:cs typeface="TH Sarabun New" panose="020B0500040200020003" pitchFamily="34" charset="-34"/>
+              </a:rPr>
+              <a:t>การเรียนรู้จากข้อมูลจำนวนมาก</a:t>
+            </a:r>
+          </a:p>
+          <a:p>
+            <a:pPr marL="742950" lvl="1" indent="-285750">
+              <a:buFont typeface="+mj-lt"/>
+              <a:buAutoNum type="arabicPeriod"/>
+            </a:pPr>
+            <a:r>
+              <a:rPr lang="th-TH" sz="2600" dirty="0">
+                <a:latin typeface="TH Sarabun New" panose="020B0500040200020003" pitchFamily="34" charset="-34"/>
+                <a:cs typeface="TH Sarabun New" panose="020B0500040200020003" pitchFamily="34" charset="-34"/>
+              </a:rPr>
+              <a:t>ได้รับการฝึกฝนด้วยข้อมูลขนาดใหญ่จากแหล่งต่าง ๆ เช่น หนังสือ บทความ เว็บไซต์</a:t>
+            </a:r>
+          </a:p>
+          <a:p>
+            <a:pPr marL="742950" lvl="1" indent="-285750">
+              <a:buFont typeface="+mj-lt"/>
+              <a:buAutoNum type="arabicPeriod"/>
+            </a:pPr>
+            <a:r>
+              <a:rPr lang="th-TH" sz="2600" dirty="0">
+                <a:latin typeface="TH Sarabun New" panose="020B0500040200020003" pitchFamily="34" charset="-34"/>
+                <a:cs typeface="TH Sarabun New" panose="020B0500040200020003" pitchFamily="34" charset="-34"/>
+              </a:rPr>
+              <a:t>สามารถตอบคำถาม วิเคราะห์ และสร้างเนื้อหาใหม่ได้</a:t>
+            </a:r>
+          </a:p>
+        </p:txBody>
+      </p:sp>
+      <p:sp>
+        <p:nvSpPr>
+          <p:cNvPr id="2" name="Title 3">
+            <a:extLst>
+              <a:ext uri="{FF2B5EF4-FFF2-40B4-BE49-F238E27FC236}">
+                <a16:creationId xmlns:a16="http://schemas.microsoft.com/office/drawing/2014/main" id="{62EA78DF-CEF5-4374-FA14-B2547D0DE77C}"/>
+              </a:ext>
+            </a:extLst>
+          </p:cNvPr>
+          <p:cNvSpPr txBox="1">
+            <a:spLocks/>
+          </p:cNvSpPr>
+          <p:nvPr/>
+        </p:nvSpPr>
+        <p:spPr>
+          <a:xfrm>
+            <a:off x="0" y="0"/>
+            <a:ext cx="7139354" cy="494402"/>
+          </a:xfrm>
+          <a:prstGeom prst="rect">
+            <a:avLst/>
+          </a:prstGeom>
+        </p:spPr>
+        <p:txBody>
+          <a:bodyPr vert="horz" lIns="91440" tIns="45720" rIns="91440" bIns="45720" rtlCol="0" anchor="t">
+            <a:normAutofit/>
+          </a:bodyPr>
+          <a:lstStyle>
+            <a:lvl1pPr algn="l" defTabSz="457200" rtl="0" eaLnBrk="1" latinLnBrk="0" hangingPunct="1">
+              <a:spcBef>
+                <a:spcPct val="0"/>
+              </a:spcBef>
+              <a:buNone/>
+              <a:defRPr sz="3600" kern="1200">
+                <a:solidFill>
+                  <a:schemeClr val="accent1"/>
+                </a:solidFill>
+                <a:latin typeface="+mj-lt"/>
+                <a:ea typeface="+mj-ea"/>
+                <a:cs typeface="+mj-cs"/>
+              </a:defRPr>
+            </a:lvl1pPr>
+            <a:lvl2pPr eaLnBrk="1" hangingPunct="1">
+              <a:defRPr>
+                <a:solidFill>
+                  <a:schemeClr val="tx2"/>
+                </a:solidFill>
+              </a:defRPr>
+            </a:lvl2pPr>
+            <a:lvl3pPr eaLnBrk="1" hangingPunct="1">
+              <a:defRPr>
+                <a:solidFill>
+                  <a:schemeClr val="tx2"/>
+                </a:solidFill>
+              </a:defRPr>
+            </a:lvl3pPr>
+            <a:lvl4pPr eaLnBrk="1" hangingPunct="1">
+              <a:defRPr>
+                <a:solidFill>
+                  <a:schemeClr val="tx2"/>
+                </a:solidFill>
+              </a:defRPr>
+            </a:lvl4pPr>
+            <a:lvl5pPr eaLnBrk="1" hangingPunct="1">
+              <a:defRPr>
+                <a:solidFill>
+                  <a:schemeClr val="tx2"/>
+                </a:solidFill>
+              </a:defRPr>
+            </a:lvl5pPr>
+            <a:lvl6pPr eaLnBrk="1" hangingPunct="1">
+              <a:defRPr>
+                <a:solidFill>
+                  <a:schemeClr val="tx2"/>
+                </a:solidFill>
+              </a:defRPr>
+            </a:lvl6pPr>
+            <a:lvl7pPr eaLnBrk="1" hangingPunct="1">
+              <a:defRPr>
+                <a:solidFill>
+                  <a:schemeClr val="tx2"/>
+                </a:solidFill>
+              </a:defRPr>
+            </a:lvl7pPr>
+            <a:lvl8pPr eaLnBrk="1" hangingPunct="1">
+              <a:defRPr>
+                <a:solidFill>
+                  <a:schemeClr val="tx2"/>
+                </a:solidFill>
+              </a:defRPr>
+            </a:lvl8pPr>
+            <a:lvl9pPr eaLnBrk="1" hangingPunct="1">
+              <a:defRPr>
+                <a:solidFill>
+                  <a:schemeClr val="tx2"/>
+                </a:solidFill>
+              </a:defRPr>
+            </a:lvl9pPr>
+          </a:lstStyle>
+          <a:p>
+            <a:r>
+              <a:rPr lang="en-US" sz="2600" b="1" dirty="0">
+                <a:solidFill>
+                  <a:schemeClr val="tx1"/>
+                </a:solidFill>
+                <a:latin typeface="TH Sarabun New" panose="020B0500040200020003" pitchFamily="34" charset="-34"/>
+                <a:cs typeface="TH Sarabun New" panose="020B0500040200020003" pitchFamily="34" charset="-34"/>
+              </a:rPr>
+              <a:t>2</a:t>
+            </a:r>
+            <a:r>
+              <a:rPr lang="th-TH" sz="2600" b="1" dirty="0">
+                <a:solidFill>
+                  <a:schemeClr val="tx1"/>
+                </a:solidFill>
+                <a:latin typeface="TH Sarabun New" panose="020B0500040200020003" pitchFamily="34" charset="-34"/>
+                <a:cs typeface="TH Sarabun New" panose="020B0500040200020003" pitchFamily="34" charset="-34"/>
+              </a:rPr>
+              <a:t>.ทฤษฎีที่เกี่ยวข้อง</a:t>
+            </a:r>
+            <a:endParaRPr lang="en-US" sz="2600" b="1" dirty="0">
+              <a:solidFill>
+                <a:schemeClr val="tx1"/>
+              </a:solidFill>
+            </a:endParaRPr>
+          </a:p>
+        </p:txBody>
+      </p:sp>
+      <p:sp>
+        <p:nvSpPr>
+          <p:cNvPr id="3" name="Slide Number Placeholder 2">
+            <a:extLst>
+              <a:ext uri="{FF2B5EF4-FFF2-40B4-BE49-F238E27FC236}">
+                <a16:creationId xmlns:a16="http://schemas.microsoft.com/office/drawing/2014/main" id="{8C3BBD51-70A8-62C9-605F-157BF8CC1267}"/>
+              </a:ext>
+            </a:extLst>
+          </p:cNvPr>
+          <p:cNvSpPr>
+            <a:spLocks noGrp="1"/>
+          </p:cNvSpPr>
+          <p:nvPr>
+            <p:ph type="sldNum" sz="quarter" idx="12"/>
+          </p:nvPr>
+        </p:nvSpPr>
+        <p:spPr/>
+        <p:txBody>
+          <a:bodyPr/>
+          <a:lstStyle/>
+          <a:p>
+            <a:fld id="{9BEC6E05-063F-46C1-9253-25489D268387}" type="slidenum">
+              <a:rPr lang="en-US" smtClean="0"/>
+              <a:t>10</a:t>
+            </a:fld>
+            <a:endParaRPr lang="en-US"/>
+          </a:p>
+        </p:txBody>
+      </p:sp>
+    </p:spTree>
+    <p:extLst>
+      <p:ext uri="{BB962C8B-B14F-4D97-AF65-F5344CB8AC3E}">
+        <p14:creationId xmlns:p14="http://schemas.microsoft.com/office/powerpoint/2010/main" val="1878452431"/>
+      </p:ext>
+    </p:extLst>
+  </p:cSld>
+  <p:clrMapOvr>
+    <a:masterClrMapping/>
+  </p:clrMapOvr>
+</p:sld>
+</file>
+
+<file path=ppt/slides/slide11.xml><?xml version="1.0" encoding="utf-8"?>
+<p:sld xmlns:a="http://schemas.openxmlformats.org/drawingml/2006/main" xmlns:r="http://schemas.openxmlformats.org/officeDocument/2006/relationships" xmlns:p="http://schemas.openxmlformats.org/presentationml/2006/main">
+  <p:cSld>
+    <p:spTree>
+      <p:nvGrpSpPr>
+        <p:cNvPr id="1" name="">
+          <a:extLst>
+            <a:ext uri="{FF2B5EF4-FFF2-40B4-BE49-F238E27FC236}">
+              <a16:creationId xmlns:a16="http://schemas.microsoft.com/office/drawing/2014/main" id="{DC76755C-CF04-5BCA-0F19-82A1613B2C9C}"/>
+            </a:ext>
+          </a:extLst>
+        </p:cNvPr>
+        <p:cNvGrpSpPr/>
+        <p:nvPr/>
+      </p:nvGrpSpPr>
+      <p:grpSpPr>
+        <a:xfrm>
+          <a:off x="0" y="0"/>
+          <a:ext cx="0" cy="0"/>
+          <a:chOff x="0" y="0"/>
+          <a:chExt cx="0" cy="0"/>
+        </a:xfrm>
+      </p:grpSpPr>
+      <p:sp>
+        <p:nvSpPr>
+          <p:cNvPr id="5" name="TextBox 4">
+            <a:extLst>
+              <a:ext uri="{FF2B5EF4-FFF2-40B4-BE49-F238E27FC236}">
+                <a16:creationId xmlns:a16="http://schemas.microsoft.com/office/drawing/2014/main" id="{0D13F6AE-0232-D341-120B-F083E28B913F}"/>
+              </a:ext>
+            </a:extLst>
+          </p:cNvPr>
+          <p:cNvSpPr txBox="1"/>
+          <p:nvPr/>
+        </p:nvSpPr>
+        <p:spPr>
+          <a:xfrm>
+            <a:off x="592340" y="869741"/>
+            <a:ext cx="6096000" cy="492443"/>
+          </a:xfrm>
+          <a:prstGeom prst="rect">
+            <a:avLst/>
+          </a:prstGeom>
+          <a:noFill/>
+        </p:spPr>
+        <p:txBody>
+          <a:bodyPr wrap="square">
+            <a:spAutoFit/>
+          </a:bodyPr>
+          <a:lstStyle/>
+          <a:p>
+            <a:r>
+              <a:rPr lang="th-TH" sz="2600" b="1" i="0" u="none" strike="noStrike" baseline="0" dirty="0">
+                <a:solidFill>
+                  <a:srgbClr val="000000"/>
+                </a:solidFill>
+                <a:latin typeface="TH Sarabun New" panose="020B0500040200020003" pitchFamily="34" charset="-34"/>
+                <a:cs typeface="TH Sarabun New" panose="020B0500040200020003" pitchFamily="34" charset="-34"/>
+              </a:rPr>
+              <a:t>เทคโนโลยีและแพลตฟอร์มที่ใช้</a:t>
+            </a:r>
+            <a:endParaRPr lang="en-US" sz="2600" dirty="0">
+              <a:latin typeface="TH Sarabun New" panose="020B0500040200020003" pitchFamily="34" charset="-34"/>
+              <a:cs typeface="TH Sarabun New" panose="020B0500040200020003" pitchFamily="34" charset="-34"/>
+            </a:endParaRPr>
+          </a:p>
+        </p:txBody>
+      </p:sp>
+      <p:sp>
+        <p:nvSpPr>
+          <p:cNvPr id="7" name="TextBox 6">
+            <a:extLst>
+              <a:ext uri="{FF2B5EF4-FFF2-40B4-BE49-F238E27FC236}">
+                <a16:creationId xmlns:a16="http://schemas.microsoft.com/office/drawing/2014/main" id="{ABCE7084-7E50-ECD4-9996-F2DCE1FD540C}"/>
+              </a:ext>
+            </a:extLst>
+          </p:cNvPr>
+          <p:cNvSpPr txBox="1"/>
+          <p:nvPr/>
+        </p:nvSpPr>
+        <p:spPr>
+          <a:xfrm>
+            <a:off x="2693478" y="1558027"/>
+            <a:ext cx="9578035" cy="1692771"/>
+          </a:xfrm>
+          <a:prstGeom prst="rect">
+            <a:avLst/>
+          </a:prstGeom>
+          <a:noFill/>
+        </p:spPr>
+        <p:txBody>
+          <a:bodyPr wrap="square">
+            <a:spAutoFit/>
+          </a:bodyPr>
+          <a:lstStyle/>
+          <a:p>
+            <a:r>
+              <a:rPr lang="en-US" sz="2600" b="1" dirty="0">
+                <a:latin typeface="TH Sarabun New" panose="020B0500040200020003" pitchFamily="34" charset="-34"/>
+                <a:cs typeface="TH Sarabun New" panose="020B0500040200020003" pitchFamily="34" charset="-34"/>
+              </a:rPr>
+              <a:t>Elasticsearch </a:t>
+            </a:r>
+            <a:r>
+              <a:rPr lang="th-TH" sz="2600" dirty="0">
+                <a:latin typeface="TH Sarabun New" panose="020B0500040200020003" pitchFamily="34" charset="-34"/>
+                <a:cs typeface="TH Sarabun New" panose="020B0500040200020003" pitchFamily="34" charset="-34"/>
+              </a:rPr>
+              <a:t>มีคุณสมบัติเหมาะสมกับการค้นคืนข้อมูลข้ามภาษา (</a:t>
+            </a:r>
+            <a:r>
+              <a:rPr lang="en-US" sz="2600" dirty="0">
+                <a:latin typeface="TH Sarabun New" panose="020B0500040200020003" pitchFamily="34" charset="-34"/>
+                <a:cs typeface="TH Sarabun New" panose="020B0500040200020003" pitchFamily="34" charset="-34"/>
+              </a:rPr>
+              <a:t>Cross-Lingual Information Retrieval) </a:t>
+            </a:r>
+          </a:p>
+          <a:p>
+            <a:r>
+              <a:rPr lang="th-TH" sz="2600" dirty="0">
+                <a:latin typeface="TH Sarabun New" panose="020B0500040200020003" pitchFamily="34" charset="-34"/>
+                <a:cs typeface="TH Sarabun New" panose="020B0500040200020003" pitchFamily="34" charset="-34"/>
+              </a:rPr>
+              <a:t>โดยรองรับการทำงานที่ซับซ้อน เช่น การวิเคราะห์คำพ้องความหมาย (</a:t>
+            </a:r>
+            <a:r>
+              <a:rPr lang="en-US" sz="2600" dirty="0">
+                <a:latin typeface="TH Sarabun New" panose="020B0500040200020003" pitchFamily="34" charset="-34"/>
+                <a:cs typeface="TH Sarabun New" panose="020B0500040200020003" pitchFamily="34" charset="-34"/>
+              </a:rPr>
+              <a:t>Synonym Matching) </a:t>
+            </a:r>
+          </a:p>
+          <a:p>
+            <a:r>
+              <a:rPr lang="th-TH" sz="2600" dirty="0">
+                <a:latin typeface="TH Sarabun New" panose="020B0500040200020003" pitchFamily="34" charset="-34"/>
+                <a:cs typeface="TH Sarabun New" panose="020B0500040200020003" pitchFamily="34" charset="-34"/>
+              </a:rPr>
+              <a:t>และการค้นหาแบบ </a:t>
+            </a:r>
+            <a:r>
+              <a:rPr lang="en-US" sz="2600" dirty="0">
+                <a:latin typeface="TH Sarabun New" panose="020B0500040200020003" pitchFamily="34" charset="-34"/>
+                <a:cs typeface="TH Sarabun New" panose="020B0500040200020003" pitchFamily="34" charset="-34"/>
+              </a:rPr>
+              <a:t>Full-Text Search </a:t>
+            </a:r>
+            <a:r>
+              <a:rPr lang="th-TH" sz="2600" dirty="0">
+                <a:latin typeface="TH Sarabun New" panose="020B0500040200020003" pitchFamily="34" charset="-34"/>
+                <a:cs typeface="TH Sarabun New" panose="020B0500040200020003" pitchFamily="34" charset="-34"/>
+              </a:rPr>
+              <a:t>ได้อย่างมีประสิทธิภาพ</a:t>
+            </a:r>
+          </a:p>
+          <a:p>
+            <a:r>
+              <a:rPr lang="en-US" sz="2600" b="1" dirty="0">
+                <a:latin typeface="TH Sarabun New" panose="020B0500040200020003" pitchFamily="34" charset="-34"/>
+                <a:cs typeface="TH Sarabun New" panose="020B0500040200020003" pitchFamily="34" charset="-34"/>
+              </a:rPr>
+              <a:t> </a:t>
+            </a:r>
+            <a:endParaRPr lang="en-US" sz="2600" dirty="0">
+              <a:latin typeface="TH Sarabun New" panose="020B0500040200020003" pitchFamily="34" charset="-34"/>
+              <a:cs typeface="TH Sarabun New" panose="020B0500040200020003" pitchFamily="34" charset="-34"/>
+            </a:endParaRPr>
+          </a:p>
+        </p:txBody>
+      </p:sp>
+      <p:sp>
+        <p:nvSpPr>
+          <p:cNvPr id="3" name="TextBox 2">
+            <a:extLst>
+              <a:ext uri="{FF2B5EF4-FFF2-40B4-BE49-F238E27FC236}">
+                <a16:creationId xmlns:a16="http://schemas.microsoft.com/office/drawing/2014/main" id="{9E4047AA-216F-EE75-8B0B-71FCB5CB91F6}"/>
+              </a:ext>
+            </a:extLst>
+          </p:cNvPr>
+          <p:cNvSpPr txBox="1"/>
+          <p:nvPr/>
+        </p:nvSpPr>
+        <p:spPr>
+          <a:xfrm>
+            <a:off x="2598423" y="3429000"/>
+            <a:ext cx="9209264" cy="892552"/>
+          </a:xfrm>
+          <a:prstGeom prst="rect">
+            <a:avLst/>
+          </a:prstGeom>
+          <a:noFill/>
+        </p:spPr>
+        <p:txBody>
+          <a:bodyPr wrap="square">
+            <a:spAutoFit/>
+          </a:bodyPr>
+          <a:lstStyle/>
+          <a:p>
+            <a:r>
+              <a:rPr lang="th-TH" sz="2600" dirty="0">
+                <a:solidFill>
+                  <a:srgbClr val="000000"/>
+                </a:solidFill>
+                <a:latin typeface="TH Sarabun New" panose="020B0500040200020003" pitchFamily="34" charset="-34"/>
+                <a:cs typeface="TH Sarabun New" panose="020B0500040200020003" pitchFamily="34" charset="-34"/>
+              </a:rPr>
+              <a:t>เฟรม</a:t>
+            </a:r>
+            <a:r>
+              <a:rPr lang="th-TH" sz="2600" b="0" i="0" u="none" strike="noStrike" baseline="0" dirty="0">
+                <a:solidFill>
+                  <a:srgbClr val="000000"/>
+                </a:solidFill>
+                <a:latin typeface="TH Sarabun New" panose="020B0500040200020003" pitchFamily="34" charset="-34"/>
+                <a:cs typeface="TH Sarabun New" panose="020B0500040200020003" pitchFamily="34" charset="-34"/>
+              </a:rPr>
+              <a:t>เวิร์กภาษา </a:t>
+            </a:r>
+            <a:r>
+              <a:rPr lang="en-US" sz="2600" b="0" i="0" u="none" strike="noStrike" baseline="0" dirty="0">
+                <a:solidFill>
+                  <a:srgbClr val="000000"/>
+                </a:solidFill>
+                <a:latin typeface="TH Sarabun New" panose="020B0500040200020003" pitchFamily="34" charset="-34"/>
+                <a:cs typeface="TH Sarabun New" panose="020B0500040200020003" pitchFamily="34" charset="-34"/>
+              </a:rPr>
+              <a:t>Python </a:t>
+            </a:r>
+            <a:r>
+              <a:rPr lang="th-TH" sz="2600" b="0" i="0" u="none" strike="noStrike" baseline="0" dirty="0">
+                <a:solidFill>
+                  <a:srgbClr val="000000"/>
+                </a:solidFill>
+                <a:latin typeface="TH Sarabun New" panose="020B0500040200020003" pitchFamily="34" charset="-34"/>
+                <a:cs typeface="TH Sarabun New" panose="020B0500040200020003" pitchFamily="34" charset="-34"/>
+              </a:rPr>
+              <a:t>ที่มีประสิทธิภาพสูง ใช้งานง่าย ทำให้สามารถสร้าง </a:t>
+            </a:r>
+            <a:r>
+              <a:rPr lang="en-US" sz="2600" b="0" i="0" u="none" strike="noStrike" baseline="0" dirty="0">
+                <a:solidFill>
+                  <a:srgbClr val="000000"/>
+                </a:solidFill>
+                <a:latin typeface="TH Sarabun New" panose="020B0500040200020003" pitchFamily="34" charset="-34"/>
+                <a:cs typeface="TH Sarabun New" panose="020B0500040200020003" pitchFamily="34" charset="-34"/>
+              </a:rPr>
+              <a:t>REST API </a:t>
+            </a:r>
+            <a:r>
+              <a:rPr lang="th-TH" sz="2600" b="0" i="0" u="none" strike="noStrike" baseline="0" dirty="0">
+                <a:solidFill>
+                  <a:srgbClr val="000000"/>
+                </a:solidFill>
+                <a:latin typeface="TH Sarabun New" panose="020B0500040200020003" pitchFamily="34" charset="-34"/>
+                <a:cs typeface="TH Sarabun New" panose="020B0500040200020003" pitchFamily="34" charset="-34"/>
+              </a:rPr>
+              <a:t>เพื่อเชื่อมต่อระหว่าง </a:t>
+            </a:r>
+            <a:r>
+              <a:rPr lang="en-US" sz="2600" b="0" i="0" u="none" strike="noStrike" baseline="0" dirty="0">
+                <a:solidFill>
+                  <a:srgbClr val="000000"/>
+                </a:solidFill>
+                <a:latin typeface="TH Sarabun New" panose="020B0500040200020003" pitchFamily="34" charset="-34"/>
+                <a:cs typeface="TH Sarabun New" panose="020B0500040200020003" pitchFamily="34" charset="-34"/>
+              </a:rPr>
+              <a:t>Frontend </a:t>
+            </a:r>
+            <a:r>
+              <a:rPr lang="th-TH" sz="2600" b="0" i="0" u="none" strike="noStrike" baseline="0" dirty="0">
+                <a:solidFill>
+                  <a:srgbClr val="000000"/>
+                </a:solidFill>
+                <a:latin typeface="TH Sarabun New" panose="020B0500040200020003" pitchFamily="34" charset="-34"/>
+                <a:cs typeface="TH Sarabun New" panose="020B0500040200020003" pitchFamily="34" charset="-34"/>
+              </a:rPr>
+              <a:t>กับ </a:t>
+            </a:r>
+            <a:r>
+              <a:rPr lang="en-US" sz="2600" b="0" i="0" u="none" strike="noStrike" baseline="0" dirty="0">
+                <a:solidFill>
+                  <a:srgbClr val="000000"/>
+                </a:solidFill>
+                <a:latin typeface="TH Sarabun New" panose="020B0500040200020003" pitchFamily="34" charset="-34"/>
+                <a:cs typeface="TH Sarabun New" panose="020B0500040200020003" pitchFamily="34" charset="-34"/>
+              </a:rPr>
+              <a:t>Elasticsearch </a:t>
+            </a:r>
+            <a:r>
+              <a:rPr lang="th-TH" sz="2600" b="0" i="0" u="none" strike="noStrike" baseline="0" dirty="0">
+                <a:solidFill>
+                  <a:srgbClr val="000000"/>
+                </a:solidFill>
+                <a:latin typeface="TH Sarabun New" panose="020B0500040200020003" pitchFamily="34" charset="-34"/>
+                <a:cs typeface="TH Sarabun New" panose="020B0500040200020003" pitchFamily="34" charset="-34"/>
+              </a:rPr>
+              <a:t>ได้อย่างสะดวก </a:t>
+            </a:r>
+            <a:r>
+              <a:rPr lang="en-US" sz="2600" b="1" i="0" u="none" strike="noStrike" baseline="0" dirty="0">
+                <a:solidFill>
+                  <a:srgbClr val="000000"/>
+                </a:solidFill>
+                <a:latin typeface="TH Sarabun New" panose="020B0500040200020003" pitchFamily="34" charset="-34"/>
+                <a:cs typeface="TH Sarabun New" panose="020B0500040200020003" pitchFamily="34" charset="-34"/>
+              </a:rPr>
+              <a:t> </a:t>
+            </a:r>
+            <a:endParaRPr lang="en-US" sz="2600" dirty="0"/>
+          </a:p>
+        </p:txBody>
+      </p:sp>
+      <p:sp>
+        <p:nvSpPr>
+          <p:cNvPr id="10" name="TextBox 9">
+            <a:extLst>
+              <a:ext uri="{FF2B5EF4-FFF2-40B4-BE49-F238E27FC236}">
+                <a16:creationId xmlns:a16="http://schemas.microsoft.com/office/drawing/2014/main" id="{01559C9F-1F20-D847-DA2B-252E3E6C5165}"/>
+              </a:ext>
+            </a:extLst>
+          </p:cNvPr>
+          <p:cNvSpPr txBox="1"/>
+          <p:nvPr/>
+        </p:nvSpPr>
+        <p:spPr>
+          <a:xfrm>
+            <a:off x="2598423" y="5082642"/>
+            <a:ext cx="7120835" cy="492443"/>
+          </a:xfrm>
+          <a:prstGeom prst="rect">
+            <a:avLst/>
+          </a:prstGeom>
+          <a:noFill/>
+        </p:spPr>
+        <p:txBody>
+          <a:bodyPr wrap="square">
+            <a:spAutoFit/>
+          </a:bodyPr>
+          <a:lstStyle/>
+          <a:p>
+            <a:r>
+              <a:rPr lang="en-US" sz="2600" b="1" i="0" u="none" strike="noStrike" baseline="0" dirty="0">
+                <a:solidFill>
+                  <a:srgbClr val="000000"/>
+                </a:solidFill>
+                <a:latin typeface="TH Sarabun New" panose="020B0500040200020003" pitchFamily="34" charset="-34"/>
+                <a:cs typeface="TH Sarabun New" panose="020B0500040200020003" pitchFamily="34" charset="-34"/>
+              </a:rPr>
+              <a:t>Apache Airflow </a:t>
+            </a:r>
+            <a:r>
+              <a:rPr lang="th-TH" sz="2600" b="0" i="0" u="none" strike="noStrike" baseline="0" dirty="0">
+                <a:solidFill>
+                  <a:srgbClr val="000000"/>
+                </a:solidFill>
+                <a:latin typeface="TH Sarabun New" panose="020B0500040200020003" pitchFamily="34" charset="-34"/>
+                <a:cs typeface="TH Sarabun New" panose="020B0500040200020003" pitchFamily="34" charset="-34"/>
+              </a:rPr>
+              <a:t>แพลตฟอร์มสำหรับการสร้าง</a:t>
+            </a:r>
+            <a:r>
+              <a:rPr lang="en-US" sz="2600" b="0" i="0" u="none" strike="noStrike" baseline="0" dirty="0">
+                <a:solidFill>
+                  <a:srgbClr val="000000"/>
+                </a:solidFill>
+                <a:latin typeface="TH Sarabun New" panose="020B0500040200020003" pitchFamily="34" charset="-34"/>
+                <a:cs typeface="TH Sarabun New" panose="020B0500040200020003" pitchFamily="34" charset="-34"/>
+              </a:rPr>
+              <a:t> </a:t>
+            </a:r>
+            <a:r>
+              <a:rPr lang="th-TH" sz="2600" b="0" i="0" u="none" strike="noStrike" baseline="0" dirty="0">
+                <a:solidFill>
+                  <a:srgbClr val="000000"/>
+                </a:solidFill>
+                <a:latin typeface="TH Sarabun New" panose="020B0500040200020003" pitchFamily="34" charset="-34"/>
+                <a:cs typeface="TH Sarabun New" panose="020B0500040200020003" pitchFamily="34" charset="-34"/>
+              </a:rPr>
+              <a:t>จัดการ</a:t>
+            </a:r>
+            <a:r>
+              <a:rPr lang="en-US" sz="2600" b="0" i="0" u="none" strike="noStrike" baseline="0" dirty="0">
+                <a:solidFill>
+                  <a:srgbClr val="000000"/>
+                </a:solidFill>
+                <a:latin typeface="TH Sarabun New" panose="020B0500040200020003" pitchFamily="34" charset="-34"/>
+                <a:cs typeface="TH Sarabun New" panose="020B0500040200020003" pitchFamily="34" charset="-34"/>
+              </a:rPr>
+              <a:t> </a:t>
+            </a:r>
+            <a:r>
+              <a:rPr lang="th-TH" sz="2600" b="0" i="0" u="none" strike="noStrike" baseline="0" dirty="0">
+                <a:solidFill>
+                  <a:srgbClr val="000000"/>
+                </a:solidFill>
+                <a:latin typeface="TH Sarabun New" panose="020B0500040200020003" pitchFamily="34" charset="-34"/>
+                <a:cs typeface="TH Sarabun New" panose="020B0500040200020003" pitchFamily="34" charset="-34"/>
+              </a:rPr>
+              <a:t>ติดตาม </a:t>
+            </a:r>
+            <a:r>
+              <a:rPr lang="en-US" sz="2600" b="0" i="0" u="none" strike="noStrike" baseline="0" dirty="0">
+                <a:solidFill>
+                  <a:srgbClr val="000000"/>
+                </a:solidFill>
+                <a:latin typeface="TH Sarabun New" panose="020B0500040200020003" pitchFamily="34" charset="-34"/>
+                <a:cs typeface="TH Sarabun New" panose="020B0500040200020003" pitchFamily="34" charset="-34"/>
+              </a:rPr>
+              <a:t>Workflow </a:t>
+            </a:r>
+            <a:r>
+              <a:rPr lang="en-US" sz="2600" b="1" i="0" u="none" strike="noStrike" baseline="0" dirty="0">
+                <a:solidFill>
+                  <a:srgbClr val="000000"/>
+                </a:solidFill>
+                <a:latin typeface="TH Sarabun New" panose="020B0500040200020003" pitchFamily="34" charset="-34"/>
+                <a:cs typeface="TH Sarabun New" panose="020B0500040200020003" pitchFamily="34" charset="-34"/>
+              </a:rPr>
+              <a:t> </a:t>
+            </a:r>
+            <a:endParaRPr lang="en-US" sz="2600" dirty="0"/>
+          </a:p>
+        </p:txBody>
+      </p:sp>
+      <p:pic>
+        <p:nvPicPr>
+          <p:cNvPr id="4" name="Picture 3" descr="A colorful circle with a black background&#10;&#10;Description automatically generated">
+            <a:extLst>
+              <a:ext uri="{FF2B5EF4-FFF2-40B4-BE49-F238E27FC236}">
+                <a16:creationId xmlns:a16="http://schemas.microsoft.com/office/drawing/2014/main" id="{663CE4D3-BB06-55F0-A3FD-AC8FAECE48BC}"/>
+              </a:ext>
+            </a:extLst>
+          </p:cNvPr>
+          <p:cNvPicPr>
+            <a:picLocks noChangeAspect="1"/>
+          </p:cNvPicPr>
+          <p:nvPr/>
+        </p:nvPicPr>
+        <p:blipFill>
+          <a:blip r:embed="rId2">
+            <a:extLst>
+              <a:ext uri="{28A0092B-C50C-407E-A947-70E740481C1C}">
+                <a14:useLocalDpi xmlns:a14="http://schemas.microsoft.com/office/drawing/2010/main" val="0"/>
+              </a:ext>
+            </a:extLst>
+          </a:blip>
+          <a:stretch>
+            <a:fillRect/>
+          </a:stretch>
+        </p:blipFill>
+        <p:spPr>
+          <a:xfrm>
+            <a:off x="592340" y="1392819"/>
+            <a:ext cx="1508795" cy="1508795"/>
+          </a:xfrm>
+          <a:prstGeom prst="rect">
+            <a:avLst/>
+          </a:prstGeom>
+        </p:spPr>
+      </p:pic>
+      <p:pic>
+        <p:nvPicPr>
+          <p:cNvPr id="8" name="Picture 7" descr="A close up of a logo&#10;&#10;Description automatically generated">
+            <a:extLst>
+              <a:ext uri="{FF2B5EF4-FFF2-40B4-BE49-F238E27FC236}">
+                <a16:creationId xmlns:a16="http://schemas.microsoft.com/office/drawing/2014/main" id="{D481668D-3EF4-A6A2-EB2F-9A02A9A60382}"/>
+              </a:ext>
+            </a:extLst>
+          </p:cNvPr>
+          <p:cNvPicPr>
+            <a:picLocks noChangeAspect="1"/>
+          </p:cNvPicPr>
+          <p:nvPr/>
+        </p:nvPicPr>
+        <p:blipFill>
+          <a:blip r:embed="rId3">
+            <a:extLst>
+              <a:ext uri="{28A0092B-C50C-407E-A947-70E740481C1C}">
+                <a14:useLocalDpi xmlns:a14="http://schemas.microsoft.com/office/drawing/2010/main" val="0"/>
+              </a:ext>
+            </a:extLst>
+          </a:blip>
+          <a:stretch>
+            <a:fillRect/>
+          </a:stretch>
+        </p:blipFill>
+        <p:spPr>
+          <a:xfrm>
+            <a:off x="0" y="3429000"/>
+            <a:ext cx="2693478" cy="970599"/>
+          </a:xfrm>
+          <a:prstGeom prst="rect">
+            <a:avLst/>
+          </a:prstGeom>
+        </p:spPr>
+      </p:pic>
+      <p:pic>
+        <p:nvPicPr>
+          <p:cNvPr id="11" name="Picture 10" descr="A logo with text on it&#10;&#10;Description automatically generated">
+            <a:extLst>
+              <a:ext uri="{FF2B5EF4-FFF2-40B4-BE49-F238E27FC236}">
+                <a16:creationId xmlns:a16="http://schemas.microsoft.com/office/drawing/2014/main" id="{D7CDCD1C-EC37-394F-B0DE-4F6FB694D6AF}"/>
+              </a:ext>
+            </a:extLst>
+          </p:cNvPr>
+          <p:cNvPicPr>
+            <a:picLocks noChangeAspect="1"/>
+          </p:cNvPicPr>
+          <p:nvPr/>
+        </p:nvPicPr>
+        <p:blipFill>
+          <a:blip r:embed="rId4">
+            <a:extLst>
+              <a:ext uri="{28A0092B-C50C-407E-A947-70E740481C1C}">
+                <a14:useLocalDpi xmlns:a14="http://schemas.microsoft.com/office/drawing/2010/main" val="0"/>
+              </a:ext>
+            </a:extLst>
+          </a:blip>
+          <a:stretch>
+            <a:fillRect/>
+          </a:stretch>
+        </p:blipFill>
+        <p:spPr>
+          <a:xfrm>
+            <a:off x="277208" y="4915689"/>
+            <a:ext cx="2139061" cy="826348"/>
+          </a:xfrm>
+          <a:prstGeom prst="rect">
+            <a:avLst/>
+          </a:prstGeom>
+        </p:spPr>
+      </p:pic>
+      <p:sp>
+        <p:nvSpPr>
+          <p:cNvPr id="12" name="Title 3">
+            <a:extLst>
+              <a:ext uri="{FF2B5EF4-FFF2-40B4-BE49-F238E27FC236}">
+                <a16:creationId xmlns:a16="http://schemas.microsoft.com/office/drawing/2014/main" id="{0428DEA1-F1F7-474F-D382-7014E2890BCB}"/>
+              </a:ext>
+            </a:extLst>
+          </p:cNvPr>
+          <p:cNvSpPr txBox="1">
+            <a:spLocks/>
+          </p:cNvSpPr>
+          <p:nvPr/>
+        </p:nvSpPr>
+        <p:spPr>
+          <a:xfrm>
+            <a:off x="0" y="0"/>
+            <a:ext cx="7139354" cy="494402"/>
+          </a:xfrm>
+          <a:prstGeom prst="rect">
+            <a:avLst/>
+          </a:prstGeom>
+        </p:spPr>
+        <p:txBody>
+          <a:bodyPr vert="horz" lIns="91440" tIns="45720" rIns="91440" bIns="45720" rtlCol="0" anchor="t">
+            <a:normAutofit/>
+          </a:bodyPr>
+          <a:lstStyle>
+            <a:lvl1pPr algn="l" defTabSz="457200" rtl="0" eaLnBrk="1" latinLnBrk="0" hangingPunct="1">
+              <a:spcBef>
+                <a:spcPct val="0"/>
+              </a:spcBef>
+              <a:buNone/>
+              <a:defRPr sz="3600" kern="1200">
+                <a:solidFill>
+                  <a:schemeClr val="accent1"/>
+                </a:solidFill>
+                <a:latin typeface="+mj-lt"/>
+                <a:ea typeface="+mj-ea"/>
+                <a:cs typeface="+mj-cs"/>
+              </a:defRPr>
+            </a:lvl1pPr>
+            <a:lvl2pPr eaLnBrk="1" hangingPunct="1">
+              <a:defRPr>
+                <a:solidFill>
+                  <a:schemeClr val="tx2"/>
+                </a:solidFill>
+              </a:defRPr>
+            </a:lvl2pPr>
+            <a:lvl3pPr eaLnBrk="1" hangingPunct="1">
+              <a:defRPr>
+                <a:solidFill>
+                  <a:schemeClr val="tx2"/>
+                </a:solidFill>
+              </a:defRPr>
+            </a:lvl3pPr>
+            <a:lvl4pPr eaLnBrk="1" hangingPunct="1">
+              <a:defRPr>
+                <a:solidFill>
+                  <a:schemeClr val="tx2"/>
+                </a:solidFill>
+              </a:defRPr>
+            </a:lvl4pPr>
+            <a:lvl5pPr eaLnBrk="1" hangingPunct="1">
+              <a:defRPr>
+                <a:solidFill>
+                  <a:schemeClr val="tx2"/>
+                </a:solidFill>
+              </a:defRPr>
+            </a:lvl5pPr>
+            <a:lvl6pPr eaLnBrk="1" hangingPunct="1">
+              <a:defRPr>
+                <a:solidFill>
+                  <a:schemeClr val="tx2"/>
+                </a:solidFill>
+              </a:defRPr>
+            </a:lvl6pPr>
+            <a:lvl7pPr eaLnBrk="1" hangingPunct="1">
+              <a:defRPr>
+                <a:solidFill>
+                  <a:schemeClr val="tx2"/>
+                </a:solidFill>
+              </a:defRPr>
+            </a:lvl7pPr>
+            <a:lvl8pPr eaLnBrk="1" hangingPunct="1">
+              <a:defRPr>
+                <a:solidFill>
+                  <a:schemeClr val="tx2"/>
+                </a:solidFill>
+              </a:defRPr>
+            </a:lvl8pPr>
+            <a:lvl9pPr eaLnBrk="1" hangingPunct="1">
+              <a:defRPr>
+                <a:solidFill>
+                  <a:schemeClr val="tx2"/>
+                </a:solidFill>
+              </a:defRPr>
+            </a:lvl9pPr>
+          </a:lstStyle>
+          <a:p>
+            <a:r>
+              <a:rPr lang="en-US" sz="2600" b="1" dirty="0">
+                <a:solidFill>
+                  <a:schemeClr val="tx1"/>
+                </a:solidFill>
+                <a:latin typeface="TH Sarabun New" panose="020B0500040200020003" pitchFamily="34" charset="-34"/>
+                <a:cs typeface="TH Sarabun New" panose="020B0500040200020003" pitchFamily="34" charset="-34"/>
+              </a:rPr>
+              <a:t>2</a:t>
+            </a:r>
+            <a:r>
+              <a:rPr lang="th-TH" sz="2600" b="1" dirty="0">
+                <a:solidFill>
+                  <a:schemeClr val="tx1"/>
+                </a:solidFill>
+                <a:latin typeface="TH Sarabun New" panose="020B0500040200020003" pitchFamily="34" charset="-34"/>
+                <a:cs typeface="TH Sarabun New" panose="020B0500040200020003" pitchFamily="34" charset="-34"/>
+              </a:rPr>
+              <a:t>.ทฤษฎีที่เกี่ยวข้อง</a:t>
+            </a:r>
+            <a:endParaRPr lang="en-US" sz="2600" b="1" dirty="0">
+              <a:solidFill>
+                <a:schemeClr val="tx1"/>
+              </a:solidFill>
+            </a:endParaRPr>
+          </a:p>
+        </p:txBody>
+      </p:sp>
+      <p:sp>
+        <p:nvSpPr>
+          <p:cNvPr id="2" name="Slide Number Placeholder 1">
+            <a:extLst>
+              <a:ext uri="{FF2B5EF4-FFF2-40B4-BE49-F238E27FC236}">
+                <a16:creationId xmlns:a16="http://schemas.microsoft.com/office/drawing/2014/main" id="{8868B7D4-0133-C2CC-95D5-DC8BFAC33714}"/>
+              </a:ext>
+            </a:extLst>
+          </p:cNvPr>
+          <p:cNvSpPr>
+            <a:spLocks noGrp="1"/>
+          </p:cNvSpPr>
+          <p:nvPr>
+            <p:ph type="sldNum" sz="quarter" idx="12"/>
+          </p:nvPr>
+        </p:nvSpPr>
+        <p:spPr/>
+        <p:txBody>
+          <a:bodyPr/>
+          <a:lstStyle/>
+          <a:p>
+            <a:fld id="{9BEC6E05-063F-46C1-9253-25489D268387}" type="slidenum">
+              <a:rPr lang="en-US" smtClean="0"/>
+              <a:t>11</a:t>
+            </a:fld>
+            <a:endParaRPr lang="en-US"/>
+          </a:p>
+        </p:txBody>
+      </p:sp>
+    </p:spTree>
+    <p:extLst>
+      <p:ext uri="{BB962C8B-B14F-4D97-AF65-F5344CB8AC3E}">
+        <p14:creationId xmlns:p14="http://schemas.microsoft.com/office/powerpoint/2010/main" val="1965070930"/>
+      </p:ext>
+    </p:extLst>
+  </p:cSld>
+  <p:clrMapOvr>
+    <a:masterClrMapping/>
+  </p:clrMapOvr>
+</p:sld>
+</file>
+
+<file path=ppt/slides/slide12.xml><?xml version="1.0" encoding="utf-8"?>
 <p:sld xmlns:a="http://schemas.openxmlformats.org/drawingml/2006/main" xmlns:r="http://schemas.openxmlformats.org/officeDocument/2006/relationships" xmlns:p="http://schemas.openxmlformats.org/presentationml/2006/main">
   <p:cSld>
     <p:spTree>
@@ -7114,7 +8369,7 @@
           <a:p>
             <a:fld id="{9BEC6E05-063F-46C1-9253-25489D268387}" type="slidenum">
               <a:rPr lang="en-US" smtClean="0"/>
-              <a:t>10</a:t>
+              <a:t>12</a:t>
             </a:fld>
             <a:endParaRPr lang="en-US"/>
           </a:p>
@@ -7133,7 +8388,7 @@
 </p:sld>
 </file>
 
-<file path=ppt/slides/slide11.xml><?xml version="1.0" encoding="utf-8"?>
+<file path=ppt/slides/slide13.xml><?xml version="1.0" encoding="utf-8"?>
 <p:sld xmlns:a="http://schemas.openxmlformats.org/drawingml/2006/main" xmlns:r="http://schemas.openxmlformats.org/officeDocument/2006/relationships" xmlns:p="http://schemas.openxmlformats.org/presentationml/2006/main">
   <p:cSld>
     <p:spTree>
@@ -7642,7 +8897,7 @@
           <a:p>
             <a:fld id="{9BEC6E05-063F-46C1-9253-25489D268387}" type="slidenum">
               <a:rPr lang="en-US" smtClean="0"/>
-              <a:t>11</a:t>
+              <a:t>13</a:t>
             </a:fld>
             <a:endParaRPr lang="en-US"/>
           </a:p>
@@ -7661,7 +8916,7 @@
 </p:sld>
 </file>
 
-<file path=ppt/slides/slide12.xml><?xml version="1.0" encoding="utf-8"?>
+<file path=ppt/slides/slide14.xml><?xml version="1.0" encoding="utf-8"?>
 <p:sld xmlns:a="http://schemas.openxmlformats.org/drawingml/2006/main" xmlns:r="http://schemas.openxmlformats.org/officeDocument/2006/relationships" xmlns:p="http://schemas.openxmlformats.org/presentationml/2006/main">
   <p:cSld>
     <p:spTree>
@@ -7998,7 +9253,7 @@
           <a:p>
             <a:fld id="{9BEC6E05-063F-46C1-9253-25489D268387}" type="slidenum">
               <a:rPr lang="en-US" smtClean="0"/>
-              <a:t>12</a:t>
+              <a:t>14</a:t>
             </a:fld>
             <a:endParaRPr lang="en-US"/>
           </a:p>
@@ -8017,7 +9272,7 @@
 </p:sld>
 </file>
 
-<file path=ppt/slides/slide13.xml><?xml version="1.0" encoding="utf-8"?>
+<file path=ppt/slides/slide15.xml><?xml version="1.0" encoding="utf-8"?>
 <p:sld xmlns:a="http://schemas.openxmlformats.org/drawingml/2006/main" xmlns:r="http://schemas.openxmlformats.org/officeDocument/2006/relationships" xmlns:p="http://schemas.openxmlformats.org/presentationml/2006/main">
   <p:cSld>
     <p:spTree>
@@ -8351,7 +9606,7 @@
           <a:p>
             <a:fld id="{9BEC6E05-063F-46C1-9253-25489D268387}" type="slidenum">
               <a:rPr lang="en-US" smtClean="0"/>
-              <a:t>13</a:t>
+              <a:t>15</a:t>
             </a:fld>
             <a:endParaRPr lang="en-US"/>
           </a:p>
@@ -8370,7 +9625,7 @@
 </p:sld>
 </file>
 
-<file path=ppt/slides/slide14.xml><?xml version="1.0" encoding="utf-8"?>
+<file path=ppt/slides/slide16.xml><?xml version="1.0" encoding="utf-8"?>
 <p:sld xmlns:a="http://schemas.openxmlformats.org/drawingml/2006/main" xmlns:r="http://schemas.openxmlformats.org/officeDocument/2006/relationships" xmlns:p="http://schemas.openxmlformats.org/presentationml/2006/main">
   <p:cSld>
     <p:spTree>
@@ -8655,7 +9910,7 @@
           <a:p>
             <a:fld id="{9BEC6E05-063F-46C1-9253-25489D268387}" type="slidenum">
               <a:rPr lang="en-US" smtClean="0"/>
-              <a:t>14</a:t>
+              <a:t>16</a:t>
             </a:fld>
             <a:endParaRPr lang="en-US"/>
           </a:p>
@@ -8674,7 +9929,7 @@
 </p:sld>
 </file>
 
-<file path=ppt/slides/slide15.xml><?xml version="1.0" encoding="utf-8"?>
+<file path=ppt/slides/slide17.xml><?xml version="1.0" encoding="utf-8"?>
 <p:sld xmlns:a="http://schemas.openxmlformats.org/drawingml/2006/main" xmlns:r="http://schemas.openxmlformats.org/officeDocument/2006/relationships" xmlns:p="http://schemas.openxmlformats.org/presentationml/2006/main">
   <p:cSld>
     <p:spTree>
@@ -9060,14 +10315,14 @@
                     <a:p>
                       <a:pPr algn="l" fontAlgn="ctr"/>
                       <a:r>
-                        <a:rPr lang="th-TH" sz="2600" u="none" strike="noStrike">
+                        <a:rPr lang="th-TH" sz="2600" u="none" strike="noStrike" dirty="0">
                           <a:effectLst/>
                           <a:latin typeface="TH Sarabun New" panose="020B0500040200020003" pitchFamily="34" charset="-34"/>
                           <a:cs typeface="TH Sarabun New" panose="020B0500040200020003" pitchFamily="34" charset="-34"/>
                         </a:rPr>
                         <a:t>แบ่งข้อมูลเป็นส่วนย่อยเพื่อกระจายโหลด</a:t>
                       </a:r>
-                      <a:endParaRPr lang="th-TH" sz="2600" b="0" i="0" u="none" strike="noStrike">
+                      <a:endParaRPr lang="th-TH" sz="2600" b="0" i="0" u="none" strike="noStrike" dirty="0">
                         <a:solidFill>
                           <a:srgbClr val="000000"/>
                         </a:solidFill>
@@ -9319,7 +10574,7 @@
           <a:p>
             <a:fld id="{9BEC6E05-063F-46C1-9253-25489D268387}" type="slidenum">
               <a:rPr lang="en-US" smtClean="0"/>
-              <a:t>15</a:t>
+              <a:t>17</a:t>
             </a:fld>
             <a:endParaRPr lang="en-US"/>
           </a:p>
@@ -9338,7 +10593,7 @@
 </p:sld>
 </file>
 
-<file path=ppt/slides/slide16.xml><?xml version="1.0" encoding="utf-8"?>
+<file path=ppt/slides/slide18.xml><?xml version="1.0" encoding="utf-8"?>
 <p:sld xmlns:a="http://schemas.openxmlformats.org/drawingml/2006/main" xmlns:r="http://schemas.openxmlformats.org/officeDocument/2006/relationships" xmlns:p="http://schemas.openxmlformats.org/presentationml/2006/main">
   <p:cSld>
     <p:spTree>
@@ -9410,10 +10665,10 @@
       </p:sp>
       <p:grpSp>
         <p:nvGrpSpPr>
-          <p:cNvPr id="13" name="Group 12">
+          <p:cNvPr id="15" name="Group 14">
             <a:extLst>
               <a:ext uri="{FF2B5EF4-FFF2-40B4-BE49-F238E27FC236}">
-                <a16:creationId xmlns:a16="http://schemas.microsoft.com/office/drawing/2014/main" id="{28FC4DC6-51FC-BA29-9735-4B18572F930F}"/>
+                <a16:creationId xmlns:a16="http://schemas.microsoft.com/office/drawing/2014/main" id="{FF7CED23-408B-931C-0C94-C74BFA165A13}"/>
               </a:ext>
             </a:extLst>
           </p:cNvPr>
@@ -9594,162 +10849,6 @@
         </p:sp>
         <p:sp>
           <p:nvSpPr>
-            <p:cNvPr id="7" name="Rectangle 6">
-              <a:extLst>
-                <a:ext uri="{FF2B5EF4-FFF2-40B4-BE49-F238E27FC236}">
-                  <a16:creationId xmlns:a16="http://schemas.microsoft.com/office/drawing/2014/main" id="{36E40844-7FCF-D8F6-B982-7B73A0EA3801}"/>
-                </a:ext>
-              </a:extLst>
-            </p:cNvPr>
-            <p:cNvSpPr/>
-            <p:nvPr/>
-          </p:nvSpPr>
-          <p:spPr>
-            <a:xfrm>
-              <a:off x="2020956" y="2009058"/>
-              <a:ext cx="3041373" cy="754020"/>
-            </a:xfrm>
-            <a:prstGeom prst="rect">
-              <a:avLst/>
-            </a:prstGeom>
-            <a:noFill/>
-            <a:ln>
-              <a:solidFill>
-                <a:srgbClr val="FFFF00"/>
-              </a:solidFill>
-            </a:ln>
-          </p:spPr>
-          <p:style>
-            <a:lnRef idx="2">
-              <a:schemeClr val="accent1">
-                <a:shade val="15000"/>
-              </a:schemeClr>
-            </a:lnRef>
-            <a:fillRef idx="1">
-              <a:schemeClr val="accent1"/>
-            </a:fillRef>
-            <a:effectRef idx="0">
-              <a:schemeClr val="accent1"/>
-            </a:effectRef>
-            <a:fontRef idx="minor">
-              <a:schemeClr val="lt1"/>
-            </a:fontRef>
-          </p:style>
-          <p:txBody>
-            <a:bodyPr rtlCol="0" anchor="ctr"/>
-            <a:lstStyle/>
-            <a:p>
-              <a:pPr algn="ctr"/>
-              <a:endParaRPr lang="en-US"/>
-            </a:p>
-          </p:txBody>
-        </p:sp>
-        <p:sp>
-          <p:nvSpPr>
-            <p:cNvPr id="8" name="Rectangle 7">
-              <a:extLst>
-                <a:ext uri="{FF2B5EF4-FFF2-40B4-BE49-F238E27FC236}">
-                  <a16:creationId xmlns:a16="http://schemas.microsoft.com/office/drawing/2014/main" id="{3FE66DA3-BB29-DF27-EED1-DB681556E21B}"/>
-                </a:ext>
-              </a:extLst>
-            </p:cNvPr>
-            <p:cNvSpPr/>
-            <p:nvPr/>
-          </p:nvSpPr>
-          <p:spPr>
-            <a:xfrm>
-              <a:off x="4378060" y="3511269"/>
-              <a:ext cx="1187853" cy="221439"/>
-            </a:xfrm>
-            <a:prstGeom prst="rect">
-              <a:avLst/>
-            </a:prstGeom>
-            <a:noFill/>
-            <a:ln>
-              <a:solidFill>
-                <a:srgbClr val="FFFF00"/>
-              </a:solidFill>
-            </a:ln>
-          </p:spPr>
-          <p:style>
-            <a:lnRef idx="2">
-              <a:schemeClr val="accent1">
-                <a:shade val="15000"/>
-              </a:schemeClr>
-            </a:lnRef>
-            <a:fillRef idx="1">
-              <a:schemeClr val="accent1"/>
-            </a:fillRef>
-            <a:effectRef idx="0">
-              <a:schemeClr val="accent1"/>
-            </a:effectRef>
-            <a:fontRef idx="minor">
-              <a:schemeClr val="lt1"/>
-            </a:fontRef>
-          </p:style>
-          <p:txBody>
-            <a:bodyPr rtlCol="0" anchor="ctr"/>
-            <a:lstStyle/>
-            <a:p>
-              <a:pPr algn="ctr"/>
-              <a:endParaRPr lang="en-US"/>
-            </a:p>
-          </p:txBody>
-        </p:sp>
-        <p:sp>
-          <p:nvSpPr>
-            <p:cNvPr id="9" name="Rectangle 8">
-              <a:extLst>
-                <a:ext uri="{FF2B5EF4-FFF2-40B4-BE49-F238E27FC236}">
-                  <a16:creationId xmlns:a16="http://schemas.microsoft.com/office/drawing/2014/main" id="{0F3FFCF4-DCEB-1DA5-06EC-F20E6CE92C82}"/>
-                </a:ext>
-              </a:extLst>
-            </p:cNvPr>
-            <p:cNvSpPr/>
-            <p:nvPr/>
-          </p:nvSpPr>
-          <p:spPr>
-            <a:xfrm>
-              <a:off x="2020956" y="3094384"/>
-              <a:ext cx="1822174" cy="185530"/>
-            </a:xfrm>
-            <a:prstGeom prst="rect">
-              <a:avLst/>
-            </a:prstGeom>
-            <a:noFill/>
-            <a:ln>
-              <a:solidFill>
-                <a:srgbClr val="0070C0"/>
-              </a:solidFill>
-            </a:ln>
-          </p:spPr>
-          <p:style>
-            <a:lnRef idx="2">
-              <a:schemeClr val="accent1">
-                <a:shade val="15000"/>
-              </a:schemeClr>
-            </a:lnRef>
-            <a:fillRef idx="1">
-              <a:schemeClr val="accent1"/>
-            </a:fillRef>
-            <a:effectRef idx="0">
-              <a:schemeClr val="accent1"/>
-            </a:effectRef>
-            <a:fontRef idx="minor">
-              <a:schemeClr val="lt1"/>
-            </a:fontRef>
-          </p:style>
-          <p:txBody>
-            <a:bodyPr rtlCol="0" anchor="ctr"/>
-            <a:lstStyle/>
-            <a:p>
-              <a:pPr algn="ctr"/>
-              <a:endParaRPr lang="en-US"/>
-            </a:p>
-          </p:txBody>
-        </p:sp>
-        <p:sp>
-          <p:nvSpPr>
             <p:cNvPr id="11" name="Rectangle 10">
               <a:extLst>
                 <a:ext uri="{FF2B5EF4-FFF2-40B4-BE49-F238E27FC236}">
@@ -9876,7 +10975,7 @@
           <a:p>
             <a:fld id="{9BEC6E05-063F-46C1-9253-25489D268387}" type="slidenum">
               <a:rPr lang="en-US" smtClean="0"/>
-              <a:t>16</a:t>
+              <a:t>18</a:t>
             </a:fld>
             <a:endParaRPr lang="en-US"/>
           </a:p>
@@ -9895,7 +10994,7 @@
 </p:sld>
 </file>
 
-<file path=ppt/slides/slide17.xml><?xml version="1.0" encoding="utf-8"?>
+<file path=ppt/slides/slide19.xml><?xml version="1.0" encoding="utf-8"?>
 <p:sld xmlns:a="http://schemas.openxmlformats.org/drawingml/2006/main" xmlns:r="http://schemas.openxmlformats.org/officeDocument/2006/relationships" xmlns:p="http://schemas.openxmlformats.org/presentationml/2006/main">
   <p:cSld>
     <p:spTree>
@@ -10055,7 +11154,7 @@
           <a:p>
             <a:fld id="{9BEC6E05-063F-46C1-9253-25489D268387}" type="slidenum">
               <a:rPr lang="en-US" smtClean="0"/>
-              <a:t>17</a:t>
+              <a:t>19</a:t>
             </a:fld>
             <a:endParaRPr lang="en-US"/>
           </a:p>
@@ -10065,637 +11164,6 @@
     <p:extLst>
       <p:ext uri="{BB962C8B-B14F-4D97-AF65-F5344CB8AC3E}">
         <p14:creationId xmlns:p14="http://schemas.microsoft.com/office/powerpoint/2010/main" val="4088465143"/>
-      </p:ext>
-    </p:extLst>
-  </p:cSld>
-  <p:clrMapOvr>
-    <a:masterClrMapping/>
-  </p:clrMapOvr>
-</p:sld>
-</file>
-
-<file path=ppt/slides/slide18.xml><?xml version="1.0" encoding="utf-8"?>
-<p:sld xmlns:a="http://schemas.openxmlformats.org/drawingml/2006/main" xmlns:r="http://schemas.openxmlformats.org/officeDocument/2006/relationships" xmlns:p="http://schemas.openxmlformats.org/presentationml/2006/main">
-  <p:cSld>
-    <p:spTree>
-      <p:nvGrpSpPr>
-        <p:cNvPr id="1" name="">
-          <a:extLst>
-            <a:ext uri="{FF2B5EF4-FFF2-40B4-BE49-F238E27FC236}">
-              <a16:creationId xmlns:a16="http://schemas.microsoft.com/office/drawing/2014/main" id="{BE4D9706-BA24-A2E7-B363-2ACFA8B814AE}"/>
-            </a:ext>
-          </a:extLst>
-        </p:cNvPr>
-        <p:cNvGrpSpPr/>
-        <p:nvPr/>
-      </p:nvGrpSpPr>
-      <p:grpSpPr>
-        <a:xfrm>
-          <a:off x="0" y="0"/>
-          <a:ext cx="0" cy="0"/>
-          <a:chOff x="0" y="0"/>
-          <a:chExt cx="0" cy="0"/>
-        </a:xfrm>
-      </p:grpSpPr>
-      <p:sp>
-        <p:nvSpPr>
-          <p:cNvPr id="4" name="Title 3">
-            <a:extLst>
-              <a:ext uri="{FF2B5EF4-FFF2-40B4-BE49-F238E27FC236}">
-                <a16:creationId xmlns:a16="http://schemas.microsoft.com/office/drawing/2014/main" id="{87EF514D-63E9-302C-EBB3-9CE0A03BD7AD}"/>
-              </a:ext>
-            </a:extLst>
-          </p:cNvPr>
-          <p:cNvSpPr>
-            <a:spLocks noGrp="1"/>
-          </p:cNvSpPr>
-          <p:nvPr>
-            <p:ph type="ctrTitle"/>
-          </p:nvPr>
-        </p:nvSpPr>
-        <p:spPr>
-          <a:xfrm>
-            <a:off x="0" y="0"/>
-            <a:ext cx="7139354" cy="494402"/>
-          </a:xfrm>
-        </p:spPr>
-        <p:txBody>
-          <a:bodyPr>
-            <a:normAutofit/>
-          </a:bodyPr>
-          <a:lstStyle/>
-          <a:p>
-            <a:pPr algn="l"/>
-            <a:r>
-              <a:rPr lang="th-TH" sz="2600" b="1" i="0" u="none" strike="noStrike" baseline="0" dirty="0">
-                <a:solidFill>
-                  <a:schemeClr val="tx1"/>
-                </a:solidFill>
-                <a:latin typeface="TH Sarabun New" panose="020B0500040200020003" pitchFamily="34" charset="-34"/>
-                <a:cs typeface="TH Sarabun New" panose="020B0500040200020003" pitchFamily="34" charset="-34"/>
-              </a:rPr>
-              <a:t>6.ขอบเขตการวิจัย</a:t>
-            </a:r>
-            <a:endParaRPr lang="en-US" sz="2600" b="1" dirty="0">
-              <a:solidFill>
-                <a:schemeClr val="tx1"/>
-              </a:solidFill>
-            </a:endParaRPr>
-          </a:p>
-        </p:txBody>
-      </p:sp>
-      <p:sp>
-        <p:nvSpPr>
-          <p:cNvPr id="2" name="Rectangle 1">
-            <a:extLst>
-              <a:ext uri="{FF2B5EF4-FFF2-40B4-BE49-F238E27FC236}">
-                <a16:creationId xmlns:a16="http://schemas.microsoft.com/office/drawing/2014/main" id="{AA118285-7358-CD71-6EC7-B816A0E1C336}"/>
-              </a:ext>
-            </a:extLst>
-          </p:cNvPr>
-          <p:cNvSpPr/>
-          <p:nvPr/>
-        </p:nvSpPr>
-        <p:spPr>
-          <a:xfrm>
-            <a:off x="1444488" y="1331843"/>
-            <a:ext cx="8488016" cy="894522"/>
-          </a:xfrm>
-          <a:prstGeom prst="rect">
-            <a:avLst/>
-          </a:prstGeom>
-          <a:solidFill>
-            <a:schemeClr val="accent1">
-              <a:lumMod val="20000"/>
-              <a:lumOff val="80000"/>
-            </a:schemeClr>
-          </a:solidFill>
-        </p:spPr>
-        <p:style>
-          <a:lnRef idx="2">
-            <a:schemeClr val="accent1">
-              <a:shade val="15000"/>
-            </a:schemeClr>
-          </a:lnRef>
-          <a:fillRef idx="1">
-            <a:schemeClr val="accent1"/>
-          </a:fillRef>
-          <a:effectRef idx="0">
-            <a:schemeClr val="accent1"/>
-          </a:effectRef>
-          <a:fontRef idx="minor">
-            <a:schemeClr val="lt1"/>
-          </a:fontRef>
-        </p:style>
-        <p:txBody>
-          <a:bodyPr rtlCol="0" anchor="ctr"/>
-          <a:lstStyle/>
-          <a:p>
-            <a:endParaRPr lang="en-US" sz="2400" dirty="0">
-              <a:latin typeface="TH Sarabun New" panose="020B0500040200020003" pitchFamily="34" charset="-34"/>
-              <a:cs typeface="TH Sarabun New" panose="020B0500040200020003" pitchFamily="34" charset="-34"/>
-            </a:endParaRPr>
-          </a:p>
-          <a:p>
-            <a:r>
-              <a:rPr lang="en-US" sz="2400" dirty="0">
-                <a:solidFill>
-                  <a:schemeClr val="tx1"/>
-                </a:solidFill>
-                <a:latin typeface="TH Sarabun New" panose="020B0500040200020003" pitchFamily="34" charset="-34"/>
-                <a:cs typeface="TH Sarabun New" panose="020B0500040200020003" pitchFamily="34" charset="-34"/>
-              </a:rPr>
-              <a:t>1.ใช้ข้อมูล</a:t>
-            </a:r>
-            <a:r>
-              <a:rPr lang="th-TH" sz="2400" b="0" i="0" u="none" strike="noStrike" baseline="0" dirty="0">
-                <a:solidFill>
-                  <a:schemeClr val="tx1"/>
-                </a:solidFill>
-                <a:latin typeface="TH Sarabun New" panose="020B0500040200020003" pitchFamily="34" charset="-34"/>
-                <a:cs typeface="TH Sarabun New" panose="020B0500040200020003" pitchFamily="34" charset="-34"/>
-              </a:rPr>
-              <a:t>ค่าสัมประสิทธิ์การปล่อยก๊าซเรือนกระจก</a:t>
-            </a:r>
-            <a:r>
-              <a:rPr lang="en-US" sz="2400" dirty="0" err="1">
-                <a:solidFill>
-                  <a:schemeClr val="tx1"/>
-                </a:solidFill>
-                <a:latin typeface="TH Sarabun New" panose="020B0500040200020003" pitchFamily="34" charset="-34"/>
-                <a:cs typeface="TH Sarabun New" panose="020B0500040200020003" pitchFamily="34" charset="-34"/>
-              </a:rPr>
-              <a:t>ที่เผยแพร่โดย</a:t>
-            </a:r>
-            <a:r>
-              <a:rPr lang="en-US" sz="2400" dirty="0">
-                <a:solidFill>
-                  <a:schemeClr val="tx1"/>
-                </a:solidFill>
-                <a:latin typeface="TH Sarabun New" panose="020B0500040200020003" pitchFamily="34" charset="-34"/>
-                <a:cs typeface="TH Sarabun New" panose="020B0500040200020003" pitchFamily="34" charset="-34"/>
-              </a:rPr>
-              <a:t> </a:t>
-            </a:r>
-            <a:r>
-              <a:rPr lang="en-US" sz="2400" dirty="0" err="1">
-                <a:solidFill>
-                  <a:schemeClr val="tx1"/>
-                </a:solidFill>
-                <a:latin typeface="TH Sarabun New" panose="020B0500040200020003" pitchFamily="34" charset="-34"/>
-                <a:cs typeface="TH Sarabun New" panose="020B0500040200020003" pitchFamily="34" charset="-34"/>
-              </a:rPr>
-              <a:t>องค์การบริหารจัดการก๊าซเรือนกระจก</a:t>
-            </a:r>
-            <a:r>
-              <a:rPr lang="en-US" sz="2400" dirty="0">
-                <a:solidFill>
-                  <a:schemeClr val="tx1"/>
-                </a:solidFill>
-                <a:latin typeface="TH Sarabun New" panose="020B0500040200020003" pitchFamily="34" charset="-34"/>
-                <a:cs typeface="TH Sarabun New" panose="020B0500040200020003" pitchFamily="34" charset="-34"/>
-              </a:rPr>
-              <a:t> (</a:t>
-            </a:r>
-            <a:r>
-              <a:rPr lang="en-US" sz="2400" dirty="0" err="1">
-                <a:solidFill>
-                  <a:schemeClr val="tx1"/>
-                </a:solidFill>
-                <a:latin typeface="TH Sarabun New" panose="020B0500040200020003" pitchFamily="34" charset="-34"/>
-                <a:cs typeface="TH Sarabun New" panose="020B0500040200020003" pitchFamily="34" charset="-34"/>
-              </a:rPr>
-              <a:t>องค์การมหาชน</a:t>
-            </a:r>
-            <a:r>
-              <a:rPr lang="en-US" sz="2400" dirty="0">
-                <a:solidFill>
-                  <a:schemeClr val="tx1"/>
-                </a:solidFill>
-                <a:latin typeface="TH Sarabun New" panose="020B0500040200020003" pitchFamily="34" charset="-34"/>
-                <a:cs typeface="TH Sarabun New" panose="020B0500040200020003" pitchFamily="34" charset="-34"/>
-              </a:rPr>
-              <a:t>)</a:t>
-            </a:r>
-          </a:p>
-          <a:p>
-            <a:pPr algn="ctr"/>
-            <a:endParaRPr lang="en-US" sz="2400" dirty="0"/>
-          </a:p>
-        </p:txBody>
-      </p:sp>
-      <p:sp>
-        <p:nvSpPr>
-          <p:cNvPr id="5" name="Rectangle 4">
-            <a:extLst>
-              <a:ext uri="{FF2B5EF4-FFF2-40B4-BE49-F238E27FC236}">
-                <a16:creationId xmlns:a16="http://schemas.microsoft.com/office/drawing/2014/main" id="{959EE7A1-0399-D0BF-B905-89F1EC5F0480}"/>
-              </a:ext>
-            </a:extLst>
-          </p:cNvPr>
-          <p:cNvSpPr/>
-          <p:nvPr/>
-        </p:nvSpPr>
-        <p:spPr>
-          <a:xfrm>
-            <a:off x="1444487" y="2454965"/>
-            <a:ext cx="8488015" cy="608842"/>
-          </a:xfrm>
-          <a:prstGeom prst="rect">
-            <a:avLst/>
-          </a:prstGeom>
-          <a:solidFill>
-            <a:schemeClr val="accent2">
-              <a:lumMod val="20000"/>
-              <a:lumOff val="80000"/>
-            </a:schemeClr>
-          </a:solidFill>
-        </p:spPr>
-        <p:style>
-          <a:lnRef idx="2">
-            <a:schemeClr val="accent2">
-              <a:shade val="15000"/>
-            </a:schemeClr>
-          </a:lnRef>
-          <a:fillRef idx="1">
-            <a:schemeClr val="accent2"/>
-          </a:fillRef>
-          <a:effectRef idx="0">
-            <a:schemeClr val="accent2"/>
-          </a:effectRef>
-          <a:fontRef idx="minor">
-            <a:schemeClr val="lt1"/>
-          </a:fontRef>
-        </p:style>
-        <p:txBody>
-          <a:bodyPr rtlCol="0" anchor="ctr"/>
-          <a:lstStyle/>
-          <a:p>
-            <a:endParaRPr lang="en-US" sz="2600" dirty="0">
-              <a:latin typeface="TH Sarabun New" panose="020B0500040200020003" pitchFamily="34" charset="-34"/>
-              <a:cs typeface="TH Sarabun New" panose="020B0500040200020003" pitchFamily="34" charset="-34"/>
-            </a:endParaRPr>
-          </a:p>
-          <a:p>
-            <a:r>
-              <a:rPr lang="en-US" sz="2600" dirty="0">
-                <a:solidFill>
-                  <a:schemeClr val="tx1"/>
-                </a:solidFill>
-                <a:latin typeface="TH Sarabun New" panose="020B0500040200020003" pitchFamily="34" charset="-34"/>
-                <a:cs typeface="TH Sarabun New" panose="020B0500040200020003" pitchFamily="34" charset="-34"/>
-              </a:rPr>
-              <a:t>2.ออกแบบให้สืบค้นได้ทั้งภาษาไทยและอังกฤษด้วย Synonym-based Approach</a:t>
-            </a:r>
-          </a:p>
-          <a:p>
-            <a:pPr algn="ctr"/>
-            <a:endParaRPr lang="en-US" dirty="0"/>
-          </a:p>
-        </p:txBody>
-      </p:sp>
-      <p:sp>
-        <p:nvSpPr>
-          <p:cNvPr id="6" name="Rectangle 5">
-            <a:extLst>
-              <a:ext uri="{FF2B5EF4-FFF2-40B4-BE49-F238E27FC236}">
-                <a16:creationId xmlns:a16="http://schemas.microsoft.com/office/drawing/2014/main" id="{B03B9A0F-426E-435D-0448-A614E8E02AA4}"/>
-              </a:ext>
-            </a:extLst>
-          </p:cNvPr>
-          <p:cNvSpPr/>
-          <p:nvPr/>
-        </p:nvSpPr>
-        <p:spPr>
-          <a:xfrm>
-            <a:off x="1444488" y="3292407"/>
-            <a:ext cx="8488014" cy="915158"/>
-          </a:xfrm>
-          <a:prstGeom prst="rect">
-            <a:avLst/>
-          </a:prstGeom>
-          <a:solidFill>
-            <a:schemeClr val="accent3">
-              <a:lumMod val="40000"/>
-              <a:lumOff val="60000"/>
-            </a:schemeClr>
-          </a:solidFill>
-        </p:spPr>
-        <p:style>
-          <a:lnRef idx="2">
-            <a:schemeClr val="accent3">
-              <a:shade val="15000"/>
-            </a:schemeClr>
-          </a:lnRef>
-          <a:fillRef idx="1">
-            <a:schemeClr val="accent3"/>
-          </a:fillRef>
-          <a:effectRef idx="0">
-            <a:schemeClr val="accent3"/>
-          </a:effectRef>
-          <a:fontRef idx="minor">
-            <a:schemeClr val="lt1"/>
-          </a:fontRef>
-        </p:style>
-        <p:txBody>
-          <a:bodyPr rtlCol="0" anchor="ctr"/>
-          <a:lstStyle/>
-          <a:p>
-            <a:r>
-              <a:rPr lang="en-US" sz="2600" dirty="0">
-                <a:solidFill>
-                  <a:schemeClr val="tx1"/>
-                </a:solidFill>
-                <a:latin typeface="TH Sarabun New" panose="020B0500040200020003" pitchFamily="34" charset="-34"/>
-                <a:cs typeface="TH Sarabun New" panose="020B0500040200020003" pitchFamily="34" charset="-34"/>
-              </a:rPr>
-              <a:t>3.ระบบสืบค้นที่ยืดหยุ่นสามารถอัปเดตข้อมูลได้อัตโนอัติเมื่อองค์การบริหารจัดการก๊าซเรือนกระจกมีการเปลี่ยนแปลงข้อมูล</a:t>
-            </a:r>
-          </a:p>
-        </p:txBody>
-      </p:sp>
-      <p:sp>
-        <p:nvSpPr>
-          <p:cNvPr id="7" name="Rectangle 6">
-            <a:extLst>
-              <a:ext uri="{FF2B5EF4-FFF2-40B4-BE49-F238E27FC236}">
-                <a16:creationId xmlns:a16="http://schemas.microsoft.com/office/drawing/2014/main" id="{EEE9FB95-6660-F2D9-8432-81D04C25A333}"/>
-              </a:ext>
-            </a:extLst>
-          </p:cNvPr>
-          <p:cNvSpPr/>
-          <p:nvPr/>
-        </p:nvSpPr>
-        <p:spPr>
-          <a:xfrm>
-            <a:off x="1444487" y="4436165"/>
-            <a:ext cx="8488013" cy="583095"/>
-          </a:xfrm>
-          <a:prstGeom prst="rect">
-            <a:avLst/>
-          </a:prstGeom>
-          <a:solidFill>
-            <a:schemeClr val="accent6">
-              <a:lumMod val="40000"/>
-              <a:lumOff val="60000"/>
-            </a:schemeClr>
-          </a:solidFill>
-        </p:spPr>
-        <p:style>
-          <a:lnRef idx="2">
-            <a:schemeClr val="accent6">
-              <a:shade val="15000"/>
-            </a:schemeClr>
-          </a:lnRef>
-          <a:fillRef idx="1">
-            <a:schemeClr val="accent6"/>
-          </a:fillRef>
-          <a:effectRef idx="0">
-            <a:schemeClr val="accent6"/>
-          </a:effectRef>
-          <a:fontRef idx="minor">
-            <a:schemeClr val="lt1"/>
-          </a:fontRef>
-        </p:style>
-        <p:txBody>
-          <a:bodyPr rtlCol="0" anchor="ctr"/>
-          <a:lstStyle/>
-          <a:p>
-            <a:pPr algn="l"/>
-            <a:r>
-              <a:rPr lang="en-US" sz="2600" dirty="0">
-                <a:solidFill>
-                  <a:schemeClr val="tx1"/>
-                </a:solidFill>
-                <a:latin typeface="TH Sarabun New" panose="020B0500040200020003" pitchFamily="34" charset="-34"/>
-                <a:cs typeface="TH Sarabun New" panose="020B0500040200020003" pitchFamily="34" charset="-34"/>
-              </a:rPr>
-              <a:t>4.</a:t>
-            </a:r>
-            <a:r>
-              <a:rPr lang="th-TH" sz="2600" b="0" i="0" u="none" strike="noStrike" baseline="0" dirty="0">
-                <a:solidFill>
-                  <a:schemeClr val="tx1"/>
-                </a:solidFill>
-                <a:latin typeface="TH Sarabun New" panose="020B0500040200020003" pitchFamily="34" charset="-34"/>
-                <a:cs typeface="TH Sarabun New" panose="020B0500040200020003" pitchFamily="34" charset="-34"/>
-              </a:rPr>
-              <a:t>ประเมินระบบด้วยตัววัดมาตรฐานการค้นคืนสารสนเทศ </a:t>
-            </a:r>
-          </a:p>
-        </p:txBody>
-      </p:sp>
-      <p:sp>
-        <p:nvSpPr>
-          <p:cNvPr id="3" name="Slide Number Placeholder 2">
-            <a:extLst>
-              <a:ext uri="{FF2B5EF4-FFF2-40B4-BE49-F238E27FC236}">
-                <a16:creationId xmlns:a16="http://schemas.microsoft.com/office/drawing/2014/main" id="{5647E506-ECF8-B13C-8E54-398C8383E517}"/>
-              </a:ext>
-            </a:extLst>
-          </p:cNvPr>
-          <p:cNvSpPr>
-            <a:spLocks noGrp="1"/>
-          </p:cNvSpPr>
-          <p:nvPr>
-            <p:ph type="sldNum" sz="quarter" idx="12"/>
-          </p:nvPr>
-        </p:nvSpPr>
-        <p:spPr/>
-        <p:txBody>
-          <a:bodyPr/>
-          <a:lstStyle/>
-          <a:p>
-            <a:fld id="{9BEC6E05-063F-46C1-9253-25489D268387}" type="slidenum">
-              <a:rPr lang="en-US" smtClean="0"/>
-              <a:t>18</a:t>
-            </a:fld>
-            <a:endParaRPr lang="en-US"/>
-          </a:p>
-        </p:txBody>
-      </p:sp>
-    </p:spTree>
-    <p:extLst>
-      <p:ext uri="{BB962C8B-B14F-4D97-AF65-F5344CB8AC3E}">
-        <p14:creationId xmlns:p14="http://schemas.microsoft.com/office/powerpoint/2010/main" val="2427576554"/>
-      </p:ext>
-    </p:extLst>
-  </p:cSld>
-  <p:clrMapOvr>
-    <a:masterClrMapping/>
-  </p:clrMapOvr>
-</p:sld>
-</file>
-
-<file path=ppt/slides/slide19.xml><?xml version="1.0" encoding="utf-8"?>
-<p:sld xmlns:a="http://schemas.openxmlformats.org/drawingml/2006/main" xmlns:r="http://schemas.openxmlformats.org/officeDocument/2006/relationships" xmlns:p="http://schemas.openxmlformats.org/presentationml/2006/main">
-  <p:cSld>
-    <p:spTree>
-      <p:nvGrpSpPr>
-        <p:cNvPr id="1" name="">
-          <a:extLst>
-            <a:ext uri="{FF2B5EF4-FFF2-40B4-BE49-F238E27FC236}">
-              <a16:creationId xmlns:a16="http://schemas.microsoft.com/office/drawing/2014/main" id="{D01D8A5F-FEA3-53F0-BCF1-9547F0D0815F}"/>
-            </a:ext>
-          </a:extLst>
-        </p:cNvPr>
-        <p:cNvGrpSpPr/>
-        <p:nvPr/>
-      </p:nvGrpSpPr>
-      <p:grpSpPr>
-        <a:xfrm>
-          <a:off x="0" y="0"/>
-          <a:ext cx="0" cy="0"/>
-          <a:chOff x="0" y="0"/>
-          <a:chExt cx="0" cy="0"/>
-        </a:xfrm>
-      </p:grpSpPr>
-      <p:sp>
-        <p:nvSpPr>
-          <p:cNvPr id="4" name="Title 3">
-            <a:extLst>
-              <a:ext uri="{FF2B5EF4-FFF2-40B4-BE49-F238E27FC236}">
-                <a16:creationId xmlns:a16="http://schemas.microsoft.com/office/drawing/2014/main" id="{AB67059E-BCFA-3F85-814B-A6192D4EAF2A}"/>
-              </a:ext>
-            </a:extLst>
-          </p:cNvPr>
-          <p:cNvSpPr>
-            <a:spLocks noGrp="1"/>
-          </p:cNvSpPr>
-          <p:nvPr>
-            <p:ph type="ctrTitle"/>
-          </p:nvPr>
-        </p:nvSpPr>
-        <p:spPr>
-          <a:xfrm>
-            <a:off x="0" y="0"/>
-            <a:ext cx="7139354" cy="494402"/>
-          </a:xfrm>
-        </p:spPr>
-        <p:txBody>
-          <a:bodyPr>
-            <a:normAutofit/>
-          </a:bodyPr>
-          <a:lstStyle/>
-          <a:p>
-            <a:pPr algn="l"/>
-            <a:r>
-              <a:rPr lang="th-TH" sz="2600" b="1" dirty="0">
-                <a:solidFill>
-                  <a:schemeClr val="tx1"/>
-                </a:solidFill>
-                <a:latin typeface="TH Sarabun New" panose="020B0500040200020003" pitchFamily="34" charset="-34"/>
-                <a:cs typeface="TH Sarabun New" panose="020B0500040200020003" pitchFamily="34" charset="-34"/>
-              </a:rPr>
-              <a:t>7</a:t>
-            </a:r>
-            <a:r>
-              <a:rPr lang="th-TH" sz="2600" b="1" i="0" u="none" strike="noStrike" baseline="0" dirty="0">
-                <a:solidFill>
-                  <a:schemeClr val="tx1"/>
-                </a:solidFill>
-                <a:latin typeface="TH Sarabun New" panose="020B0500040200020003" pitchFamily="34" charset="-34"/>
-                <a:cs typeface="TH Sarabun New" panose="020B0500040200020003" pitchFamily="34" charset="-34"/>
-              </a:rPr>
-              <a:t>.ประโยชน์ที่คาดว่าจะได้รับ</a:t>
-            </a:r>
-            <a:endParaRPr lang="en-US" sz="2600" b="1" dirty="0">
-              <a:solidFill>
-                <a:schemeClr val="tx1"/>
-              </a:solidFill>
-            </a:endParaRPr>
-          </a:p>
-        </p:txBody>
-      </p:sp>
-      <p:sp>
-        <p:nvSpPr>
-          <p:cNvPr id="3" name="TextBox 2">
-            <a:extLst>
-              <a:ext uri="{FF2B5EF4-FFF2-40B4-BE49-F238E27FC236}">
-                <a16:creationId xmlns:a16="http://schemas.microsoft.com/office/drawing/2014/main" id="{1F56646E-9222-9572-1334-FDB6DAE0228D}"/>
-              </a:ext>
-            </a:extLst>
-          </p:cNvPr>
-          <p:cNvSpPr txBox="1"/>
-          <p:nvPr/>
-        </p:nvSpPr>
-        <p:spPr>
-          <a:xfrm>
-            <a:off x="800992" y="1699825"/>
-            <a:ext cx="8581547" cy="2554545"/>
-          </a:xfrm>
-          <a:prstGeom prst="rect">
-            <a:avLst/>
-          </a:prstGeom>
-          <a:noFill/>
-        </p:spPr>
-        <p:txBody>
-          <a:bodyPr wrap="square">
-            <a:spAutoFit/>
-          </a:bodyPr>
-          <a:lstStyle/>
-          <a:p>
-            <a:r>
-              <a:rPr lang="th-TH" sz="3200" dirty="0">
-                <a:latin typeface="TH Sarabun New" panose="020B0500040200020003" pitchFamily="34" charset="-34"/>
-                <a:cs typeface="TH Sarabun New" panose="020B0500040200020003" pitchFamily="34" charset="-34"/>
-              </a:rPr>
-              <a:t>ระบบสืบค้นข้ามภาษาที่ใช้งานจริงช่วยให้ผู้ใช้สามารถค้นหาข้อมูลค่าสัมประสิทธิ์การปล่อยก๊าซเรือนกระจกได้อย่างสะดวก โดยไม่ถูกจำกัดด้วยภาษา ซึ่งช่วยให้การเข้าถึงข้อมูลเป็นไปอย่างมีประสิทธิภาพยิ่งขึ้นอีกทั้งช่วยให้ธุรกิจ โดยเฉพาะกลุ่มธุระกิจขนาดเล็ก</a:t>
-            </a:r>
-            <a:r>
-              <a:rPr lang="en-US" sz="3200" dirty="0">
-                <a:latin typeface="TH Sarabun New" panose="020B0500040200020003" pitchFamily="34" charset="-34"/>
-                <a:cs typeface="TH Sarabun New" panose="020B0500040200020003" pitchFamily="34" charset="-34"/>
-              </a:rPr>
-              <a:t> (SME) </a:t>
-            </a:r>
-            <a:r>
-              <a:rPr lang="th-TH" sz="3200" dirty="0">
-                <a:latin typeface="TH Sarabun New" panose="020B0500040200020003" pitchFamily="34" charset="-34"/>
-                <a:cs typeface="TH Sarabun New" panose="020B0500040200020003" pitchFamily="34" charset="-34"/>
-              </a:rPr>
-              <a:t>สามารถปรับตัวให้เข้ากับมาตรฐานด้านสิ่งแวดล้อมได้อย่างมีประสิทธิภาพ</a:t>
-            </a:r>
-            <a:endParaRPr lang="en-US" sz="3200" dirty="0">
-              <a:latin typeface="TH Sarabun New" panose="020B0500040200020003" pitchFamily="34" charset="-34"/>
-              <a:cs typeface="TH Sarabun New" panose="020B0500040200020003" pitchFamily="34" charset="-34"/>
-            </a:endParaRPr>
-          </a:p>
-        </p:txBody>
-      </p:sp>
-      <p:sp>
-        <p:nvSpPr>
-          <p:cNvPr id="2" name="Slide Number Placeholder 1">
-            <a:extLst>
-              <a:ext uri="{FF2B5EF4-FFF2-40B4-BE49-F238E27FC236}">
-                <a16:creationId xmlns:a16="http://schemas.microsoft.com/office/drawing/2014/main" id="{2A2C89D1-B65A-A673-6DD4-ECF41EBEED83}"/>
-              </a:ext>
-            </a:extLst>
-          </p:cNvPr>
-          <p:cNvSpPr>
-            <a:spLocks noGrp="1"/>
-          </p:cNvSpPr>
-          <p:nvPr>
-            <p:ph type="sldNum" sz="quarter" idx="12"/>
-          </p:nvPr>
-        </p:nvSpPr>
-        <p:spPr/>
-        <p:txBody>
-          <a:bodyPr/>
-          <a:lstStyle/>
-          <a:p>
-            <a:fld id="{9BEC6E05-063F-46C1-9253-25489D268387}" type="slidenum">
-              <a:rPr lang="en-US" smtClean="0"/>
-              <a:t>19</a:t>
-            </a:fld>
-            <a:endParaRPr lang="en-US"/>
-          </a:p>
-        </p:txBody>
-      </p:sp>
-    </p:spTree>
-    <p:extLst>
-      <p:ext uri="{BB962C8B-B14F-4D97-AF65-F5344CB8AC3E}">
-        <p14:creationId xmlns:p14="http://schemas.microsoft.com/office/powerpoint/2010/main" val="3385384950"/>
       </p:ext>
     </p:extLst>
   </p:cSld>
@@ -11673,98 +12141,637 @@
   <p:clrMapOvr>
     <a:masterClrMapping/>
   </p:clrMapOvr>
-  <p:timing>
-    <p:tnLst>
-      <p:par>
-        <p:cTn id="1" dur="indefinite" restart="never" nodeType="tmRoot">
-          <p:childTnLst>
-            <p:seq concurrent="1" nextAc="seek">
-              <p:cTn id="2" dur="indefinite" nodeType="mainSeq">
-                <p:childTnLst>
-                  <p:par>
-                    <p:cTn id="3" fill="hold">
-                      <p:stCondLst>
-                        <p:cond delay="indefinite"/>
-                        <p:cond evt="onBegin" delay="0">
-                          <p:tn val="2"/>
-                        </p:cond>
-                      </p:stCondLst>
-                      <p:childTnLst>
-                        <p:par>
-                          <p:cTn id="4" fill="hold">
-                            <p:stCondLst>
-                              <p:cond delay="0"/>
-                            </p:stCondLst>
-                            <p:childTnLst>
-                              <p:par>
-                                <p:cTn id="5" presetID="10" presetClass="entr" presetSubtype="0" fill="hold" grpId="0" nodeType="withEffect">
-                                  <p:stCondLst>
-                                    <p:cond delay="500"/>
-                                  </p:stCondLst>
-                                  <p:iterate type="lt">
-                                    <p:tmPct val="10000"/>
-                                  </p:iterate>
-                                  <p:childTnLst>
-                                    <p:set>
-                                      <p:cBhvr>
-                                        <p:cTn id="6" dur="1" fill="hold">
-                                          <p:stCondLst>
-                                            <p:cond delay="0"/>
-                                          </p:stCondLst>
-                                        </p:cTn>
-                                        <p:tgtEl>
-                                          <p:spTgt spid="2"/>
-                                        </p:tgtEl>
-                                        <p:attrNameLst>
-                                          <p:attrName>style.visibility</p:attrName>
-                                        </p:attrNameLst>
-                                      </p:cBhvr>
-                                      <p:to>
-                                        <p:strVal val="visible"/>
-                                      </p:to>
-                                    </p:set>
-                                    <p:animEffect transition="in" filter="fade">
-                                      <p:cBhvr>
-                                        <p:cTn id="7" dur="400"/>
-                                        <p:tgtEl>
-                                          <p:spTgt spid="2"/>
-                                        </p:tgtEl>
-                                      </p:cBhvr>
-                                    </p:animEffect>
-                                  </p:childTnLst>
-                                </p:cTn>
-                              </p:par>
-                            </p:childTnLst>
-                          </p:cTn>
-                        </p:par>
-                      </p:childTnLst>
-                    </p:cTn>
-                  </p:par>
-                </p:childTnLst>
-              </p:cTn>
-              <p:prevCondLst>
-                <p:cond evt="onPrev" delay="0">
-                  <p:tgtEl>
-                    <p:sldTgt/>
-                  </p:tgtEl>
-                </p:cond>
-              </p:prevCondLst>
-              <p:nextCondLst>
-                <p:cond evt="onNext" delay="0">
-                  <p:tgtEl>
-                    <p:sldTgt/>
-                  </p:tgtEl>
-                </p:cond>
-              </p:nextCondLst>
-            </p:seq>
-          </p:childTnLst>
-        </p:cTn>
-      </p:par>
-    </p:tnLst>
-    <p:bldLst>
-      <p:bldP spid="2" grpId="0"/>
-    </p:bldLst>
-  </p:timing>
+</p:sld>
+</file>
+
+<file path=ppt/slides/slide20.xml><?xml version="1.0" encoding="utf-8"?>
+<p:sld xmlns:a="http://schemas.openxmlformats.org/drawingml/2006/main" xmlns:r="http://schemas.openxmlformats.org/officeDocument/2006/relationships" xmlns:p="http://schemas.openxmlformats.org/presentationml/2006/main">
+  <p:cSld>
+    <p:spTree>
+      <p:nvGrpSpPr>
+        <p:cNvPr id="1" name="">
+          <a:extLst>
+            <a:ext uri="{FF2B5EF4-FFF2-40B4-BE49-F238E27FC236}">
+              <a16:creationId xmlns:a16="http://schemas.microsoft.com/office/drawing/2014/main" id="{BE4D9706-BA24-A2E7-B363-2ACFA8B814AE}"/>
+            </a:ext>
+          </a:extLst>
+        </p:cNvPr>
+        <p:cNvGrpSpPr/>
+        <p:nvPr/>
+      </p:nvGrpSpPr>
+      <p:grpSpPr>
+        <a:xfrm>
+          <a:off x="0" y="0"/>
+          <a:ext cx="0" cy="0"/>
+          <a:chOff x="0" y="0"/>
+          <a:chExt cx="0" cy="0"/>
+        </a:xfrm>
+      </p:grpSpPr>
+      <p:sp>
+        <p:nvSpPr>
+          <p:cNvPr id="4" name="Title 3">
+            <a:extLst>
+              <a:ext uri="{FF2B5EF4-FFF2-40B4-BE49-F238E27FC236}">
+                <a16:creationId xmlns:a16="http://schemas.microsoft.com/office/drawing/2014/main" id="{87EF514D-63E9-302C-EBB3-9CE0A03BD7AD}"/>
+              </a:ext>
+            </a:extLst>
+          </p:cNvPr>
+          <p:cNvSpPr>
+            <a:spLocks noGrp="1"/>
+          </p:cNvSpPr>
+          <p:nvPr>
+            <p:ph type="ctrTitle"/>
+          </p:nvPr>
+        </p:nvSpPr>
+        <p:spPr>
+          <a:xfrm>
+            <a:off x="0" y="0"/>
+            <a:ext cx="7139354" cy="494402"/>
+          </a:xfrm>
+        </p:spPr>
+        <p:txBody>
+          <a:bodyPr>
+            <a:normAutofit/>
+          </a:bodyPr>
+          <a:lstStyle/>
+          <a:p>
+            <a:pPr algn="l"/>
+            <a:r>
+              <a:rPr lang="th-TH" sz="2600" b="1" i="0" u="none" strike="noStrike" baseline="0" dirty="0">
+                <a:solidFill>
+                  <a:schemeClr val="tx1"/>
+                </a:solidFill>
+                <a:latin typeface="TH Sarabun New" panose="020B0500040200020003" pitchFamily="34" charset="-34"/>
+                <a:cs typeface="TH Sarabun New" panose="020B0500040200020003" pitchFamily="34" charset="-34"/>
+              </a:rPr>
+              <a:t>6.ขอบเขตการวิจัย</a:t>
+            </a:r>
+            <a:endParaRPr lang="en-US" sz="2600" b="1" dirty="0">
+              <a:solidFill>
+                <a:schemeClr val="tx1"/>
+              </a:solidFill>
+            </a:endParaRPr>
+          </a:p>
+        </p:txBody>
+      </p:sp>
+      <p:sp>
+        <p:nvSpPr>
+          <p:cNvPr id="2" name="Rectangle 1">
+            <a:extLst>
+              <a:ext uri="{FF2B5EF4-FFF2-40B4-BE49-F238E27FC236}">
+                <a16:creationId xmlns:a16="http://schemas.microsoft.com/office/drawing/2014/main" id="{AA118285-7358-CD71-6EC7-B816A0E1C336}"/>
+              </a:ext>
+            </a:extLst>
+          </p:cNvPr>
+          <p:cNvSpPr/>
+          <p:nvPr/>
+        </p:nvSpPr>
+        <p:spPr>
+          <a:xfrm>
+            <a:off x="1444488" y="1331843"/>
+            <a:ext cx="8488016" cy="894522"/>
+          </a:xfrm>
+          <a:prstGeom prst="rect">
+            <a:avLst/>
+          </a:prstGeom>
+          <a:solidFill>
+            <a:schemeClr val="accent1">
+              <a:lumMod val="20000"/>
+              <a:lumOff val="80000"/>
+            </a:schemeClr>
+          </a:solidFill>
+        </p:spPr>
+        <p:style>
+          <a:lnRef idx="2">
+            <a:schemeClr val="accent1">
+              <a:shade val="15000"/>
+            </a:schemeClr>
+          </a:lnRef>
+          <a:fillRef idx="1">
+            <a:schemeClr val="accent1"/>
+          </a:fillRef>
+          <a:effectRef idx="0">
+            <a:schemeClr val="accent1"/>
+          </a:effectRef>
+          <a:fontRef idx="minor">
+            <a:schemeClr val="lt1"/>
+          </a:fontRef>
+        </p:style>
+        <p:txBody>
+          <a:bodyPr rtlCol="0" anchor="ctr"/>
+          <a:lstStyle/>
+          <a:p>
+            <a:endParaRPr lang="en-US" sz="2400" dirty="0">
+              <a:latin typeface="TH Sarabun New" panose="020B0500040200020003" pitchFamily="34" charset="-34"/>
+              <a:cs typeface="TH Sarabun New" panose="020B0500040200020003" pitchFamily="34" charset="-34"/>
+            </a:endParaRPr>
+          </a:p>
+          <a:p>
+            <a:r>
+              <a:rPr lang="en-US" sz="2400" dirty="0">
+                <a:solidFill>
+                  <a:schemeClr val="tx1"/>
+                </a:solidFill>
+                <a:latin typeface="TH Sarabun New" panose="020B0500040200020003" pitchFamily="34" charset="-34"/>
+                <a:cs typeface="TH Sarabun New" panose="020B0500040200020003" pitchFamily="34" charset="-34"/>
+              </a:rPr>
+              <a:t>1.ใช้ข้อมูล</a:t>
+            </a:r>
+            <a:r>
+              <a:rPr lang="th-TH" sz="2400" b="0" i="0" u="none" strike="noStrike" baseline="0" dirty="0">
+                <a:solidFill>
+                  <a:schemeClr val="tx1"/>
+                </a:solidFill>
+                <a:latin typeface="TH Sarabun New" panose="020B0500040200020003" pitchFamily="34" charset="-34"/>
+                <a:cs typeface="TH Sarabun New" panose="020B0500040200020003" pitchFamily="34" charset="-34"/>
+              </a:rPr>
+              <a:t>ค่าสัมประสิทธิ์การปล่อยก๊าซเรือนกระจก</a:t>
+            </a:r>
+            <a:r>
+              <a:rPr lang="en-US" sz="2400" dirty="0" err="1">
+                <a:solidFill>
+                  <a:schemeClr val="tx1"/>
+                </a:solidFill>
+                <a:latin typeface="TH Sarabun New" panose="020B0500040200020003" pitchFamily="34" charset="-34"/>
+                <a:cs typeface="TH Sarabun New" panose="020B0500040200020003" pitchFamily="34" charset="-34"/>
+              </a:rPr>
+              <a:t>ที่เผยแพร่โดย</a:t>
+            </a:r>
+            <a:r>
+              <a:rPr lang="en-US" sz="2400" dirty="0">
+                <a:solidFill>
+                  <a:schemeClr val="tx1"/>
+                </a:solidFill>
+                <a:latin typeface="TH Sarabun New" panose="020B0500040200020003" pitchFamily="34" charset="-34"/>
+                <a:cs typeface="TH Sarabun New" panose="020B0500040200020003" pitchFamily="34" charset="-34"/>
+              </a:rPr>
+              <a:t> </a:t>
+            </a:r>
+            <a:r>
+              <a:rPr lang="en-US" sz="2400" dirty="0" err="1">
+                <a:solidFill>
+                  <a:schemeClr val="tx1"/>
+                </a:solidFill>
+                <a:latin typeface="TH Sarabun New" panose="020B0500040200020003" pitchFamily="34" charset="-34"/>
+                <a:cs typeface="TH Sarabun New" panose="020B0500040200020003" pitchFamily="34" charset="-34"/>
+              </a:rPr>
+              <a:t>องค์การบริหารจัดการก๊าซเรือนกระจก</a:t>
+            </a:r>
+            <a:r>
+              <a:rPr lang="en-US" sz="2400" dirty="0">
+                <a:solidFill>
+                  <a:schemeClr val="tx1"/>
+                </a:solidFill>
+                <a:latin typeface="TH Sarabun New" panose="020B0500040200020003" pitchFamily="34" charset="-34"/>
+                <a:cs typeface="TH Sarabun New" panose="020B0500040200020003" pitchFamily="34" charset="-34"/>
+              </a:rPr>
+              <a:t> (</a:t>
+            </a:r>
+            <a:r>
+              <a:rPr lang="en-US" sz="2400" dirty="0" err="1">
+                <a:solidFill>
+                  <a:schemeClr val="tx1"/>
+                </a:solidFill>
+                <a:latin typeface="TH Sarabun New" panose="020B0500040200020003" pitchFamily="34" charset="-34"/>
+                <a:cs typeface="TH Sarabun New" panose="020B0500040200020003" pitchFamily="34" charset="-34"/>
+              </a:rPr>
+              <a:t>องค์การมหาชน</a:t>
+            </a:r>
+            <a:r>
+              <a:rPr lang="en-US" sz="2400" dirty="0">
+                <a:solidFill>
+                  <a:schemeClr val="tx1"/>
+                </a:solidFill>
+                <a:latin typeface="TH Sarabun New" panose="020B0500040200020003" pitchFamily="34" charset="-34"/>
+                <a:cs typeface="TH Sarabun New" panose="020B0500040200020003" pitchFamily="34" charset="-34"/>
+              </a:rPr>
+              <a:t>)</a:t>
+            </a:r>
+          </a:p>
+          <a:p>
+            <a:pPr algn="ctr"/>
+            <a:endParaRPr lang="en-US" sz="2400" dirty="0"/>
+          </a:p>
+        </p:txBody>
+      </p:sp>
+      <p:sp>
+        <p:nvSpPr>
+          <p:cNvPr id="5" name="Rectangle 4">
+            <a:extLst>
+              <a:ext uri="{FF2B5EF4-FFF2-40B4-BE49-F238E27FC236}">
+                <a16:creationId xmlns:a16="http://schemas.microsoft.com/office/drawing/2014/main" id="{959EE7A1-0399-D0BF-B905-89F1EC5F0480}"/>
+              </a:ext>
+            </a:extLst>
+          </p:cNvPr>
+          <p:cNvSpPr/>
+          <p:nvPr/>
+        </p:nvSpPr>
+        <p:spPr>
+          <a:xfrm>
+            <a:off x="1444487" y="2454965"/>
+            <a:ext cx="8488015" cy="608842"/>
+          </a:xfrm>
+          <a:prstGeom prst="rect">
+            <a:avLst/>
+          </a:prstGeom>
+          <a:solidFill>
+            <a:schemeClr val="accent2">
+              <a:lumMod val="20000"/>
+              <a:lumOff val="80000"/>
+            </a:schemeClr>
+          </a:solidFill>
+        </p:spPr>
+        <p:style>
+          <a:lnRef idx="2">
+            <a:schemeClr val="accent2">
+              <a:shade val="15000"/>
+            </a:schemeClr>
+          </a:lnRef>
+          <a:fillRef idx="1">
+            <a:schemeClr val="accent2"/>
+          </a:fillRef>
+          <a:effectRef idx="0">
+            <a:schemeClr val="accent2"/>
+          </a:effectRef>
+          <a:fontRef idx="minor">
+            <a:schemeClr val="lt1"/>
+          </a:fontRef>
+        </p:style>
+        <p:txBody>
+          <a:bodyPr rtlCol="0" anchor="ctr"/>
+          <a:lstStyle/>
+          <a:p>
+            <a:endParaRPr lang="en-US" sz="2600" dirty="0">
+              <a:latin typeface="TH Sarabun New" panose="020B0500040200020003" pitchFamily="34" charset="-34"/>
+              <a:cs typeface="TH Sarabun New" panose="020B0500040200020003" pitchFamily="34" charset="-34"/>
+            </a:endParaRPr>
+          </a:p>
+          <a:p>
+            <a:r>
+              <a:rPr lang="en-US" sz="2600" dirty="0">
+                <a:solidFill>
+                  <a:schemeClr val="tx1"/>
+                </a:solidFill>
+                <a:latin typeface="TH Sarabun New" panose="020B0500040200020003" pitchFamily="34" charset="-34"/>
+                <a:cs typeface="TH Sarabun New" panose="020B0500040200020003" pitchFamily="34" charset="-34"/>
+              </a:rPr>
+              <a:t>2.ออกแบบให้สืบค้นได้ทั้งภาษาไทยและอังกฤษด้วย Synonym-based Approach</a:t>
+            </a:r>
+          </a:p>
+          <a:p>
+            <a:pPr algn="ctr"/>
+            <a:endParaRPr lang="en-US" dirty="0"/>
+          </a:p>
+        </p:txBody>
+      </p:sp>
+      <p:sp>
+        <p:nvSpPr>
+          <p:cNvPr id="6" name="Rectangle 5">
+            <a:extLst>
+              <a:ext uri="{FF2B5EF4-FFF2-40B4-BE49-F238E27FC236}">
+                <a16:creationId xmlns:a16="http://schemas.microsoft.com/office/drawing/2014/main" id="{B03B9A0F-426E-435D-0448-A614E8E02AA4}"/>
+              </a:ext>
+            </a:extLst>
+          </p:cNvPr>
+          <p:cNvSpPr/>
+          <p:nvPr/>
+        </p:nvSpPr>
+        <p:spPr>
+          <a:xfrm>
+            <a:off x="1444488" y="3292407"/>
+            <a:ext cx="8488014" cy="915158"/>
+          </a:xfrm>
+          <a:prstGeom prst="rect">
+            <a:avLst/>
+          </a:prstGeom>
+          <a:solidFill>
+            <a:schemeClr val="accent3">
+              <a:lumMod val="40000"/>
+              <a:lumOff val="60000"/>
+            </a:schemeClr>
+          </a:solidFill>
+        </p:spPr>
+        <p:style>
+          <a:lnRef idx="2">
+            <a:schemeClr val="accent3">
+              <a:shade val="15000"/>
+            </a:schemeClr>
+          </a:lnRef>
+          <a:fillRef idx="1">
+            <a:schemeClr val="accent3"/>
+          </a:fillRef>
+          <a:effectRef idx="0">
+            <a:schemeClr val="accent3"/>
+          </a:effectRef>
+          <a:fontRef idx="minor">
+            <a:schemeClr val="lt1"/>
+          </a:fontRef>
+        </p:style>
+        <p:txBody>
+          <a:bodyPr rtlCol="0" anchor="ctr"/>
+          <a:lstStyle/>
+          <a:p>
+            <a:r>
+              <a:rPr lang="en-US" sz="2600" dirty="0">
+                <a:solidFill>
+                  <a:schemeClr val="tx1"/>
+                </a:solidFill>
+                <a:latin typeface="TH Sarabun New" panose="020B0500040200020003" pitchFamily="34" charset="-34"/>
+                <a:cs typeface="TH Sarabun New" panose="020B0500040200020003" pitchFamily="34" charset="-34"/>
+              </a:rPr>
+              <a:t>3.ระบบสืบค้นที่ยืดหยุ่นสามารถอัปเดตข้อมูลได้อัตโนอัติเมื่อองค์การบริหารจัดการก๊าซเรือนกระจกมีการเปลี่ยนแปลงข้อมูล</a:t>
+            </a:r>
+          </a:p>
+        </p:txBody>
+      </p:sp>
+      <p:sp>
+        <p:nvSpPr>
+          <p:cNvPr id="7" name="Rectangle 6">
+            <a:extLst>
+              <a:ext uri="{FF2B5EF4-FFF2-40B4-BE49-F238E27FC236}">
+                <a16:creationId xmlns:a16="http://schemas.microsoft.com/office/drawing/2014/main" id="{EEE9FB95-6660-F2D9-8432-81D04C25A333}"/>
+              </a:ext>
+            </a:extLst>
+          </p:cNvPr>
+          <p:cNvSpPr/>
+          <p:nvPr/>
+        </p:nvSpPr>
+        <p:spPr>
+          <a:xfrm>
+            <a:off x="1444487" y="4436165"/>
+            <a:ext cx="8488013" cy="583095"/>
+          </a:xfrm>
+          <a:prstGeom prst="rect">
+            <a:avLst/>
+          </a:prstGeom>
+          <a:solidFill>
+            <a:schemeClr val="accent6">
+              <a:lumMod val="40000"/>
+              <a:lumOff val="60000"/>
+            </a:schemeClr>
+          </a:solidFill>
+        </p:spPr>
+        <p:style>
+          <a:lnRef idx="2">
+            <a:schemeClr val="accent6">
+              <a:shade val="15000"/>
+            </a:schemeClr>
+          </a:lnRef>
+          <a:fillRef idx="1">
+            <a:schemeClr val="accent6"/>
+          </a:fillRef>
+          <a:effectRef idx="0">
+            <a:schemeClr val="accent6"/>
+          </a:effectRef>
+          <a:fontRef idx="minor">
+            <a:schemeClr val="lt1"/>
+          </a:fontRef>
+        </p:style>
+        <p:txBody>
+          <a:bodyPr rtlCol="0" anchor="ctr"/>
+          <a:lstStyle/>
+          <a:p>
+            <a:pPr algn="l"/>
+            <a:r>
+              <a:rPr lang="en-US" sz="2600" dirty="0">
+                <a:solidFill>
+                  <a:schemeClr val="tx1"/>
+                </a:solidFill>
+                <a:latin typeface="TH Sarabun New" panose="020B0500040200020003" pitchFamily="34" charset="-34"/>
+                <a:cs typeface="TH Sarabun New" panose="020B0500040200020003" pitchFamily="34" charset="-34"/>
+              </a:rPr>
+              <a:t>4.</a:t>
+            </a:r>
+            <a:r>
+              <a:rPr lang="th-TH" sz="2600" b="0" i="0" u="none" strike="noStrike" baseline="0" dirty="0">
+                <a:solidFill>
+                  <a:schemeClr val="tx1"/>
+                </a:solidFill>
+                <a:latin typeface="TH Sarabun New" panose="020B0500040200020003" pitchFamily="34" charset="-34"/>
+                <a:cs typeface="TH Sarabun New" panose="020B0500040200020003" pitchFamily="34" charset="-34"/>
+              </a:rPr>
+              <a:t>ประเมินระบบด้วยตัววัดมาตรฐานการค้นคืนสารสนเทศ </a:t>
+            </a:r>
+          </a:p>
+        </p:txBody>
+      </p:sp>
+      <p:sp>
+        <p:nvSpPr>
+          <p:cNvPr id="3" name="Slide Number Placeholder 2">
+            <a:extLst>
+              <a:ext uri="{FF2B5EF4-FFF2-40B4-BE49-F238E27FC236}">
+                <a16:creationId xmlns:a16="http://schemas.microsoft.com/office/drawing/2014/main" id="{5647E506-ECF8-B13C-8E54-398C8383E517}"/>
+              </a:ext>
+            </a:extLst>
+          </p:cNvPr>
+          <p:cNvSpPr>
+            <a:spLocks noGrp="1"/>
+          </p:cNvSpPr>
+          <p:nvPr>
+            <p:ph type="sldNum" sz="quarter" idx="12"/>
+          </p:nvPr>
+        </p:nvSpPr>
+        <p:spPr/>
+        <p:txBody>
+          <a:bodyPr/>
+          <a:lstStyle/>
+          <a:p>
+            <a:fld id="{9BEC6E05-063F-46C1-9253-25489D268387}" type="slidenum">
+              <a:rPr lang="en-US" smtClean="0"/>
+              <a:t>20</a:t>
+            </a:fld>
+            <a:endParaRPr lang="en-US"/>
+          </a:p>
+        </p:txBody>
+      </p:sp>
+    </p:spTree>
+    <p:extLst>
+      <p:ext uri="{BB962C8B-B14F-4D97-AF65-F5344CB8AC3E}">
+        <p14:creationId xmlns:p14="http://schemas.microsoft.com/office/powerpoint/2010/main" val="2427576554"/>
+      </p:ext>
+    </p:extLst>
+  </p:cSld>
+  <p:clrMapOvr>
+    <a:masterClrMapping/>
+  </p:clrMapOvr>
+</p:sld>
+</file>
+
+<file path=ppt/slides/slide21.xml><?xml version="1.0" encoding="utf-8"?>
+<p:sld xmlns:a="http://schemas.openxmlformats.org/drawingml/2006/main" xmlns:r="http://schemas.openxmlformats.org/officeDocument/2006/relationships" xmlns:p="http://schemas.openxmlformats.org/presentationml/2006/main">
+  <p:cSld>
+    <p:spTree>
+      <p:nvGrpSpPr>
+        <p:cNvPr id="1" name="">
+          <a:extLst>
+            <a:ext uri="{FF2B5EF4-FFF2-40B4-BE49-F238E27FC236}">
+              <a16:creationId xmlns:a16="http://schemas.microsoft.com/office/drawing/2014/main" id="{D01D8A5F-FEA3-53F0-BCF1-9547F0D0815F}"/>
+            </a:ext>
+          </a:extLst>
+        </p:cNvPr>
+        <p:cNvGrpSpPr/>
+        <p:nvPr/>
+      </p:nvGrpSpPr>
+      <p:grpSpPr>
+        <a:xfrm>
+          <a:off x="0" y="0"/>
+          <a:ext cx="0" cy="0"/>
+          <a:chOff x="0" y="0"/>
+          <a:chExt cx="0" cy="0"/>
+        </a:xfrm>
+      </p:grpSpPr>
+      <p:sp>
+        <p:nvSpPr>
+          <p:cNvPr id="4" name="Title 3">
+            <a:extLst>
+              <a:ext uri="{FF2B5EF4-FFF2-40B4-BE49-F238E27FC236}">
+                <a16:creationId xmlns:a16="http://schemas.microsoft.com/office/drawing/2014/main" id="{AB67059E-BCFA-3F85-814B-A6192D4EAF2A}"/>
+              </a:ext>
+            </a:extLst>
+          </p:cNvPr>
+          <p:cNvSpPr>
+            <a:spLocks noGrp="1"/>
+          </p:cNvSpPr>
+          <p:nvPr>
+            <p:ph type="ctrTitle"/>
+          </p:nvPr>
+        </p:nvSpPr>
+        <p:spPr>
+          <a:xfrm>
+            <a:off x="0" y="0"/>
+            <a:ext cx="7139354" cy="494402"/>
+          </a:xfrm>
+        </p:spPr>
+        <p:txBody>
+          <a:bodyPr>
+            <a:normAutofit/>
+          </a:bodyPr>
+          <a:lstStyle/>
+          <a:p>
+            <a:pPr algn="l"/>
+            <a:r>
+              <a:rPr lang="th-TH" sz="2600" b="1" dirty="0">
+                <a:solidFill>
+                  <a:schemeClr val="tx1"/>
+                </a:solidFill>
+                <a:latin typeface="TH Sarabun New" panose="020B0500040200020003" pitchFamily="34" charset="-34"/>
+                <a:cs typeface="TH Sarabun New" panose="020B0500040200020003" pitchFamily="34" charset="-34"/>
+              </a:rPr>
+              <a:t>7</a:t>
+            </a:r>
+            <a:r>
+              <a:rPr lang="th-TH" sz="2600" b="1" i="0" u="none" strike="noStrike" baseline="0" dirty="0">
+                <a:solidFill>
+                  <a:schemeClr val="tx1"/>
+                </a:solidFill>
+                <a:latin typeface="TH Sarabun New" panose="020B0500040200020003" pitchFamily="34" charset="-34"/>
+                <a:cs typeface="TH Sarabun New" panose="020B0500040200020003" pitchFamily="34" charset="-34"/>
+              </a:rPr>
+              <a:t>.ประโยชน์ที่คาดว่าจะได้รับ</a:t>
+            </a:r>
+            <a:endParaRPr lang="en-US" sz="2600" b="1" dirty="0">
+              <a:solidFill>
+                <a:schemeClr val="tx1"/>
+              </a:solidFill>
+            </a:endParaRPr>
+          </a:p>
+        </p:txBody>
+      </p:sp>
+      <p:sp>
+        <p:nvSpPr>
+          <p:cNvPr id="3" name="TextBox 2">
+            <a:extLst>
+              <a:ext uri="{FF2B5EF4-FFF2-40B4-BE49-F238E27FC236}">
+                <a16:creationId xmlns:a16="http://schemas.microsoft.com/office/drawing/2014/main" id="{1F56646E-9222-9572-1334-FDB6DAE0228D}"/>
+              </a:ext>
+            </a:extLst>
+          </p:cNvPr>
+          <p:cNvSpPr txBox="1"/>
+          <p:nvPr/>
+        </p:nvSpPr>
+        <p:spPr>
+          <a:xfrm>
+            <a:off x="800992" y="1699825"/>
+            <a:ext cx="8581547" cy="2554545"/>
+          </a:xfrm>
+          <a:prstGeom prst="rect">
+            <a:avLst/>
+          </a:prstGeom>
+          <a:noFill/>
+        </p:spPr>
+        <p:txBody>
+          <a:bodyPr wrap="square">
+            <a:spAutoFit/>
+          </a:bodyPr>
+          <a:lstStyle/>
+          <a:p>
+            <a:r>
+              <a:rPr lang="th-TH" sz="3200" dirty="0">
+                <a:latin typeface="TH Sarabun New" panose="020B0500040200020003" pitchFamily="34" charset="-34"/>
+                <a:cs typeface="TH Sarabun New" panose="020B0500040200020003" pitchFamily="34" charset="-34"/>
+              </a:rPr>
+              <a:t>ระบบสืบค้นข้ามภาษาที่ใช้งานจริงช่วยให้ผู้ใช้สามารถค้นหาข้อมูลค่าสัมประสิทธิ์การปล่อยก๊าซเรือนกระจกได้อย่างสะดวก โดยไม่ถูกจำกัดด้วยภาษา ซึ่งช่วยให้การเข้าถึงข้อมูลเป็นไปอย่างมีประสิทธิภาพยิ่งขึ้นอีกทั้งช่วยให้ธุรกิจ โดยเฉพาะกลุ่มธุระกิจขนาดเล็ก</a:t>
+            </a:r>
+            <a:r>
+              <a:rPr lang="en-US" sz="3200" dirty="0">
+                <a:latin typeface="TH Sarabun New" panose="020B0500040200020003" pitchFamily="34" charset="-34"/>
+                <a:cs typeface="TH Sarabun New" panose="020B0500040200020003" pitchFamily="34" charset="-34"/>
+              </a:rPr>
+              <a:t> (SME) </a:t>
+            </a:r>
+            <a:r>
+              <a:rPr lang="th-TH" sz="3200" dirty="0">
+                <a:latin typeface="TH Sarabun New" panose="020B0500040200020003" pitchFamily="34" charset="-34"/>
+                <a:cs typeface="TH Sarabun New" panose="020B0500040200020003" pitchFamily="34" charset="-34"/>
+              </a:rPr>
+              <a:t>สามารถปรับตัวให้เข้ากับมาตรฐานด้านสิ่งแวดล้อมได้อย่างมีประสิทธิภาพ</a:t>
+            </a:r>
+            <a:endParaRPr lang="en-US" sz="3200" dirty="0">
+              <a:latin typeface="TH Sarabun New" panose="020B0500040200020003" pitchFamily="34" charset="-34"/>
+              <a:cs typeface="TH Sarabun New" panose="020B0500040200020003" pitchFamily="34" charset="-34"/>
+            </a:endParaRPr>
+          </a:p>
+        </p:txBody>
+      </p:sp>
+      <p:sp>
+        <p:nvSpPr>
+          <p:cNvPr id="2" name="Slide Number Placeholder 1">
+            <a:extLst>
+              <a:ext uri="{FF2B5EF4-FFF2-40B4-BE49-F238E27FC236}">
+                <a16:creationId xmlns:a16="http://schemas.microsoft.com/office/drawing/2014/main" id="{2A2C89D1-B65A-A673-6DD4-ECF41EBEED83}"/>
+              </a:ext>
+            </a:extLst>
+          </p:cNvPr>
+          <p:cNvSpPr>
+            <a:spLocks noGrp="1"/>
+          </p:cNvSpPr>
+          <p:nvPr>
+            <p:ph type="sldNum" sz="quarter" idx="12"/>
+          </p:nvPr>
+        </p:nvSpPr>
+        <p:spPr/>
+        <p:txBody>
+          <a:bodyPr/>
+          <a:lstStyle/>
+          <a:p>
+            <a:fld id="{9BEC6E05-063F-46C1-9253-25489D268387}" type="slidenum">
+              <a:rPr lang="en-US" smtClean="0"/>
+              <a:t>21</a:t>
+            </a:fld>
+            <a:endParaRPr lang="en-US"/>
+          </a:p>
+        </p:txBody>
+      </p:sp>
+    </p:spTree>
+    <p:extLst>
+      <p:ext uri="{BB962C8B-B14F-4D97-AF65-F5344CB8AC3E}">
+        <p14:creationId xmlns:p14="http://schemas.microsoft.com/office/powerpoint/2010/main" val="3385384950"/>
+      </p:ext>
+    </p:extLst>
+  </p:cSld>
+  <p:clrMapOvr>
+    <a:masterClrMapping/>
+  </p:clrMapOvr>
 </p:sld>
 </file>
 
@@ -12018,7 +13025,7 @@
                 <a:ea typeface="Angsana New" panose="02020603050405020304" pitchFamily="18" charset="-34"/>
                 <a:cs typeface="TH Sarabun New" panose="020B0500040200020003" pitchFamily="34" charset="-34"/>
               </a:rPr>
-              <a:t>เป็นค่าการปล่อยก๊าซเรือนกระจกจากการผลิตหรือการบริการ ที่คิดรวมค่าการปล่อยก๊าซเรือนกระจกที่ก่อให้เกิดภาวะโลกร้อน (</a:t>
+              <a:t>เป็นค่าการปล่อยก๊าซเรือนกระจกจากการผลิตสินค้าหรือการบริการ ที่คิดรวมค่าการปล่อยก๊าซเรือนกระจกที่ก่อให้เกิดภาวะโลกร้อน (</a:t>
             </a:r>
             <a:r>
               <a:rPr lang="en-US" sz="2600" b="0" dirty="0">
@@ -12193,10 +13200,22 @@
           <a:lstStyle/>
           <a:p>
             <a:fld id="{9BEC6E05-063F-46C1-9253-25489D268387}" type="slidenum">
-              <a:rPr lang="en-US" smtClean="0"/>
+              <a:rPr lang="en-US" sz="1500" b="1" smtClean="0">
+                <a:solidFill>
+                  <a:schemeClr val="tx1"/>
+                </a:solidFill>
+                <a:latin typeface="TH Sarabun New" panose="020B0500040200020003" pitchFamily="34" charset="-34"/>
+                <a:cs typeface="TH Sarabun New" panose="020B0500040200020003" pitchFamily="34" charset="-34"/>
+              </a:rPr>
               <a:t>3</a:t>
             </a:fld>
-            <a:endParaRPr lang="en-US" dirty="0"/>
+            <a:endParaRPr lang="en-US" sz="1500" b="1" dirty="0">
+              <a:solidFill>
+                <a:schemeClr val="tx1"/>
+              </a:solidFill>
+              <a:latin typeface="TH Sarabun New" panose="020B0500040200020003" pitchFamily="34" charset="-34"/>
+              <a:cs typeface="TH Sarabun New" panose="020B0500040200020003" pitchFamily="34" charset="-34"/>
+            </a:endParaRPr>
           </a:p>
         </p:txBody>
       </p:sp>
@@ -12283,36 +13302,6 @@
           </a:p>
         </p:txBody>
       </p:sp>
-      <p:pic>
-        <p:nvPicPr>
-          <p:cNvPr id="9" name="Picture 8">
-            <a:extLst>
-              <a:ext uri="{FF2B5EF4-FFF2-40B4-BE49-F238E27FC236}">
-                <a16:creationId xmlns:a16="http://schemas.microsoft.com/office/drawing/2014/main" id="{BDB744C3-7BF3-72CA-ED27-6F02F5D9F3DD}"/>
-              </a:ext>
-            </a:extLst>
-          </p:cNvPr>
-          <p:cNvPicPr>
-            <a:picLocks noChangeAspect="1"/>
-          </p:cNvPicPr>
-          <p:nvPr/>
-        </p:nvPicPr>
-        <p:blipFill>
-          <a:blip r:embed="rId2"/>
-          <a:stretch>
-            <a:fillRect/>
-          </a:stretch>
-        </p:blipFill>
-        <p:spPr>
-          <a:xfrm>
-            <a:off x="2071204" y="2458910"/>
-            <a:ext cx="7890566" cy="4013874"/>
-          </a:xfrm>
-          <a:prstGeom prst="rect">
-            <a:avLst/>
-          </a:prstGeom>
-        </p:spPr>
-      </p:pic>
       <p:sp>
         <p:nvSpPr>
           <p:cNvPr id="5" name="TextBox 4">
@@ -12406,7 +13395,17 @@
                 <a:latin typeface="TH Sarabun New" panose="020B0500040200020003" pitchFamily="34" charset="-34"/>
                 <a:cs typeface="TH Sarabun New" panose="020B0500040200020003" pitchFamily="34" charset="-34"/>
               </a:rPr>
-              <a:t>เนื่องจากการค้นหา</a:t>
+              <a:t>เนื่องจากการค้น</a:t>
+            </a:r>
+            <a:r>
+              <a:rPr lang="en-US" sz="2600" dirty="0">
+                <a:solidFill>
+                  <a:schemeClr val="tx1"/>
+                </a:solidFill>
+                <a:latin typeface="TH Sarabun New" panose="020B0500040200020003" pitchFamily="34" charset="-34"/>
+                <a:cs typeface="TH Sarabun New" panose="020B0500040200020003" pitchFamily="34" charset="-34"/>
+              </a:rPr>
+              <a:t> EF </a:t>
             </a:r>
             <a:r>
               <a:rPr lang="th-TH" sz="2600" b="0" dirty="0">
@@ -12423,7 +13422,7 @@
                 <a:ea typeface="Angsana New" panose="02020603050405020304" pitchFamily="18" charset="-34"/>
                 <a:cs typeface="TH Sarabun New" panose="020B0500040200020003" pitchFamily="34" charset="-34"/>
               </a:rPr>
-              <a:t>ค่าสัมประสิทธิ์การปล่อยก๊าซเรือนกระจกบนเว็บไซต์ของ</a:t>
+              <a:t>บนเว็บไซต์ของ</a:t>
             </a:r>
             <a:r>
               <a:rPr lang="th-TH" sz="2600" dirty="0">
@@ -12494,6 +13493,36 @@
           </a:p>
         </p:txBody>
       </p:sp>
+      <p:pic>
+        <p:nvPicPr>
+          <p:cNvPr id="7" name="Picture 6">
+            <a:extLst>
+              <a:ext uri="{FF2B5EF4-FFF2-40B4-BE49-F238E27FC236}">
+                <a16:creationId xmlns:a16="http://schemas.microsoft.com/office/drawing/2014/main" id="{D065AC8A-0768-48CB-DA65-AD2FD4C409E4}"/>
+              </a:ext>
+            </a:extLst>
+          </p:cNvPr>
+          <p:cNvPicPr>
+            <a:picLocks noChangeAspect="1"/>
+          </p:cNvPicPr>
+          <p:nvPr/>
+        </p:nvPicPr>
+        <p:blipFill>
+          <a:blip r:embed="rId2"/>
+          <a:stretch>
+            <a:fillRect/>
+          </a:stretch>
+        </p:blipFill>
+        <p:spPr>
+          <a:xfrm>
+            <a:off x="2203807" y="2549808"/>
+            <a:ext cx="7980973" cy="3551688"/>
+          </a:xfrm>
+          <a:prstGeom prst="rect">
+            <a:avLst/>
+          </a:prstGeom>
+        </p:spPr>
+      </p:pic>
     </p:spTree>
     <p:extLst>
       <p:ext uri="{BB962C8B-B14F-4D97-AF65-F5344CB8AC3E}">
@@ -12508,6 +13537,245 @@
 </file>
 
 <file path=ppt/slides/slide5.xml><?xml version="1.0" encoding="utf-8"?>
+<p:sld xmlns:a="http://schemas.openxmlformats.org/drawingml/2006/main" xmlns:r="http://schemas.openxmlformats.org/officeDocument/2006/relationships" xmlns:p="http://schemas.openxmlformats.org/presentationml/2006/main">
+  <p:cSld>
+    <p:spTree>
+      <p:nvGrpSpPr>
+        <p:cNvPr id="1" name="">
+          <a:extLst>
+            <a:ext uri="{FF2B5EF4-FFF2-40B4-BE49-F238E27FC236}">
+              <a16:creationId xmlns:a16="http://schemas.microsoft.com/office/drawing/2014/main" id="{D3D200B9-E8A7-A3B9-48CD-FF4CA2247F38}"/>
+            </a:ext>
+          </a:extLst>
+        </p:cNvPr>
+        <p:cNvGrpSpPr/>
+        <p:nvPr/>
+      </p:nvGrpSpPr>
+      <p:grpSpPr>
+        <a:xfrm>
+          <a:off x="0" y="0"/>
+          <a:ext cx="0" cy="0"/>
+          <a:chOff x="0" y="0"/>
+          <a:chExt cx="0" cy="0"/>
+        </a:xfrm>
+      </p:grpSpPr>
+      <p:sp>
+        <p:nvSpPr>
+          <p:cNvPr id="4" name="Title 3">
+            <a:extLst>
+              <a:ext uri="{FF2B5EF4-FFF2-40B4-BE49-F238E27FC236}">
+                <a16:creationId xmlns:a16="http://schemas.microsoft.com/office/drawing/2014/main" id="{DB7FB63F-B3A5-3A9D-F2B7-A129D42C62F6}"/>
+              </a:ext>
+            </a:extLst>
+          </p:cNvPr>
+          <p:cNvSpPr>
+            <a:spLocks noGrp="1"/>
+          </p:cNvSpPr>
+          <p:nvPr>
+            <p:ph type="ctrTitle"/>
+          </p:nvPr>
+        </p:nvSpPr>
+        <p:spPr>
+          <a:xfrm>
+            <a:off x="0" y="0"/>
+            <a:ext cx="7139354" cy="494402"/>
+          </a:xfrm>
+        </p:spPr>
+        <p:txBody>
+          <a:bodyPr>
+            <a:normAutofit/>
+          </a:bodyPr>
+          <a:lstStyle/>
+          <a:p>
+            <a:pPr algn="l"/>
+            <a:r>
+              <a:rPr lang="th-TH" sz="2600" b="1" i="0" u="none" strike="noStrike" baseline="0" dirty="0">
+                <a:solidFill>
+                  <a:schemeClr val="tx1"/>
+                </a:solidFill>
+                <a:latin typeface="TH Sarabun New" panose="020B0500040200020003" pitchFamily="34" charset="-34"/>
+                <a:cs typeface="TH Sarabun New" panose="020B0500040200020003" pitchFamily="34" charset="-34"/>
+              </a:rPr>
+              <a:t>1.ที่มาและความสำคัญของปัญหา</a:t>
+            </a:r>
+            <a:endParaRPr lang="en-US" sz="2600" b="1" dirty="0">
+              <a:solidFill>
+                <a:schemeClr val="tx1"/>
+              </a:solidFill>
+            </a:endParaRPr>
+          </a:p>
+        </p:txBody>
+      </p:sp>
+      <p:sp>
+        <p:nvSpPr>
+          <p:cNvPr id="5" name="TextBox 4">
+            <a:extLst>
+              <a:ext uri="{FF2B5EF4-FFF2-40B4-BE49-F238E27FC236}">
+                <a16:creationId xmlns:a16="http://schemas.microsoft.com/office/drawing/2014/main" id="{22F45576-4AD2-EEB1-C25B-5FEE00DCC17F}"/>
+              </a:ext>
+            </a:extLst>
+          </p:cNvPr>
+          <p:cNvSpPr txBox="1"/>
+          <p:nvPr/>
+        </p:nvSpPr>
+        <p:spPr>
+          <a:xfrm>
+            <a:off x="0" y="6581001"/>
+            <a:ext cx="4817166" cy="276999"/>
+          </a:xfrm>
+          <a:prstGeom prst="rect">
+            <a:avLst/>
+          </a:prstGeom>
+          <a:noFill/>
+        </p:spPr>
+        <p:txBody>
+          <a:bodyPr wrap="square">
+            <a:spAutoFit/>
+          </a:bodyPr>
+          <a:lstStyle/>
+          <a:p>
+            <a:r>
+              <a:rPr lang="en-US" sz="1200" dirty="0">
+                <a:latin typeface="TH Sarabun New" panose="020B0500040200020003" pitchFamily="34" charset="-34"/>
+                <a:cs typeface="TH Sarabun New" panose="020B0500040200020003" pitchFamily="34" charset="-34"/>
+              </a:rPr>
+              <a:t>https://thaicarbonlabel.tgo.or.th/index.php?lang=TH&amp;mod=Y0hKdlpIVmpkSE5mWlcxcGMzTnBiMjQ9</a:t>
+            </a:r>
+          </a:p>
+        </p:txBody>
+      </p:sp>
+      <p:sp>
+        <p:nvSpPr>
+          <p:cNvPr id="3" name="Slide Number Placeholder 2">
+            <a:extLst>
+              <a:ext uri="{FF2B5EF4-FFF2-40B4-BE49-F238E27FC236}">
+                <a16:creationId xmlns:a16="http://schemas.microsoft.com/office/drawing/2014/main" id="{647C3A97-8F82-07EA-298D-9996AD411843}"/>
+              </a:ext>
+            </a:extLst>
+          </p:cNvPr>
+          <p:cNvSpPr>
+            <a:spLocks noGrp="1"/>
+          </p:cNvSpPr>
+          <p:nvPr>
+            <p:ph type="sldNum" sz="quarter" idx="12"/>
+          </p:nvPr>
+        </p:nvSpPr>
+        <p:spPr/>
+        <p:txBody>
+          <a:bodyPr/>
+          <a:lstStyle/>
+          <a:p>
+            <a:fld id="{9BEC6E05-063F-46C1-9253-25489D268387}" type="slidenum">
+              <a:rPr lang="en-US" smtClean="0"/>
+              <a:t>5</a:t>
+            </a:fld>
+            <a:endParaRPr lang="en-US"/>
+          </a:p>
+        </p:txBody>
+      </p:sp>
+      <p:pic>
+        <p:nvPicPr>
+          <p:cNvPr id="11" name="Picture 10">
+            <a:extLst>
+              <a:ext uri="{FF2B5EF4-FFF2-40B4-BE49-F238E27FC236}">
+                <a16:creationId xmlns:a16="http://schemas.microsoft.com/office/drawing/2014/main" id="{3D63F8E5-C5A2-63C2-C524-983FE11E5309}"/>
+              </a:ext>
+            </a:extLst>
+          </p:cNvPr>
+          <p:cNvPicPr>
+            <a:picLocks noChangeAspect="1"/>
+          </p:cNvPicPr>
+          <p:nvPr/>
+        </p:nvPicPr>
+        <p:blipFill>
+          <a:blip r:embed="rId2"/>
+          <a:stretch>
+            <a:fillRect/>
+          </a:stretch>
+        </p:blipFill>
+        <p:spPr>
+          <a:xfrm>
+            <a:off x="646769" y="587968"/>
+            <a:ext cx="10767845" cy="2303915"/>
+          </a:xfrm>
+          <a:prstGeom prst="rect">
+            <a:avLst/>
+          </a:prstGeom>
+        </p:spPr>
+      </p:pic>
+      <p:pic>
+        <p:nvPicPr>
+          <p:cNvPr id="13" name="Picture 12">
+            <a:extLst>
+              <a:ext uri="{FF2B5EF4-FFF2-40B4-BE49-F238E27FC236}">
+                <a16:creationId xmlns:a16="http://schemas.microsoft.com/office/drawing/2014/main" id="{1D58A643-9AE2-46E2-E5BA-C6D16B818A95}"/>
+              </a:ext>
+            </a:extLst>
+          </p:cNvPr>
+          <p:cNvPicPr>
+            <a:picLocks noChangeAspect="1"/>
+          </p:cNvPicPr>
+          <p:nvPr/>
+        </p:nvPicPr>
+        <p:blipFill>
+          <a:blip r:embed="rId3"/>
+          <a:srcRect t="34836"/>
+          <a:stretch/>
+        </p:blipFill>
+        <p:spPr>
+          <a:xfrm>
+            <a:off x="646768" y="2897784"/>
+            <a:ext cx="10767846" cy="1501762"/>
+          </a:xfrm>
+          <a:prstGeom prst="rect">
+            <a:avLst/>
+          </a:prstGeom>
+        </p:spPr>
+      </p:pic>
+      <p:pic>
+        <p:nvPicPr>
+          <p:cNvPr id="17" name="Picture 16">
+            <a:extLst>
+              <a:ext uri="{FF2B5EF4-FFF2-40B4-BE49-F238E27FC236}">
+                <a16:creationId xmlns:a16="http://schemas.microsoft.com/office/drawing/2014/main" id="{05BCC4A1-0C30-6A8A-C4CC-D9A649B5E09B}"/>
+              </a:ext>
+            </a:extLst>
+          </p:cNvPr>
+          <p:cNvPicPr>
+            <a:picLocks noChangeAspect="1"/>
+          </p:cNvPicPr>
+          <p:nvPr/>
+        </p:nvPicPr>
+        <p:blipFill>
+          <a:blip r:embed="rId4"/>
+          <a:stretch>
+            <a:fillRect/>
+          </a:stretch>
+        </p:blipFill>
+        <p:spPr>
+          <a:xfrm>
+            <a:off x="777386" y="4399546"/>
+            <a:ext cx="10637228" cy="1754585"/>
+          </a:xfrm>
+          <a:prstGeom prst="rect">
+            <a:avLst/>
+          </a:prstGeom>
+        </p:spPr>
+      </p:pic>
+    </p:spTree>
+    <p:extLst>
+      <p:ext uri="{BB962C8B-B14F-4D97-AF65-F5344CB8AC3E}">
+        <p14:creationId xmlns:p14="http://schemas.microsoft.com/office/powerpoint/2010/main" val="1928110716"/>
+      </p:ext>
+    </p:extLst>
+  </p:cSld>
+  <p:clrMapOvr>
+    <a:masterClrMapping/>
+  </p:clrMapOvr>
+</p:sld>
+</file>
+
+<file path=ppt/slides/slide6.xml><?xml version="1.0" encoding="utf-8"?>
 <p:sld xmlns:a="http://schemas.openxmlformats.org/drawingml/2006/main" xmlns:r="http://schemas.openxmlformats.org/officeDocument/2006/relationships" xmlns:p="http://schemas.openxmlformats.org/presentationml/2006/main">
   <p:cSld>
     <p:spTree>
@@ -12601,7 +13869,7 @@
         </p:nvSpPr>
         <p:spPr>
           <a:xfrm>
-            <a:off x="637538" y="922774"/>
+            <a:off x="621907" y="735205"/>
             <a:ext cx="10176235" cy="4093428"/>
           </a:xfrm>
           <a:prstGeom prst="rect">
@@ -12836,12 +14104,41 @@
           <a:p>
             <a:fld id="{9BEC6E05-063F-46C1-9253-25489D268387}" type="slidenum">
               <a:rPr lang="en-US" smtClean="0"/>
-              <a:t>5</a:t>
+              <a:t>6</a:t>
             </a:fld>
             <a:endParaRPr lang="en-US"/>
           </a:p>
         </p:txBody>
       </p:sp>
+      <p:pic>
+        <p:nvPicPr>
+          <p:cNvPr id="6" name="Picture 5">
+            <a:extLst>
+              <a:ext uri="{FF2B5EF4-FFF2-40B4-BE49-F238E27FC236}">
+                <a16:creationId xmlns:a16="http://schemas.microsoft.com/office/drawing/2014/main" id="{87BB3D8D-3FB8-04D9-5B07-608BC02B918A}"/>
+              </a:ext>
+            </a:extLst>
+          </p:cNvPr>
+          <p:cNvPicPr>
+            <a:picLocks noChangeAspect="1"/>
+          </p:cNvPicPr>
+          <p:nvPr/>
+        </p:nvPicPr>
+        <p:blipFill>
+          <a:blip r:embed="rId3"/>
+          <a:srcRect l="25000" t="13455" r="27692" b="57493"/>
+          <a:stretch/>
+        </p:blipFill>
+        <p:spPr>
+          <a:xfrm>
+            <a:off x="3569677" y="4925943"/>
+            <a:ext cx="5038857" cy="1740580"/>
+          </a:xfrm>
+          <a:prstGeom prst="rect">
+            <a:avLst/>
+          </a:prstGeom>
+        </p:spPr>
+      </p:pic>
     </p:spTree>
     <p:extLst>
       <p:ext uri="{BB962C8B-B14F-4D97-AF65-F5344CB8AC3E}">
@@ -12855,7 +14152,7 @@
 </p:sld>
 </file>
 
-<file path=ppt/slides/slide6.xml><?xml version="1.0" encoding="utf-8"?>
+<file path=ppt/slides/slide7.xml><?xml version="1.0" encoding="utf-8"?>
 <p:sld xmlns:a="http://schemas.openxmlformats.org/drawingml/2006/main" xmlns:r="http://schemas.openxmlformats.org/officeDocument/2006/relationships" xmlns:p="http://schemas.openxmlformats.org/presentationml/2006/main">
   <p:cSld>
     <p:spTree>
@@ -13647,7 +14944,7 @@
           <a:p>
             <a:fld id="{9BEC6E05-063F-46C1-9253-25489D268387}" type="slidenum">
               <a:rPr lang="en-US" smtClean="0"/>
-              <a:t>6</a:t>
+              <a:t>7</a:t>
             </a:fld>
             <a:endParaRPr lang="en-US"/>
           </a:p>
@@ -13666,7 +14963,7 @@
 </p:sld>
 </file>
 
-<file path=ppt/slides/slide7.xml><?xml version="1.0" encoding="utf-8"?>
+<file path=ppt/slides/slide8.xml><?xml version="1.0" encoding="utf-8"?>
 <p:sld xmlns:a="http://schemas.openxmlformats.org/drawingml/2006/main" xmlns:r="http://schemas.openxmlformats.org/officeDocument/2006/relationships" xmlns:p="http://schemas.openxmlformats.org/presentationml/2006/main">
   <p:cSld>
     <p:spTree>
@@ -14068,7 +15365,7 @@
           <a:p>
             <a:fld id="{9BEC6E05-063F-46C1-9253-25489D268387}" type="slidenum">
               <a:rPr lang="en-US" smtClean="0"/>
-              <a:t>7</a:t>
+              <a:t>8</a:t>
             </a:fld>
             <a:endParaRPr lang="en-US"/>
           </a:p>
@@ -14087,7 +15384,7 @@
 </p:sld>
 </file>
 
-<file path=ppt/slides/slide8.xml><?xml version="1.0" encoding="utf-8"?>
+<file path=ppt/slides/slide9.xml><?xml version="1.0" encoding="utf-8"?>
 <p:sld xmlns:a="http://schemas.openxmlformats.org/drawingml/2006/main" xmlns:r="http://schemas.openxmlformats.org/officeDocument/2006/relationships" xmlns:p="http://schemas.openxmlformats.org/presentationml/2006/main">
   <p:cSld>
     <p:spTree>
@@ -15532,7 +16829,7 @@
           <a:p>
             <a:fld id="{9BEC6E05-063F-46C1-9253-25489D268387}" type="slidenum">
               <a:rPr lang="en-US" smtClean="0"/>
-              <a:t>8</a:t>
+              <a:t>9</a:t>
             </a:fld>
             <a:endParaRPr lang="en-US"/>
           </a:p>
@@ -15542,710 +16839,6 @@
     <p:extLst>
       <p:ext uri="{BB962C8B-B14F-4D97-AF65-F5344CB8AC3E}">
         <p14:creationId xmlns:p14="http://schemas.microsoft.com/office/powerpoint/2010/main" val="2850369738"/>
-      </p:ext>
-    </p:extLst>
-  </p:cSld>
-  <p:clrMapOvr>
-    <a:masterClrMapping/>
-  </p:clrMapOvr>
-</p:sld>
-</file>
-
-<file path=ppt/slides/slide9.xml><?xml version="1.0" encoding="utf-8"?>
-<p:sld xmlns:a="http://schemas.openxmlformats.org/drawingml/2006/main" xmlns:r="http://schemas.openxmlformats.org/officeDocument/2006/relationships" xmlns:p="http://schemas.openxmlformats.org/presentationml/2006/main">
-  <p:cSld>
-    <p:spTree>
-      <p:nvGrpSpPr>
-        <p:cNvPr id="1" name="">
-          <a:extLst>
-            <a:ext uri="{FF2B5EF4-FFF2-40B4-BE49-F238E27FC236}">
-              <a16:creationId xmlns:a16="http://schemas.microsoft.com/office/drawing/2014/main" id="{DC76755C-CF04-5BCA-0F19-82A1613B2C9C}"/>
-            </a:ext>
-          </a:extLst>
-        </p:cNvPr>
-        <p:cNvGrpSpPr/>
-        <p:nvPr/>
-      </p:nvGrpSpPr>
-      <p:grpSpPr>
-        <a:xfrm>
-          <a:off x="0" y="0"/>
-          <a:ext cx="0" cy="0"/>
-          <a:chOff x="0" y="0"/>
-          <a:chExt cx="0" cy="0"/>
-        </a:xfrm>
-      </p:grpSpPr>
-      <p:sp>
-        <p:nvSpPr>
-          <p:cNvPr id="5" name="TextBox 4">
-            <a:extLst>
-              <a:ext uri="{FF2B5EF4-FFF2-40B4-BE49-F238E27FC236}">
-                <a16:creationId xmlns:a16="http://schemas.microsoft.com/office/drawing/2014/main" id="{0D13F6AE-0232-D341-120B-F083E28B913F}"/>
-              </a:ext>
-            </a:extLst>
-          </p:cNvPr>
-          <p:cNvSpPr txBox="1"/>
-          <p:nvPr/>
-        </p:nvSpPr>
-        <p:spPr>
-          <a:xfrm>
-            <a:off x="592340" y="869741"/>
-            <a:ext cx="6096000" cy="492443"/>
-          </a:xfrm>
-          <a:prstGeom prst="rect">
-            <a:avLst/>
-          </a:prstGeom>
-          <a:noFill/>
-        </p:spPr>
-        <p:txBody>
-          <a:bodyPr wrap="square">
-            <a:spAutoFit/>
-          </a:bodyPr>
-          <a:lstStyle/>
-          <a:p>
-            <a:r>
-              <a:rPr lang="th-TH" sz="2600" b="1" i="0" u="none" strike="noStrike" baseline="0" dirty="0">
-                <a:solidFill>
-                  <a:srgbClr val="000000"/>
-                </a:solidFill>
-                <a:latin typeface="TH Sarabun New" panose="020B0500040200020003" pitchFamily="34" charset="-34"/>
-                <a:cs typeface="TH Sarabun New" panose="020B0500040200020003" pitchFamily="34" charset="-34"/>
-              </a:rPr>
-              <a:t>เทคโนโลยีและแพลตฟอร์มที่ใช้</a:t>
-            </a:r>
-            <a:endParaRPr lang="en-US" sz="2600" dirty="0">
-              <a:latin typeface="TH Sarabun New" panose="020B0500040200020003" pitchFamily="34" charset="-34"/>
-              <a:cs typeface="TH Sarabun New" panose="020B0500040200020003" pitchFamily="34" charset="-34"/>
-            </a:endParaRPr>
-          </a:p>
-        </p:txBody>
-      </p:sp>
-      <p:sp>
-        <p:nvSpPr>
-          <p:cNvPr id="7" name="TextBox 6">
-            <a:extLst>
-              <a:ext uri="{FF2B5EF4-FFF2-40B4-BE49-F238E27FC236}">
-                <a16:creationId xmlns:a16="http://schemas.microsoft.com/office/drawing/2014/main" id="{ABCE7084-7E50-ECD4-9996-F2DCE1FD540C}"/>
-              </a:ext>
-            </a:extLst>
-          </p:cNvPr>
-          <p:cNvSpPr txBox="1"/>
-          <p:nvPr/>
-        </p:nvSpPr>
-        <p:spPr>
-          <a:xfrm>
-            <a:off x="2693478" y="1558027"/>
-            <a:ext cx="9578035" cy="1692771"/>
-          </a:xfrm>
-          <a:prstGeom prst="rect">
-            <a:avLst/>
-          </a:prstGeom>
-          <a:noFill/>
-        </p:spPr>
-        <p:txBody>
-          <a:bodyPr wrap="square">
-            <a:spAutoFit/>
-          </a:bodyPr>
-          <a:lstStyle/>
-          <a:p>
-            <a:r>
-              <a:rPr lang="en-US" sz="2600" b="1" dirty="0">
-                <a:latin typeface="TH Sarabun New" panose="020B0500040200020003" pitchFamily="34" charset="-34"/>
-                <a:cs typeface="TH Sarabun New" panose="020B0500040200020003" pitchFamily="34" charset="-34"/>
-              </a:rPr>
-              <a:t>Elasticsearch </a:t>
-            </a:r>
-            <a:r>
-              <a:rPr lang="th-TH" sz="2600" dirty="0">
-                <a:latin typeface="TH Sarabun New" panose="020B0500040200020003" pitchFamily="34" charset="-34"/>
-                <a:cs typeface="TH Sarabun New" panose="020B0500040200020003" pitchFamily="34" charset="-34"/>
-              </a:rPr>
-              <a:t>มีคุณสมบัติเหมาะสมกับการค้นคืนข้อมูลข้ามภาษา (</a:t>
-            </a:r>
-            <a:r>
-              <a:rPr lang="en-US" sz="2600" dirty="0">
-                <a:latin typeface="TH Sarabun New" panose="020B0500040200020003" pitchFamily="34" charset="-34"/>
-                <a:cs typeface="TH Sarabun New" panose="020B0500040200020003" pitchFamily="34" charset="-34"/>
-              </a:rPr>
-              <a:t>Cross-Lingual Information Retrieval) </a:t>
-            </a:r>
-          </a:p>
-          <a:p>
-            <a:r>
-              <a:rPr lang="th-TH" sz="2600" dirty="0">
-                <a:latin typeface="TH Sarabun New" panose="020B0500040200020003" pitchFamily="34" charset="-34"/>
-                <a:cs typeface="TH Sarabun New" panose="020B0500040200020003" pitchFamily="34" charset="-34"/>
-              </a:rPr>
-              <a:t>โดยรองรับการทำงานที่ซับซ้อน เช่น การวิเคราะห์คำพ้องความหมาย (</a:t>
-            </a:r>
-            <a:r>
-              <a:rPr lang="en-US" sz="2600" dirty="0">
-                <a:latin typeface="TH Sarabun New" panose="020B0500040200020003" pitchFamily="34" charset="-34"/>
-                <a:cs typeface="TH Sarabun New" panose="020B0500040200020003" pitchFamily="34" charset="-34"/>
-              </a:rPr>
-              <a:t>Synonym Matching) </a:t>
-            </a:r>
-          </a:p>
-          <a:p>
-            <a:r>
-              <a:rPr lang="th-TH" sz="2600" dirty="0">
-                <a:latin typeface="TH Sarabun New" panose="020B0500040200020003" pitchFamily="34" charset="-34"/>
-                <a:cs typeface="TH Sarabun New" panose="020B0500040200020003" pitchFamily="34" charset="-34"/>
-              </a:rPr>
-              <a:t>และการค้นหาแบบ </a:t>
-            </a:r>
-            <a:r>
-              <a:rPr lang="en-US" sz="2600" dirty="0">
-                <a:latin typeface="TH Sarabun New" panose="020B0500040200020003" pitchFamily="34" charset="-34"/>
-                <a:cs typeface="TH Sarabun New" panose="020B0500040200020003" pitchFamily="34" charset="-34"/>
-              </a:rPr>
-              <a:t>Full-Text Search </a:t>
-            </a:r>
-            <a:r>
-              <a:rPr lang="th-TH" sz="2600" dirty="0">
-                <a:latin typeface="TH Sarabun New" panose="020B0500040200020003" pitchFamily="34" charset="-34"/>
-                <a:cs typeface="TH Sarabun New" panose="020B0500040200020003" pitchFamily="34" charset="-34"/>
-              </a:rPr>
-              <a:t>ได้อย่างมีประสิทธิภาพ</a:t>
-            </a:r>
-          </a:p>
-          <a:p>
-            <a:r>
-              <a:rPr lang="en-US" sz="2600" b="1" dirty="0">
-                <a:latin typeface="TH Sarabun New" panose="020B0500040200020003" pitchFamily="34" charset="-34"/>
-                <a:cs typeface="TH Sarabun New" panose="020B0500040200020003" pitchFamily="34" charset="-34"/>
-              </a:rPr>
-              <a:t> </a:t>
-            </a:r>
-            <a:endParaRPr lang="en-US" sz="2600" dirty="0">
-              <a:latin typeface="TH Sarabun New" panose="020B0500040200020003" pitchFamily="34" charset="-34"/>
-              <a:cs typeface="TH Sarabun New" panose="020B0500040200020003" pitchFamily="34" charset="-34"/>
-            </a:endParaRPr>
-          </a:p>
-        </p:txBody>
-      </p:sp>
-      <p:sp>
-        <p:nvSpPr>
-          <p:cNvPr id="3" name="TextBox 2">
-            <a:extLst>
-              <a:ext uri="{FF2B5EF4-FFF2-40B4-BE49-F238E27FC236}">
-                <a16:creationId xmlns:a16="http://schemas.microsoft.com/office/drawing/2014/main" id="{9E4047AA-216F-EE75-8B0B-71FCB5CB91F6}"/>
-              </a:ext>
-            </a:extLst>
-          </p:cNvPr>
-          <p:cNvSpPr txBox="1"/>
-          <p:nvPr/>
-        </p:nvSpPr>
-        <p:spPr>
-          <a:xfrm>
-            <a:off x="2598423" y="3429000"/>
-            <a:ext cx="9209264" cy="892552"/>
-          </a:xfrm>
-          <a:prstGeom prst="rect">
-            <a:avLst/>
-          </a:prstGeom>
-          <a:noFill/>
-        </p:spPr>
-        <p:txBody>
-          <a:bodyPr wrap="square">
-            <a:spAutoFit/>
-          </a:bodyPr>
-          <a:lstStyle/>
-          <a:p>
-            <a:r>
-              <a:rPr lang="th-TH" sz="2600" dirty="0">
-                <a:solidFill>
-                  <a:srgbClr val="000000"/>
-                </a:solidFill>
-                <a:latin typeface="TH Sarabun New" panose="020B0500040200020003" pitchFamily="34" charset="-34"/>
-                <a:cs typeface="TH Sarabun New" panose="020B0500040200020003" pitchFamily="34" charset="-34"/>
-              </a:rPr>
-              <a:t>เฟรม</a:t>
-            </a:r>
-            <a:r>
-              <a:rPr lang="th-TH" sz="2600" b="0" i="0" u="none" strike="noStrike" baseline="0" dirty="0">
-                <a:solidFill>
-                  <a:srgbClr val="000000"/>
-                </a:solidFill>
-                <a:latin typeface="TH Sarabun New" panose="020B0500040200020003" pitchFamily="34" charset="-34"/>
-                <a:cs typeface="TH Sarabun New" panose="020B0500040200020003" pitchFamily="34" charset="-34"/>
-              </a:rPr>
-              <a:t>เวิร์กภาษา </a:t>
-            </a:r>
-            <a:r>
-              <a:rPr lang="en-US" sz="2600" b="0" i="0" u="none" strike="noStrike" baseline="0" dirty="0">
-                <a:solidFill>
-                  <a:srgbClr val="000000"/>
-                </a:solidFill>
-                <a:latin typeface="TH Sarabun New" panose="020B0500040200020003" pitchFamily="34" charset="-34"/>
-                <a:cs typeface="TH Sarabun New" panose="020B0500040200020003" pitchFamily="34" charset="-34"/>
-              </a:rPr>
-              <a:t>Python </a:t>
-            </a:r>
-            <a:r>
-              <a:rPr lang="th-TH" sz="2600" b="0" i="0" u="none" strike="noStrike" baseline="0" dirty="0">
-                <a:solidFill>
-                  <a:srgbClr val="000000"/>
-                </a:solidFill>
-                <a:latin typeface="TH Sarabun New" panose="020B0500040200020003" pitchFamily="34" charset="-34"/>
-                <a:cs typeface="TH Sarabun New" panose="020B0500040200020003" pitchFamily="34" charset="-34"/>
-              </a:rPr>
-              <a:t>ที่มีประสิทธิภาพสูง ใช้งานง่าย ทำให้สามารถสร้าง </a:t>
-            </a:r>
-            <a:r>
-              <a:rPr lang="en-US" sz="2600" b="0" i="0" u="none" strike="noStrike" baseline="0" dirty="0">
-                <a:solidFill>
-                  <a:srgbClr val="000000"/>
-                </a:solidFill>
-                <a:latin typeface="TH Sarabun New" panose="020B0500040200020003" pitchFamily="34" charset="-34"/>
-                <a:cs typeface="TH Sarabun New" panose="020B0500040200020003" pitchFamily="34" charset="-34"/>
-              </a:rPr>
-              <a:t>REST API </a:t>
-            </a:r>
-            <a:r>
-              <a:rPr lang="th-TH" sz="2600" b="0" i="0" u="none" strike="noStrike" baseline="0" dirty="0">
-                <a:solidFill>
-                  <a:srgbClr val="000000"/>
-                </a:solidFill>
-                <a:latin typeface="TH Sarabun New" panose="020B0500040200020003" pitchFamily="34" charset="-34"/>
-                <a:cs typeface="TH Sarabun New" panose="020B0500040200020003" pitchFamily="34" charset="-34"/>
-              </a:rPr>
-              <a:t>เพื่อเชื่อมต่อระหว่าง </a:t>
-            </a:r>
-            <a:r>
-              <a:rPr lang="en-US" sz="2600" b="0" i="0" u="none" strike="noStrike" baseline="0" dirty="0">
-                <a:solidFill>
-                  <a:srgbClr val="000000"/>
-                </a:solidFill>
-                <a:latin typeface="TH Sarabun New" panose="020B0500040200020003" pitchFamily="34" charset="-34"/>
-                <a:cs typeface="TH Sarabun New" panose="020B0500040200020003" pitchFamily="34" charset="-34"/>
-              </a:rPr>
-              <a:t>Frontend </a:t>
-            </a:r>
-            <a:r>
-              <a:rPr lang="th-TH" sz="2600" b="0" i="0" u="none" strike="noStrike" baseline="0" dirty="0">
-                <a:solidFill>
-                  <a:srgbClr val="000000"/>
-                </a:solidFill>
-                <a:latin typeface="TH Sarabun New" panose="020B0500040200020003" pitchFamily="34" charset="-34"/>
-                <a:cs typeface="TH Sarabun New" panose="020B0500040200020003" pitchFamily="34" charset="-34"/>
-              </a:rPr>
-              <a:t>กับ </a:t>
-            </a:r>
-            <a:r>
-              <a:rPr lang="en-US" sz="2600" b="0" i="0" u="none" strike="noStrike" baseline="0" dirty="0">
-                <a:solidFill>
-                  <a:srgbClr val="000000"/>
-                </a:solidFill>
-                <a:latin typeface="TH Sarabun New" panose="020B0500040200020003" pitchFamily="34" charset="-34"/>
-                <a:cs typeface="TH Sarabun New" panose="020B0500040200020003" pitchFamily="34" charset="-34"/>
-              </a:rPr>
-              <a:t>Elasticsearch </a:t>
-            </a:r>
-            <a:r>
-              <a:rPr lang="th-TH" sz="2600" b="0" i="0" u="none" strike="noStrike" baseline="0" dirty="0">
-                <a:solidFill>
-                  <a:srgbClr val="000000"/>
-                </a:solidFill>
-                <a:latin typeface="TH Sarabun New" panose="020B0500040200020003" pitchFamily="34" charset="-34"/>
-                <a:cs typeface="TH Sarabun New" panose="020B0500040200020003" pitchFamily="34" charset="-34"/>
-              </a:rPr>
-              <a:t>ได้อย่างสะดวก </a:t>
-            </a:r>
-            <a:r>
-              <a:rPr lang="en-US" sz="2600" b="1" i="0" u="none" strike="noStrike" baseline="0" dirty="0">
-                <a:solidFill>
-                  <a:srgbClr val="000000"/>
-                </a:solidFill>
-                <a:latin typeface="TH Sarabun New" panose="020B0500040200020003" pitchFamily="34" charset="-34"/>
-                <a:cs typeface="TH Sarabun New" panose="020B0500040200020003" pitchFamily="34" charset="-34"/>
-              </a:rPr>
-              <a:t> </a:t>
-            </a:r>
-            <a:endParaRPr lang="en-US" sz="2600" dirty="0"/>
-          </a:p>
-        </p:txBody>
-      </p:sp>
-      <p:sp>
-        <p:nvSpPr>
-          <p:cNvPr id="10" name="TextBox 9">
-            <a:extLst>
-              <a:ext uri="{FF2B5EF4-FFF2-40B4-BE49-F238E27FC236}">
-                <a16:creationId xmlns:a16="http://schemas.microsoft.com/office/drawing/2014/main" id="{01559C9F-1F20-D847-DA2B-252E3E6C5165}"/>
-              </a:ext>
-            </a:extLst>
-          </p:cNvPr>
-          <p:cNvSpPr txBox="1"/>
-          <p:nvPr/>
-        </p:nvSpPr>
-        <p:spPr>
-          <a:xfrm>
-            <a:off x="2598423" y="5082642"/>
-            <a:ext cx="7120835" cy="492443"/>
-          </a:xfrm>
-          <a:prstGeom prst="rect">
-            <a:avLst/>
-          </a:prstGeom>
-          <a:noFill/>
-        </p:spPr>
-        <p:txBody>
-          <a:bodyPr wrap="square">
-            <a:spAutoFit/>
-          </a:bodyPr>
-          <a:lstStyle/>
-          <a:p>
-            <a:r>
-              <a:rPr lang="en-US" sz="2600" b="1" i="0" u="none" strike="noStrike" baseline="0" dirty="0">
-                <a:solidFill>
-                  <a:srgbClr val="000000"/>
-                </a:solidFill>
-                <a:latin typeface="TH Sarabun New" panose="020B0500040200020003" pitchFamily="34" charset="-34"/>
-                <a:cs typeface="TH Sarabun New" panose="020B0500040200020003" pitchFamily="34" charset="-34"/>
-              </a:rPr>
-              <a:t>Apache Airflow </a:t>
-            </a:r>
-            <a:r>
-              <a:rPr lang="th-TH" sz="2600" b="0" i="0" u="none" strike="noStrike" baseline="0" dirty="0">
-                <a:solidFill>
-                  <a:srgbClr val="000000"/>
-                </a:solidFill>
-                <a:latin typeface="TH Sarabun New" panose="020B0500040200020003" pitchFamily="34" charset="-34"/>
-                <a:cs typeface="TH Sarabun New" panose="020B0500040200020003" pitchFamily="34" charset="-34"/>
-              </a:rPr>
-              <a:t>แพลตฟอร์มสำหรับการสร้าง</a:t>
-            </a:r>
-            <a:r>
-              <a:rPr lang="en-US" sz="2600" b="0" i="0" u="none" strike="noStrike" baseline="0" dirty="0">
-                <a:solidFill>
-                  <a:srgbClr val="000000"/>
-                </a:solidFill>
-                <a:latin typeface="TH Sarabun New" panose="020B0500040200020003" pitchFamily="34" charset="-34"/>
-                <a:cs typeface="TH Sarabun New" panose="020B0500040200020003" pitchFamily="34" charset="-34"/>
-              </a:rPr>
-              <a:t> </a:t>
-            </a:r>
-            <a:r>
-              <a:rPr lang="th-TH" sz="2600" b="0" i="0" u="none" strike="noStrike" baseline="0" dirty="0">
-                <a:solidFill>
-                  <a:srgbClr val="000000"/>
-                </a:solidFill>
-                <a:latin typeface="TH Sarabun New" panose="020B0500040200020003" pitchFamily="34" charset="-34"/>
-                <a:cs typeface="TH Sarabun New" panose="020B0500040200020003" pitchFamily="34" charset="-34"/>
-              </a:rPr>
-              <a:t>จัดการ</a:t>
-            </a:r>
-            <a:r>
-              <a:rPr lang="en-US" sz="2600" b="0" i="0" u="none" strike="noStrike" baseline="0" dirty="0">
-                <a:solidFill>
-                  <a:srgbClr val="000000"/>
-                </a:solidFill>
-                <a:latin typeface="TH Sarabun New" panose="020B0500040200020003" pitchFamily="34" charset="-34"/>
-                <a:cs typeface="TH Sarabun New" panose="020B0500040200020003" pitchFamily="34" charset="-34"/>
-              </a:rPr>
-              <a:t> </a:t>
-            </a:r>
-            <a:r>
-              <a:rPr lang="th-TH" sz="2600" b="0" i="0" u="none" strike="noStrike" baseline="0" dirty="0">
-                <a:solidFill>
-                  <a:srgbClr val="000000"/>
-                </a:solidFill>
-                <a:latin typeface="TH Sarabun New" panose="020B0500040200020003" pitchFamily="34" charset="-34"/>
-                <a:cs typeface="TH Sarabun New" panose="020B0500040200020003" pitchFamily="34" charset="-34"/>
-              </a:rPr>
-              <a:t>ติดตาม </a:t>
-            </a:r>
-            <a:r>
-              <a:rPr lang="en-US" sz="2600" b="0" i="0" u="none" strike="noStrike" baseline="0" dirty="0">
-                <a:solidFill>
-                  <a:srgbClr val="000000"/>
-                </a:solidFill>
-                <a:latin typeface="TH Sarabun New" panose="020B0500040200020003" pitchFamily="34" charset="-34"/>
-                <a:cs typeface="TH Sarabun New" panose="020B0500040200020003" pitchFamily="34" charset="-34"/>
-              </a:rPr>
-              <a:t>Workflow </a:t>
-            </a:r>
-            <a:r>
-              <a:rPr lang="en-US" sz="2600" b="1" i="0" u="none" strike="noStrike" baseline="0" dirty="0">
-                <a:solidFill>
-                  <a:srgbClr val="000000"/>
-                </a:solidFill>
-                <a:latin typeface="TH Sarabun New" panose="020B0500040200020003" pitchFamily="34" charset="-34"/>
-                <a:cs typeface="TH Sarabun New" panose="020B0500040200020003" pitchFamily="34" charset="-34"/>
-              </a:rPr>
-              <a:t> </a:t>
-            </a:r>
-            <a:endParaRPr lang="en-US" sz="2600" dirty="0"/>
-          </a:p>
-        </p:txBody>
-      </p:sp>
-      <p:pic>
-        <p:nvPicPr>
-          <p:cNvPr id="4" name="Picture 3" descr="A colorful circle with a black background&#10;&#10;Description automatically generated">
-            <a:extLst>
-              <a:ext uri="{FF2B5EF4-FFF2-40B4-BE49-F238E27FC236}">
-                <a16:creationId xmlns:a16="http://schemas.microsoft.com/office/drawing/2014/main" id="{663CE4D3-BB06-55F0-A3FD-AC8FAECE48BC}"/>
-              </a:ext>
-            </a:extLst>
-          </p:cNvPr>
-          <p:cNvPicPr>
-            <a:picLocks noChangeAspect="1"/>
-          </p:cNvPicPr>
-          <p:nvPr/>
-        </p:nvPicPr>
-        <p:blipFill>
-          <a:blip r:embed="rId2">
-            <a:extLst>
-              <a:ext uri="{28A0092B-C50C-407E-A947-70E740481C1C}">
-                <a14:useLocalDpi xmlns:a14="http://schemas.microsoft.com/office/drawing/2010/main" val="0"/>
-              </a:ext>
-            </a:extLst>
-          </a:blip>
-          <a:stretch>
-            <a:fillRect/>
-          </a:stretch>
-        </p:blipFill>
-        <p:spPr>
-          <a:xfrm>
-            <a:off x="592340" y="1392819"/>
-            <a:ext cx="1508795" cy="1508795"/>
-          </a:xfrm>
-          <a:prstGeom prst="rect">
-            <a:avLst/>
-          </a:prstGeom>
-        </p:spPr>
-      </p:pic>
-      <p:pic>
-        <p:nvPicPr>
-          <p:cNvPr id="8" name="Picture 7" descr="A close up of a logo&#10;&#10;Description automatically generated">
-            <a:extLst>
-              <a:ext uri="{FF2B5EF4-FFF2-40B4-BE49-F238E27FC236}">
-                <a16:creationId xmlns:a16="http://schemas.microsoft.com/office/drawing/2014/main" id="{D481668D-3EF4-A6A2-EB2F-9A02A9A60382}"/>
-              </a:ext>
-            </a:extLst>
-          </p:cNvPr>
-          <p:cNvPicPr>
-            <a:picLocks noChangeAspect="1"/>
-          </p:cNvPicPr>
-          <p:nvPr/>
-        </p:nvPicPr>
-        <p:blipFill>
-          <a:blip r:embed="rId3">
-            <a:extLst>
-              <a:ext uri="{28A0092B-C50C-407E-A947-70E740481C1C}">
-                <a14:useLocalDpi xmlns:a14="http://schemas.microsoft.com/office/drawing/2010/main" val="0"/>
-              </a:ext>
-            </a:extLst>
-          </a:blip>
-          <a:stretch>
-            <a:fillRect/>
-          </a:stretch>
-        </p:blipFill>
-        <p:spPr>
-          <a:xfrm>
-            <a:off x="0" y="3429000"/>
-            <a:ext cx="2693478" cy="970599"/>
-          </a:xfrm>
-          <a:prstGeom prst="rect">
-            <a:avLst/>
-          </a:prstGeom>
-        </p:spPr>
-      </p:pic>
-      <p:pic>
-        <p:nvPicPr>
-          <p:cNvPr id="11" name="Picture 10" descr="A logo with text on it&#10;&#10;Description automatically generated">
-            <a:extLst>
-              <a:ext uri="{FF2B5EF4-FFF2-40B4-BE49-F238E27FC236}">
-                <a16:creationId xmlns:a16="http://schemas.microsoft.com/office/drawing/2014/main" id="{D7CDCD1C-EC37-394F-B0DE-4F6FB694D6AF}"/>
-              </a:ext>
-            </a:extLst>
-          </p:cNvPr>
-          <p:cNvPicPr>
-            <a:picLocks noChangeAspect="1"/>
-          </p:cNvPicPr>
-          <p:nvPr/>
-        </p:nvPicPr>
-        <p:blipFill>
-          <a:blip r:embed="rId4">
-            <a:extLst>
-              <a:ext uri="{28A0092B-C50C-407E-A947-70E740481C1C}">
-                <a14:useLocalDpi xmlns:a14="http://schemas.microsoft.com/office/drawing/2010/main" val="0"/>
-              </a:ext>
-            </a:extLst>
-          </a:blip>
-          <a:stretch>
-            <a:fillRect/>
-          </a:stretch>
-        </p:blipFill>
-        <p:spPr>
-          <a:xfrm>
-            <a:off x="277208" y="4915689"/>
-            <a:ext cx="2139061" cy="826348"/>
-          </a:xfrm>
-          <a:prstGeom prst="rect">
-            <a:avLst/>
-          </a:prstGeom>
-        </p:spPr>
-      </p:pic>
-      <p:sp>
-        <p:nvSpPr>
-          <p:cNvPr id="12" name="Title 3">
-            <a:extLst>
-              <a:ext uri="{FF2B5EF4-FFF2-40B4-BE49-F238E27FC236}">
-                <a16:creationId xmlns:a16="http://schemas.microsoft.com/office/drawing/2014/main" id="{0428DEA1-F1F7-474F-D382-7014E2890BCB}"/>
-              </a:ext>
-            </a:extLst>
-          </p:cNvPr>
-          <p:cNvSpPr txBox="1">
-            <a:spLocks/>
-          </p:cNvSpPr>
-          <p:nvPr/>
-        </p:nvSpPr>
-        <p:spPr>
-          <a:xfrm>
-            <a:off x="0" y="0"/>
-            <a:ext cx="7139354" cy="494402"/>
-          </a:xfrm>
-          <a:prstGeom prst="rect">
-            <a:avLst/>
-          </a:prstGeom>
-        </p:spPr>
-        <p:txBody>
-          <a:bodyPr vert="horz" lIns="91440" tIns="45720" rIns="91440" bIns="45720" rtlCol="0" anchor="t">
-            <a:normAutofit/>
-          </a:bodyPr>
-          <a:lstStyle>
-            <a:lvl1pPr algn="l" defTabSz="457200" rtl="0" eaLnBrk="1" latinLnBrk="0" hangingPunct="1">
-              <a:spcBef>
-                <a:spcPct val="0"/>
-              </a:spcBef>
-              <a:buNone/>
-              <a:defRPr sz="3600" kern="1200">
-                <a:solidFill>
-                  <a:schemeClr val="accent1"/>
-                </a:solidFill>
-                <a:latin typeface="+mj-lt"/>
-                <a:ea typeface="+mj-ea"/>
-                <a:cs typeface="+mj-cs"/>
-              </a:defRPr>
-            </a:lvl1pPr>
-            <a:lvl2pPr eaLnBrk="1" hangingPunct="1">
-              <a:defRPr>
-                <a:solidFill>
-                  <a:schemeClr val="tx2"/>
-                </a:solidFill>
-              </a:defRPr>
-            </a:lvl2pPr>
-            <a:lvl3pPr eaLnBrk="1" hangingPunct="1">
-              <a:defRPr>
-                <a:solidFill>
-                  <a:schemeClr val="tx2"/>
-                </a:solidFill>
-              </a:defRPr>
-            </a:lvl3pPr>
-            <a:lvl4pPr eaLnBrk="1" hangingPunct="1">
-              <a:defRPr>
-                <a:solidFill>
-                  <a:schemeClr val="tx2"/>
-                </a:solidFill>
-              </a:defRPr>
-            </a:lvl4pPr>
-            <a:lvl5pPr eaLnBrk="1" hangingPunct="1">
-              <a:defRPr>
-                <a:solidFill>
-                  <a:schemeClr val="tx2"/>
-                </a:solidFill>
-              </a:defRPr>
-            </a:lvl5pPr>
-            <a:lvl6pPr eaLnBrk="1" hangingPunct="1">
-              <a:defRPr>
-                <a:solidFill>
-                  <a:schemeClr val="tx2"/>
-                </a:solidFill>
-              </a:defRPr>
-            </a:lvl6pPr>
-            <a:lvl7pPr eaLnBrk="1" hangingPunct="1">
-              <a:defRPr>
-                <a:solidFill>
-                  <a:schemeClr val="tx2"/>
-                </a:solidFill>
-              </a:defRPr>
-            </a:lvl7pPr>
-            <a:lvl8pPr eaLnBrk="1" hangingPunct="1">
-              <a:defRPr>
-                <a:solidFill>
-                  <a:schemeClr val="tx2"/>
-                </a:solidFill>
-              </a:defRPr>
-            </a:lvl8pPr>
-            <a:lvl9pPr eaLnBrk="1" hangingPunct="1">
-              <a:defRPr>
-                <a:solidFill>
-                  <a:schemeClr val="tx2"/>
-                </a:solidFill>
-              </a:defRPr>
-            </a:lvl9pPr>
-          </a:lstStyle>
-          <a:p>
-            <a:r>
-              <a:rPr lang="en-US" sz="2600" b="1" dirty="0">
-                <a:solidFill>
-                  <a:schemeClr val="tx1"/>
-                </a:solidFill>
-                <a:latin typeface="TH Sarabun New" panose="020B0500040200020003" pitchFamily="34" charset="-34"/>
-                <a:cs typeface="TH Sarabun New" panose="020B0500040200020003" pitchFamily="34" charset="-34"/>
-              </a:rPr>
-              <a:t>2</a:t>
-            </a:r>
-            <a:r>
-              <a:rPr lang="th-TH" sz="2600" b="1" dirty="0">
-                <a:solidFill>
-                  <a:schemeClr val="tx1"/>
-                </a:solidFill>
-                <a:latin typeface="TH Sarabun New" panose="020B0500040200020003" pitchFamily="34" charset="-34"/>
-                <a:cs typeface="TH Sarabun New" panose="020B0500040200020003" pitchFamily="34" charset="-34"/>
-              </a:rPr>
-              <a:t>.ทฤษฎีที่เกี่ยวข้อง</a:t>
-            </a:r>
-            <a:endParaRPr lang="en-US" sz="2600" b="1" dirty="0">
-              <a:solidFill>
-                <a:schemeClr val="tx1"/>
-              </a:solidFill>
-            </a:endParaRPr>
-          </a:p>
-        </p:txBody>
-      </p:sp>
-      <p:sp>
-        <p:nvSpPr>
-          <p:cNvPr id="2" name="Slide Number Placeholder 1">
-            <a:extLst>
-              <a:ext uri="{FF2B5EF4-FFF2-40B4-BE49-F238E27FC236}">
-                <a16:creationId xmlns:a16="http://schemas.microsoft.com/office/drawing/2014/main" id="{8868B7D4-0133-C2CC-95D5-DC8BFAC33714}"/>
-              </a:ext>
-            </a:extLst>
-          </p:cNvPr>
-          <p:cNvSpPr>
-            <a:spLocks noGrp="1"/>
-          </p:cNvSpPr>
-          <p:nvPr>
-            <p:ph type="sldNum" sz="quarter" idx="12"/>
-          </p:nvPr>
-        </p:nvSpPr>
-        <p:spPr/>
-        <p:txBody>
-          <a:bodyPr/>
-          <a:lstStyle/>
-          <a:p>
-            <a:fld id="{9BEC6E05-063F-46C1-9253-25489D268387}" type="slidenum">
-              <a:rPr lang="en-US" smtClean="0"/>
-              <a:t>9</a:t>
-            </a:fld>
-            <a:endParaRPr lang="en-US"/>
-          </a:p>
-        </p:txBody>
-      </p:sp>
-    </p:spTree>
-    <p:extLst>
-      <p:ext uri="{BB962C8B-B14F-4D97-AF65-F5344CB8AC3E}">
-        <p14:creationId xmlns:p14="http://schemas.microsoft.com/office/powerpoint/2010/main" val="1965070930"/>
       </p:ext>
     </p:extLst>
   </p:cSld>
@@ -17143,18 +17736,18 @@
 </file>
 
 <file path=customXml/item1.xml><?xml version="1.0" encoding="utf-8"?>
+<p:properties xmlns:p="http://schemas.microsoft.com/office/2006/metadata/properties" xmlns:xsi="http://www.w3.org/2001/XMLSchema-instance" xmlns:pc="http://schemas.microsoft.com/office/infopath/2007/PartnerControls">
+  <documentManagement/>
+</p:properties>
+</file>
+
+<file path=customXml/item2.xml><?xml version="1.0" encoding="utf-8"?>
 <?mso-contentType ?>
 <FormTemplates xmlns="http://schemas.microsoft.com/sharepoint/v3/contenttype/forms">
   <Display>DocumentLibraryForm</Display>
   <Edit>DocumentLibraryForm</Edit>
   <New>DocumentLibraryForm</New>
 </FormTemplates>
-</file>
-
-<file path=customXml/item2.xml><?xml version="1.0" encoding="utf-8"?>
-<p:properties xmlns:p="http://schemas.microsoft.com/office/2006/metadata/properties" xmlns:xsi="http://www.w3.org/2001/XMLSchema-instance" xmlns:pc="http://schemas.microsoft.com/office/infopath/2007/PartnerControls">
-  <documentManagement/>
-</p:properties>
 </file>
 
 <file path=customXml/item3.xml><?xml version="1.0" encoding="utf-8"?>
@@ -17308,14 +17901,6 @@
 </file>
 
 <file path=customXml/itemProps1.xml><?xml version="1.0" encoding="utf-8"?>
-<ds:datastoreItem xmlns:ds="http://schemas.openxmlformats.org/officeDocument/2006/customXml" ds:itemID="{EEA3426A-D9CD-4D97-A56B-FC5574F7293D}">
-  <ds:schemaRefs>
-    <ds:schemaRef ds:uri="http://schemas.microsoft.com/sharepoint/v3/contenttype/forms"/>
-  </ds:schemaRefs>
-</ds:datastoreItem>
-</file>
-
-<file path=customXml/itemProps2.xml><?xml version="1.0" encoding="utf-8"?>
 <ds:datastoreItem xmlns:ds="http://schemas.openxmlformats.org/officeDocument/2006/customXml" ds:itemID="{B2C48F46-9B33-48DB-BECB-A211F1066C6C}">
   <ds:schemaRefs>
     <ds:schemaRef ds:uri="http://purl.org/dc/terms/"/>
@@ -17327,6 +17912,14 @@
     <ds:schemaRef ds:uri="05f8cd53-000c-42cc-b8f1-6cc2179124ab"/>
     <ds:schemaRef ds:uri="http://schemas.openxmlformats.org/package/2006/metadata/core-properties"/>
     <ds:schemaRef ds:uri="http://www.w3.org/XML/1998/namespace"/>
+  </ds:schemaRefs>
+</ds:datastoreItem>
+</file>
+
+<file path=customXml/itemProps2.xml><?xml version="1.0" encoding="utf-8"?>
+<ds:datastoreItem xmlns:ds="http://schemas.openxmlformats.org/officeDocument/2006/customXml" ds:itemID="{EEA3426A-D9CD-4D97-A56B-FC5574F7293D}">
+  <ds:schemaRefs>
+    <ds:schemaRef ds:uri="http://schemas.microsoft.com/sharepoint/v3/contenttype/forms"/>
   </ds:schemaRefs>
 </ds:datastoreItem>
 </file>

</xml_diff>